<commit_message>
Fixes the agenda to day 1 / day 2
Previously it said morning / afternoon.

Signed-off-by: Franklin Webber <franklin@chef.io>
</commit_message>
<xml_diff>
--- a/01-introduction.pptx
+++ b/01-introduction.pptx
@@ -285,7 +285,7 @@
               <a:pPr>
                 <a:defRPr/>
               </a:pPr>
-              <a:t>2016-11-01</a:t>
+              <a:t>2017-01-24</a:t>
             </a:fld>
             <a:endParaRPr lang="en-US" dirty="0"/>
           </a:p>
@@ -468,7 +468,7 @@
               <a:pPr>
                 <a:defRPr/>
               </a:pPr>
-              <a:t>2016-11-01</a:t>
+              <a:t>2017-01-24</a:t>
             </a:fld>
             <a:endParaRPr lang="en-US" dirty="0"/>
           </a:p>
@@ -3309,14 +3309,14 @@
           </a:ln>
           <a:extLst>
             <a:ext uri="{909E8E84-426E-40dd-AFC4-6F175D3DCCD1}">
-              <a14:hiddenFill xmlns="" xmlns:a14="http://schemas.microsoft.com/office/drawing/2010/main">
+              <a14:hiddenFill xmlns:a14="http://schemas.microsoft.com/office/drawing/2010/main" xmlns="">
                 <a:solidFill>
                   <a:srgbClr val="FFFFFF"/>
                 </a:solidFill>
               </a14:hiddenFill>
             </a:ext>
             <a:ext uri="{91240B29-F687-4f45-9708-019B960494DF}">
-              <a14:hiddenLine xmlns="" xmlns:a14="http://schemas.microsoft.com/office/drawing/2010/main" w="9525">
+              <a14:hiddenLine xmlns:a14="http://schemas.microsoft.com/office/drawing/2010/main" xmlns="" w="9525">
                 <a:solidFill>
                   <a:srgbClr val="000000"/>
                 </a:solidFill>
@@ -3464,14 +3464,14 @@
           </a:ln>
           <a:extLst>
             <a:ext uri="{909E8E84-426E-40dd-AFC4-6F175D3DCCD1}">
-              <a14:hiddenFill xmlns="" xmlns:a14="http://schemas.microsoft.com/office/drawing/2010/main">
+              <a14:hiddenFill xmlns:a14="http://schemas.microsoft.com/office/drawing/2010/main" xmlns="">
                 <a:solidFill>
                   <a:srgbClr val="FFFFFF"/>
                 </a:solidFill>
               </a14:hiddenFill>
             </a:ext>
             <a:ext uri="{91240B29-F687-4f45-9708-019B960494DF}">
-              <a14:hiddenLine xmlns="" xmlns:a14="http://schemas.microsoft.com/office/drawing/2010/main" w="9525">
+              <a14:hiddenLine xmlns:a14="http://schemas.microsoft.com/office/drawing/2010/main" xmlns="" w="9525">
                 <a:solidFill>
                   <a:srgbClr val="000000"/>
                 </a:solidFill>
@@ -3969,14 +3969,14 @@
           </a:ln>
           <a:extLst>
             <a:ext uri="{909E8E84-426E-40dd-AFC4-6F175D3DCCD1}">
-              <a14:hiddenFill xmlns="" xmlns:a14="http://schemas.microsoft.com/office/drawing/2010/main">
+              <a14:hiddenFill xmlns:a14="http://schemas.microsoft.com/office/drawing/2010/main" xmlns="">
                 <a:solidFill>
                   <a:srgbClr val="FFFFFF"/>
                 </a:solidFill>
               </a14:hiddenFill>
             </a:ext>
             <a:ext uri="{91240B29-F687-4f45-9708-019B960494DF}">
-              <a14:hiddenLine xmlns="" xmlns:a14="http://schemas.microsoft.com/office/drawing/2010/main" w="9525">
+              <a14:hiddenLine xmlns:a14="http://schemas.microsoft.com/office/drawing/2010/main" xmlns="" w="9525">
                 <a:solidFill>
                   <a:srgbClr val="000000"/>
                 </a:solidFill>
@@ -5460,14 +5460,14 @@
           </a:ln>
           <a:extLst>
             <a:ext uri="{909E8E84-426E-40dd-AFC4-6F175D3DCCD1}">
-              <a14:hiddenFill xmlns="" xmlns:a14="http://schemas.microsoft.com/office/drawing/2010/main">
+              <a14:hiddenFill xmlns:a14="http://schemas.microsoft.com/office/drawing/2010/main" xmlns="">
                 <a:solidFill>
                   <a:srgbClr val="FFFFFF"/>
                 </a:solidFill>
               </a14:hiddenFill>
             </a:ext>
             <a:ext uri="{91240B29-F687-4f45-9708-019B960494DF}">
-              <a14:hiddenLine xmlns="" xmlns:a14="http://schemas.microsoft.com/office/drawing/2010/main" w="9525">
+              <a14:hiddenLine xmlns:a14="http://schemas.microsoft.com/office/drawing/2010/main" xmlns="" w="9525">
                 <a:solidFill>
                   <a:srgbClr val="000000"/>
                 </a:solidFill>
@@ -6886,14 +6886,14 @@
           </a:ln>
           <a:extLst>
             <a:ext uri="{909E8E84-426E-40dd-AFC4-6F175D3DCCD1}">
-              <a14:hiddenFill xmlns="" xmlns:a14="http://schemas.microsoft.com/office/drawing/2010/main">
+              <a14:hiddenFill xmlns:a14="http://schemas.microsoft.com/office/drawing/2010/main" xmlns="">
                 <a:solidFill>
                   <a:srgbClr val="FFFFFF"/>
                 </a:solidFill>
               </a14:hiddenFill>
             </a:ext>
             <a:ext uri="{91240B29-F687-4f45-9708-019B960494DF}">
-              <a14:hiddenLine xmlns="" xmlns:a14="http://schemas.microsoft.com/office/drawing/2010/main" w="9525">
+              <a14:hiddenLine xmlns:a14="http://schemas.microsoft.com/office/drawing/2010/main" xmlns="" w="9525">
                 <a:solidFill>
                   <a:srgbClr val="000000"/>
                 </a:solidFill>
@@ -7465,14 +7465,14 @@
           </a:ln>
           <a:extLst>
             <a:ext uri="{909E8E84-426E-40dd-AFC4-6F175D3DCCD1}">
-              <a14:hiddenFill xmlns="" xmlns:a14="http://schemas.microsoft.com/office/drawing/2010/main">
+              <a14:hiddenFill xmlns:a14="http://schemas.microsoft.com/office/drawing/2010/main" xmlns="">
                 <a:solidFill>
                   <a:srgbClr val="FFFFFF"/>
                 </a:solidFill>
               </a14:hiddenFill>
             </a:ext>
             <a:ext uri="{91240B29-F687-4f45-9708-019B960494DF}">
-              <a14:hiddenLine xmlns="" xmlns:a14="http://schemas.microsoft.com/office/drawing/2010/main" w="9525">
+              <a14:hiddenLine xmlns:a14="http://schemas.microsoft.com/office/drawing/2010/main" xmlns="" w="9525">
                 <a:solidFill>
                   <a:srgbClr val="000000"/>
                 </a:solidFill>
@@ -8053,14 +8053,14 @@
           </a:ln>
           <a:extLst>
             <a:ext uri="{909E8E84-426E-40dd-AFC4-6F175D3DCCD1}">
-              <a14:hiddenFill xmlns="" xmlns:a14="http://schemas.microsoft.com/office/drawing/2010/main">
+              <a14:hiddenFill xmlns:a14="http://schemas.microsoft.com/office/drawing/2010/main" xmlns="">
                 <a:solidFill>
                   <a:srgbClr val="FFFFFF"/>
                 </a:solidFill>
               </a14:hiddenFill>
             </a:ext>
             <a:ext uri="{91240B29-F687-4f45-9708-019B960494DF}">
-              <a14:hiddenLine xmlns="" xmlns:a14="http://schemas.microsoft.com/office/drawing/2010/main" w="9525">
+              <a14:hiddenLine xmlns:a14="http://schemas.microsoft.com/office/drawing/2010/main" xmlns="" w="9525">
                 <a:solidFill>
                   <a:srgbClr val="000000"/>
                 </a:solidFill>
@@ -9021,14 +9021,14 @@
           </a:ln>
           <a:extLst>
             <a:ext uri="{909E8E84-426E-40dd-AFC4-6F175D3DCCD1}">
-              <a14:hiddenFill xmlns="" xmlns:a14="http://schemas.microsoft.com/office/drawing/2010/main">
+              <a14:hiddenFill xmlns:a14="http://schemas.microsoft.com/office/drawing/2010/main" xmlns="">
                 <a:solidFill>
                   <a:srgbClr val="FFFFFF"/>
                 </a:solidFill>
               </a14:hiddenFill>
             </a:ext>
             <a:ext uri="{91240B29-F687-4f45-9708-019B960494DF}">
-              <a14:hiddenLine xmlns="" xmlns:a14="http://schemas.microsoft.com/office/drawing/2010/main" w="9525">
+              <a14:hiddenLine xmlns:a14="http://schemas.microsoft.com/office/drawing/2010/main" xmlns="" w="9525">
                 <a:solidFill>
                   <a:srgbClr val="000000"/>
                 </a:solidFill>
@@ -9790,14 +9790,14 @@
           </a:ln>
           <a:extLst>
             <a:ext uri="{909E8E84-426E-40dd-AFC4-6F175D3DCCD1}">
-              <a14:hiddenFill xmlns="" xmlns:a14="http://schemas.microsoft.com/office/drawing/2010/main">
+              <a14:hiddenFill xmlns:a14="http://schemas.microsoft.com/office/drawing/2010/main" xmlns="">
                 <a:solidFill>
                   <a:srgbClr val="FFFFFF"/>
                 </a:solidFill>
               </a14:hiddenFill>
             </a:ext>
             <a:ext uri="{91240B29-F687-4f45-9708-019B960494DF}">
-              <a14:hiddenLine xmlns="" xmlns:a14="http://schemas.microsoft.com/office/drawing/2010/main" w="9525">
+              <a14:hiddenLine xmlns:a14="http://schemas.microsoft.com/office/drawing/2010/main" xmlns="" w="9525">
                 <a:solidFill>
                   <a:srgbClr val="000000"/>
                 </a:solidFill>
@@ -11507,7 +11507,6 @@
               <a:rPr lang="en-US" dirty="0" smtClean="0"/>
               <a:t>Resource</a:t>
             </a:r>
-            <a:endParaRPr lang="en-US" dirty="0" smtClean="0"/>
           </a:p>
           <a:p>
             <a:r>
@@ -11570,7 +11569,7 @@
           <a:p>
             <a:r>
               <a:rPr lang="en-US" dirty="0" smtClean="0"/>
-              <a:t>Morning</a:t>
+              <a:t>Day 1</a:t>
             </a:r>
             <a:endParaRPr lang="en-US" dirty="0"/>
           </a:p>
@@ -11592,8 +11591,8 @@
           <a:lstStyle/>
           <a:p>
             <a:r>
-              <a:rPr lang="en-US" dirty="0" smtClean="0"/>
-              <a:t>Afternoon</a:t>
+              <a:rPr lang="en-US" smtClean="0"/>
+              <a:t>Day 2</a:t>
             </a:r>
             <a:endParaRPr lang="en-US" dirty="0"/>
           </a:p>

</xml_diff>

<commit_message>
Updates for release 2.1.0
The copyright year in the intro and patch slide have been
updated.
The appendix has been updated to specify new workstation.

Signed-off-by: Franklin Webber <franklin@chef.io>
</commit_message>
<xml_diff>
--- a/01-introduction.pptx
+++ b/01-introduction.pptx
@@ -236,6 +236,10 @@
             <a:pPr>
               <a:defRPr/>
             </a:pPr>
+            <a:r>
+              <a:rPr lang="en-US" smtClean="0"/>
+              <a:t>Chef Intermediate</a:t>
+            </a:r>
             <a:endParaRPr lang="en-US"/>
           </a:p>
         </p:txBody>
@@ -280,13 +284,10 @@
             <a:pPr>
               <a:defRPr/>
             </a:pPr>
-            <a:fld id="{04CB1577-BF96-2D40-B4CA-2BF6DA80CBA7}" type="datetime1">
-              <a:rPr lang="en-CA"/>
-              <a:pPr>
-                <a:defRPr/>
-              </a:pPr>
-              <a:t>2017-01-24</a:t>
-            </a:fld>
+            <a:r>
+              <a:rPr lang="en-US" smtClean="0"/>
+              <a:t>Chef Software, Inc.</a:t>
+            </a:r>
             <a:endParaRPr lang="en-US" dirty="0"/>
           </a:p>
         </p:txBody>
@@ -397,7 +398,7 @@
     </p:extLst>
   </p:cSld>
   <p:clrMap bg1="lt1" tx1="dk1" bg2="lt2" tx2="dk2" accent1="accent1" accent2="accent2" accent3="accent3" accent4="accent4" accent5="accent5" accent6="accent6" hlink="hlink" folHlink="folHlink"/>
-  <p:hf dt="0"/>
+  <p:hf sldNum="0" ftr="0"/>
 </p:handoutMaster>
 </file>
 
@@ -435,7 +436,7 @@
         </p:nvSpPr>
         <p:spPr>
           <a:xfrm>
-            <a:off x="3884613" y="0"/>
+            <a:off x="3884613" y="108860"/>
             <a:ext cx="2971800" cy="457200"/>
           </a:xfrm>
           <a:prstGeom prst="rect">
@@ -463,13 +464,10 @@
             <a:pPr>
               <a:defRPr/>
             </a:pPr>
-            <a:fld id="{72FDBE47-C34F-CF4A-9709-1411AD5B3286}" type="datetime1">
-              <a:rPr lang="en-CA"/>
-              <a:pPr>
-                <a:defRPr/>
-              </a:pPr>
-              <a:t>2017-01-24</a:t>
-            </a:fld>
+            <a:r>
+              <a:rPr lang="en-US" smtClean="0"/>
+              <a:t>Chef Software, Inc.</a:t>
+            </a:r>
             <a:endParaRPr lang="en-US" dirty="0"/>
           </a:p>
         </p:txBody>
@@ -520,8 +518,8 @@
         </p:nvSpPr>
         <p:spPr>
           <a:xfrm>
-            <a:off x="685800" y="4343400"/>
-            <a:ext cx="5486400" cy="4114800"/>
+            <a:off x="381000" y="4343399"/>
+            <a:ext cx="6096000" cy="4386943"/>
           </a:xfrm>
           <a:prstGeom prst="rect">
             <a:avLst/>
@@ -572,68 +570,17 @@
       </p:sp>
       <p:sp>
         <p:nvSpPr>
-          <p:cNvPr id="7" name="Slide Number Placeholder 6"/>
+          <p:cNvPr id="8" name="Header Placeholder 1"/>
           <p:cNvSpPr>
             <a:spLocks noGrp="1"/>
           </p:cNvSpPr>
           <p:nvPr>
-            <p:ph type="sldNum" sz="quarter" idx="5"/>
+            <p:ph type="hdr" sz="quarter"/>
           </p:nvPr>
         </p:nvSpPr>
         <p:spPr>
           <a:xfrm>
-            <a:off x="6172200" y="8685213"/>
-            <a:ext cx="684213" cy="457200"/>
-          </a:xfrm>
-          <a:prstGeom prst="rect">
-            <a:avLst/>
-          </a:prstGeom>
-        </p:spPr>
-        <p:txBody>
-          <a:bodyPr vert="horz" lIns="91440" tIns="45720" rIns="91440" bIns="45720" rtlCol="0" anchor="b"/>
-          <a:lstStyle>
-            <a:lvl1pPr algn="r" defTabSz="1219120" fontAlgn="auto">
-              <a:spcBef>
-                <a:spcPts val="0"/>
-              </a:spcBef>
-              <a:spcAft>
-                <a:spcPts val="0"/>
-              </a:spcAft>
-              <a:defRPr sz="1200" smtClean="0">
-                <a:latin typeface="Arial" panose="020B0604020202020204" pitchFamily="34" charset="0"/>
-                <a:ea typeface="+mn-ea"/>
-                <a:cs typeface="Arial" panose="020B0604020202020204" pitchFamily="34" charset="0"/>
-              </a:defRPr>
-            </a:lvl1pPr>
-          </a:lstStyle>
-          <a:p>
-            <a:pPr>
-              <a:defRPr/>
-            </a:pPr>
-            <a:fld id="{DC3734AA-3150-D947-AC52-2F5DF48BFCD5}" type="slidenum">
-              <a:rPr lang="en-US"/>
-              <a:pPr>
-                <a:defRPr/>
-              </a:pPr>
-              <a:t>‹#›</a:t>
-            </a:fld>
-            <a:endParaRPr lang="en-US" dirty="0"/>
-          </a:p>
-        </p:txBody>
-      </p:sp>
-      <p:sp>
-        <p:nvSpPr>
-          <p:cNvPr id="8" name="Header Placeholder 1"/>
-          <p:cNvSpPr>
-            <a:spLocks noGrp="1"/>
-          </p:cNvSpPr>
-          <p:nvPr>
-            <p:ph type="hdr" sz="quarter"/>
-          </p:nvPr>
-        </p:nvSpPr>
-        <p:spPr>
-          <a:xfrm>
-            <a:off x="0" y="0"/>
+            <a:off x="0" y="108860"/>
             <a:ext cx="2971800" cy="457200"/>
           </a:xfrm>
           <a:prstGeom prst="rect">
@@ -661,54 +608,11 @@
             <a:pPr>
               <a:defRPr/>
             </a:pPr>
-            <a:endParaRPr lang="en-US"/>
-          </a:p>
-        </p:txBody>
-      </p:sp>
-      <p:sp>
-        <p:nvSpPr>
-          <p:cNvPr id="9" name="Footer Placeholder 3"/>
-          <p:cNvSpPr>
-            <a:spLocks noGrp="1"/>
-          </p:cNvSpPr>
-          <p:nvPr>
-            <p:ph type="ftr" sz="quarter" idx="4"/>
-          </p:nvPr>
-        </p:nvSpPr>
-        <p:spPr>
-          <a:xfrm>
-            <a:off x="0" y="8685213"/>
-            <a:ext cx="6248400" cy="457200"/>
-          </a:xfrm>
-          <a:prstGeom prst="rect">
-            <a:avLst/>
-          </a:prstGeom>
-        </p:spPr>
-        <p:txBody>
-          <a:bodyPr vert="horz" lIns="91440" tIns="45720" rIns="91440" bIns="45720" rtlCol="0" anchor="b"/>
-          <a:lstStyle>
-            <a:lvl1pPr algn="l" defTabSz="1219120" fontAlgn="auto">
-              <a:spcBef>
-                <a:spcPts val="0"/>
-              </a:spcBef>
-              <a:spcAft>
-                <a:spcPts val="0"/>
-              </a:spcAft>
-              <a:defRPr sz="900" dirty="0" smtClean="0">
-                <a:solidFill>
-                  <a:srgbClr val="000000"/>
-                </a:solidFill>
-                <a:latin typeface="Arial" panose="020B0604020202020204" pitchFamily="34" charset="0"/>
-                <a:ea typeface="+mn-ea"/>
-                <a:cs typeface="Arial" panose="020B0604020202020204" pitchFamily="34" charset="0"/>
-              </a:defRPr>
-            </a:lvl1pPr>
-          </a:lstStyle>
-          <a:p>
-            <a:pPr>
-              <a:defRPr/>
-            </a:pPr>
-            <a:endParaRPr lang="en-US"/>
+            <a:r>
+              <a:rPr lang="en-US" smtClean="0"/>
+              <a:t>Chef Intermediate</a:t>
+            </a:r>
+            <a:endParaRPr lang="en-US" dirty="0"/>
           </a:p>
         </p:txBody>
       </p:sp>
@@ -720,7 +624,7 @@
     </p:extLst>
   </p:cSld>
   <p:clrMap bg1="lt1" tx1="dk1" bg2="lt2" tx2="dk2" accent1="accent1" accent2="accent2" accent3="accent3" accent4="accent4" accent5="accent5" accent6="accent6" hlink="hlink" folHlink="folHlink"/>
-  <p:hf dt="0"/>
+  <p:hf sldNum="0" ftr="0"/>
   <p:notesStyle>
     <a:lvl1pPr algn="l" defTabSz="1217613" rtl="0" fontAlgn="base">
       <a:lnSpc>
@@ -923,12 +827,12 @@
       </p:sp>
       <p:sp>
         <p:nvSpPr>
-          <p:cNvPr id="4" name="Slide Number Placeholder 3"/>
+          <p:cNvPr id="5" name="Header Placeholder 4"/>
           <p:cNvSpPr>
             <a:spLocks noGrp="1"/>
           </p:cNvSpPr>
           <p:nvPr>
-            <p:ph type="sldNum" sz="quarter" idx="10"/>
+            <p:ph type="hdr" sz="quarter" idx="11"/>
           </p:nvPr>
         </p:nvSpPr>
         <p:spPr/>
@@ -939,25 +843,22 @@
             <a:pPr>
               <a:defRPr/>
             </a:pPr>
-            <a:fld id="{DC3734AA-3150-D947-AC52-2F5DF48BFCD5}" type="slidenum">
+            <a:r>
               <a:rPr lang="en-US" smtClean="0"/>
-              <a:pPr>
-                <a:defRPr/>
-              </a:pPr>
-              <a:t>1</a:t>
-            </a:fld>
-            <a:endParaRPr lang="en-US" dirty="0"/>
-          </a:p>
-        </p:txBody>
-      </p:sp>
-      <p:sp>
-        <p:nvSpPr>
-          <p:cNvPr id="5" name="Header Placeholder 4"/>
+              <a:t>Chef Intermediate</a:t>
+            </a:r>
+            <a:endParaRPr lang="en-US"/>
+          </a:p>
+        </p:txBody>
+      </p:sp>
+      <p:sp>
+        <p:nvSpPr>
+          <p:cNvPr id="7" name="Date Placeholder 6"/>
           <p:cNvSpPr>
             <a:spLocks noGrp="1"/>
           </p:cNvSpPr>
           <p:nvPr>
-            <p:ph type="hdr" sz="quarter" idx="11"/>
+            <p:ph type="dt" idx="13"/>
           </p:nvPr>
         </p:nvSpPr>
         <p:spPr/>
@@ -968,29 +869,11 @@
             <a:pPr>
               <a:defRPr/>
             </a:pPr>
-            <a:endParaRPr lang="en-US"/>
-          </a:p>
-        </p:txBody>
-      </p:sp>
-      <p:sp>
-        <p:nvSpPr>
-          <p:cNvPr id="6" name="Footer Placeholder 5"/>
-          <p:cNvSpPr>
-            <a:spLocks noGrp="1"/>
-          </p:cNvSpPr>
-          <p:nvPr>
-            <p:ph type="ftr" sz="quarter" idx="12"/>
-          </p:nvPr>
-        </p:nvSpPr>
-        <p:spPr/>
-        <p:txBody>
-          <a:bodyPr/>
-          <a:lstStyle/>
-          <a:p>
-            <a:pPr>
-              <a:defRPr/>
-            </a:pPr>
-            <a:endParaRPr lang="en-US"/>
+            <a:r>
+              <a:rPr lang="en-US" smtClean="0"/>
+              <a:t>Chef Software, Inc.</a:t>
+            </a:r>
+            <a:endParaRPr lang="en-US" dirty="0"/>
           </a:p>
         </p:txBody>
       </p:sp>
@@ -1078,12 +961,12 @@
       </p:sp>
       <p:sp>
         <p:nvSpPr>
-          <p:cNvPr id="4" name="Slide Number Placeholder 3"/>
+          <p:cNvPr id="5" name="Header Placeholder 4"/>
           <p:cNvSpPr>
             <a:spLocks noGrp="1"/>
           </p:cNvSpPr>
           <p:nvPr>
-            <p:ph type="sldNum" sz="quarter" idx="10"/>
+            <p:ph type="hdr" sz="quarter" idx="11"/>
           </p:nvPr>
         </p:nvSpPr>
         <p:spPr/>
@@ -1094,25 +977,22 @@
             <a:pPr>
               <a:defRPr/>
             </a:pPr>
-            <a:fld id="{DC3734AA-3150-D947-AC52-2F5DF48BFCD5}" type="slidenum">
+            <a:r>
               <a:rPr lang="en-US" smtClean="0"/>
-              <a:pPr>
-                <a:defRPr/>
-              </a:pPr>
-              <a:t>10</a:t>
-            </a:fld>
-            <a:endParaRPr lang="en-US" dirty="0"/>
-          </a:p>
-        </p:txBody>
-      </p:sp>
-      <p:sp>
-        <p:nvSpPr>
-          <p:cNvPr id="5" name="Header Placeholder 4"/>
+              <a:t>Chef Intermediate</a:t>
+            </a:r>
+            <a:endParaRPr lang="en-US"/>
+          </a:p>
+        </p:txBody>
+      </p:sp>
+      <p:sp>
+        <p:nvSpPr>
+          <p:cNvPr id="7" name="Date Placeholder 6"/>
           <p:cNvSpPr>
             <a:spLocks noGrp="1"/>
           </p:cNvSpPr>
           <p:nvPr>
-            <p:ph type="hdr" sz="quarter" idx="11"/>
+            <p:ph type="dt" idx="13"/>
           </p:nvPr>
         </p:nvSpPr>
         <p:spPr/>
@@ -1123,29 +1003,11 @@
             <a:pPr>
               <a:defRPr/>
             </a:pPr>
-            <a:endParaRPr lang="en-US"/>
-          </a:p>
-        </p:txBody>
-      </p:sp>
-      <p:sp>
-        <p:nvSpPr>
-          <p:cNvPr id="6" name="Footer Placeholder 5"/>
-          <p:cNvSpPr>
-            <a:spLocks noGrp="1"/>
-          </p:cNvSpPr>
-          <p:nvPr>
-            <p:ph type="ftr" sz="quarter" idx="12"/>
-          </p:nvPr>
-        </p:nvSpPr>
-        <p:spPr/>
-        <p:txBody>
-          <a:bodyPr/>
-          <a:lstStyle/>
-          <a:p>
-            <a:pPr>
-              <a:defRPr/>
-            </a:pPr>
-            <a:endParaRPr lang="en-US"/>
+            <a:r>
+              <a:rPr lang="en-US" smtClean="0"/>
+              <a:t>Chef Software, Inc.</a:t>
+            </a:r>
+            <a:endParaRPr lang="en-US" dirty="0"/>
           </a:p>
         </p:txBody>
       </p:sp>
@@ -1224,12 +1086,12 @@
       </p:sp>
       <p:sp>
         <p:nvSpPr>
-          <p:cNvPr id="4" name="Slide Number Placeholder 3"/>
+          <p:cNvPr id="5" name="Header Placeholder 4"/>
           <p:cNvSpPr>
             <a:spLocks noGrp="1"/>
           </p:cNvSpPr>
           <p:nvPr>
-            <p:ph type="sldNum" sz="quarter" idx="10"/>
+            <p:ph type="hdr" sz="quarter" idx="11"/>
           </p:nvPr>
         </p:nvSpPr>
         <p:spPr/>
@@ -1240,25 +1102,22 @@
             <a:pPr>
               <a:defRPr/>
             </a:pPr>
-            <a:fld id="{DC3734AA-3150-D947-AC52-2F5DF48BFCD5}" type="slidenum">
+            <a:r>
               <a:rPr lang="en-US" smtClean="0"/>
-              <a:pPr>
-                <a:defRPr/>
-              </a:pPr>
-              <a:t>11</a:t>
-            </a:fld>
-            <a:endParaRPr lang="en-US" dirty="0"/>
-          </a:p>
-        </p:txBody>
-      </p:sp>
-      <p:sp>
-        <p:nvSpPr>
-          <p:cNvPr id="5" name="Header Placeholder 4"/>
+              <a:t>Chef Intermediate</a:t>
+            </a:r>
+            <a:endParaRPr lang="en-US"/>
+          </a:p>
+        </p:txBody>
+      </p:sp>
+      <p:sp>
+        <p:nvSpPr>
+          <p:cNvPr id="7" name="Date Placeholder 6"/>
           <p:cNvSpPr>
             <a:spLocks noGrp="1"/>
           </p:cNvSpPr>
           <p:nvPr>
-            <p:ph type="hdr" sz="quarter" idx="11"/>
+            <p:ph type="dt" idx="13"/>
           </p:nvPr>
         </p:nvSpPr>
         <p:spPr/>
@@ -1269,29 +1128,11 @@
             <a:pPr>
               <a:defRPr/>
             </a:pPr>
-            <a:endParaRPr lang="en-US"/>
-          </a:p>
-        </p:txBody>
-      </p:sp>
-      <p:sp>
-        <p:nvSpPr>
-          <p:cNvPr id="6" name="Footer Placeholder 5"/>
-          <p:cNvSpPr>
-            <a:spLocks noGrp="1"/>
-          </p:cNvSpPr>
-          <p:nvPr>
-            <p:ph type="ftr" sz="quarter" idx="12"/>
-          </p:nvPr>
-        </p:nvSpPr>
-        <p:spPr/>
-        <p:txBody>
-          <a:bodyPr/>
-          <a:lstStyle/>
-          <a:p>
-            <a:pPr>
-              <a:defRPr/>
-            </a:pPr>
-            <a:endParaRPr lang="en-US"/>
+            <a:r>
+              <a:rPr lang="en-US" smtClean="0"/>
+              <a:t>Chef Software, Inc.</a:t>
+            </a:r>
+            <a:endParaRPr lang="en-US" dirty="0"/>
           </a:p>
         </p:txBody>
       </p:sp>
@@ -1358,12 +1199,12 @@
       </p:sp>
       <p:sp>
         <p:nvSpPr>
-          <p:cNvPr id="4" name="Slide Number Placeholder 3"/>
+          <p:cNvPr id="5" name="Header Placeholder 4"/>
           <p:cNvSpPr>
             <a:spLocks noGrp="1"/>
           </p:cNvSpPr>
           <p:nvPr>
-            <p:ph type="sldNum" sz="quarter" idx="10"/>
+            <p:ph type="hdr" sz="quarter" idx="11"/>
           </p:nvPr>
         </p:nvSpPr>
         <p:spPr/>
@@ -1374,25 +1215,22 @@
             <a:pPr>
               <a:defRPr/>
             </a:pPr>
-            <a:fld id="{DC3734AA-3150-D947-AC52-2F5DF48BFCD5}" type="slidenum">
+            <a:r>
               <a:rPr lang="en-US" smtClean="0"/>
-              <a:pPr>
-                <a:defRPr/>
-              </a:pPr>
-              <a:t>12</a:t>
-            </a:fld>
-            <a:endParaRPr lang="en-US" dirty="0"/>
-          </a:p>
-        </p:txBody>
-      </p:sp>
-      <p:sp>
-        <p:nvSpPr>
-          <p:cNvPr id="5" name="Header Placeholder 4"/>
+              <a:t>Chef Intermediate</a:t>
+            </a:r>
+            <a:endParaRPr lang="en-US"/>
+          </a:p>
+        </p:txBody>
+      </p:sp>
+      <p:sp>
+        <p:nvSpPr>
+          <p:cNvPr id="7" name="Date Placeholder 6"/>
           <p:cNvSpPr>
             <a:spLocks noGrp="1"/>
           </p:cNvSpPr>
           <p:nvPr>
-            <p:ph type="hdr" sz="quarter" idx="11"/>
+            <p:ph type="dt" idx="13"/>
           </p:nvPr>
         </p:nvSpPr>
         <p:spPr/>
@@ -1403,29 +1241,11 @@
             <a:pPr>
               <a:defRPr/>
             </a:pPr>
-            <a:endParaRPr lang="en-US"/>
-          </a:p>
-        </p:txBody>
-      </p:sp>
-      <p:sp>
-        <p:nvSpPr>
-          <p:cNvPr id="6" name="Footer Placeholder 5"/>
-          <p:cNvSpPr>
-            <a:spLocks noGrp="1"/>
-          </p:cNvSpPr>
-          <p:nvPr>
-            <p:ph type="ftr" sz="quarter" idx="12"/>
-          </p:nvPr>
-        </p:nvSpPr>
-        <p:spPr/>
-        <p:txBody>
-          <a:bodyPr/>
-          <a:lstStyle/>
-          <a:p>
-            <a:pPr>
-              <a:defRPr/>
-            </a:pPr>
-            <a:endParaRPr lang="en-US"/>
+            <a:r>
+              <a:rPr lang="en-US" smtClean="0"/>
+              <a:t>Chef Software, Inc.</a:t>
+            </a:r>
+            <a:endParaRPr lang="en-US" dirty="0"/>
           </a:p>
         </p:txBody>
       </p:sp>
@@ -1509,12 +1329,12 @@
       </p:sp>
       <p:sp>
         <p:nvSpPr>
-          <p:cNvPr id="4" name="Slide Number Placeholder 3"/>
+          <p:cNvPr id="5" name="Header Placeholder 4"/>
           <p:cNvSpPr>
             <a:spLocks noGrp="1"/>
           </p:cNvSpPr>
           <p:nvPr>
-            <p:ph type="sldNum" sz="quarter" idx="10"/>
+            <p:ph type="hdr" sz="quarter" idx="11"/>
           </p:nvPr>
         </p:nvSpPr>
         <p:spPr/>
@@ -1525,25 +1345,22 @@
             <a:pPr>
               <a:defRPr/>
             </a:pPr>
-            <a:fld id="{DC3734AA-3150-D947-AC52-2F5DF48BFCD5}" type="slidenum">
+            <a:r>
               <a:rPr lang="en-US" smtClean="0"/>
-              <a:pPr>
-                <a:defRPr/>
-              </a:pPr>
-              <a:t>2</a:t>
-            </a:fld>
-            <a:endParaRPr lang="en-US" dirty="0"/>
-          </a:p>
-        </p:txBody>
-      </p:sp>
-      <p:sp>
-        <p:nvSpPr>
-          <p:cNvPr id="5" name="Header Placeholder 4"/>
+              <a:t>Chef Intermediate</a:t>
+            </a:r>
+            <a:endParaRPr lang="en-US"/>
+          </a:p>
+        </p:txBody>
+      </p:sp>
+      <p:sp>
+        <p:nvSpPr>
+          <p:cNvPr id="7" name="Date Placeholder 6"/>
           <p:cNvSpPr>
             <a:spLocks noGrp="1"/>
           </p:cNvSpPr>
           <p:nvPr>
-            <p:ph type="hdr" sz="quarter" idx="11"/>
+            <p:ph type="dt" idx="13"/>
           </p:nvPr>
         </p:nvSpPr>
         <p:spPr/>
@@ -1554,29 +1371,11 @@
             <a:pPr>
               <a:defRPr/>
             </a:pPr>
-            <a:endParaRPr lang="en-US"/>
-          </a:p>
-        </p:txBody>
-      </p:sp>
-      <p:sp>
-        <p:nvSpPr>
-          <p:cNvPr id="6" name="Footer Placeholder 5"/>
-          <p:cNvSpPr>
-            <a:spLocks noGrp="1"/>
-          </p:cNvSpPr>
-          <p:nvPr>
-            <p:ph type="ftr" sz="quarter" idx="12"/>
-          </p:nvPr>
-        </p:nvSpPr>
-        <p:spPr/>
-        <p:txBody>
-          <a:bodyPr/>
-          <a:lstStyle/>
-          <a:p>
-            <a:pPr>
-              <a:defRPr/>
-            </a:pPr>
-            <a:endParaRPr lang="en-US"/>
+            <a:r>
+              <a:rPr lang="en-US" smtClean="0"/>
+              <a:t>Chef Software, Inc.</a:t>
+            </a:r>
+            <a:endParaRPr lang="en-US" dirty="0"/>
           </a:p>
         </p:txBody>
       </p:sp>
@@ -1677,12 +1476,12 @@
       </p:sp>
       <p:sp>
         <p:nvSpPr>
-          <p:cNvPr id="4" name="Slide Number Placeholder 3"/>
+          <p:cNvPr id="5" name="Header Placeholder 4"/>
           <p:cNvSpPr>
             <a:spLocks noGrp="1"/>
           </p:cNvSpPr>
           <p:nvPr>
-            <p:ph type="sldNum" sz="quarter" idx="10"/>
+            <p:ph type="hdr" sz="quarter" idx="11"/>
           </p:nvPr>
         </p:nvSpPr>
         <p:spPr/>
@@ -1693,25 +1492,22 @@
             <a:pPr>
               <a:defRPr/>
             </a:pPr>
-            <a:fld id="{DC3734AA-3150-D947-AC52-2F5DF48BFCD5}" type="slidenum">
+            <a:r>
               <a:rPr lang="en-US" smtClean="0"/>
-              <a:pPr>
-                <a:defRPr/>
-              </a:pPr>
-              <a:t>3</a:t>
-            </a:fld>
-            <a:endParaRPr lang="en-US" dirty="0"/>
-          </a:p>
-        </p:txBody>
-      </p:sp>
-      <p:sp>
-        <p:nvSpPr>
-          <p:cNvPr id="5" name="Header Placeholder 4"/>
+              <a:t>Chef Intermediate</a:t>
+            </a:r>
+            <a:endParaRPr lang="en-US"/>
+          </a:p>
+        </p:txBody>
+      </p:sp>
+      <p:sp>
+        <p:nvSpPr>
+          <p:cNvPr id="7" name="Date Placeholder 6"/>
           <p:cNvSpPr>
             <a:spLocks noGrp="1"/>
           </p:cNvSpPr>
           <p:nvPr>
-            <p:ph type="hdr" sz="quarter" idx="11"/>
+            <p:ph type="dt" idx="13"/>
           </p:nvPr>
         </p:nvSpPr>
         <p:spPr/>
@@ -1722,29 +1518,11 @@
             <a:pPr>
               <a:defRPr/>
             </a:pPr>
-            <a:endParaRPr lang="en-US"/>
-          </a:p>
-        </p:txBody>
-      </p:sp>
-      <p:sp>
-        <p:nvSpPr>
-          <p:cNvPr id="6" name="Footer Placeholder 5"/>
-          <p:cNvSpPr>
-            <a:spLocks noGrp="1"/>
-          </p:cNvSpPr>
-          <p:nvPr>
-            <p:ph type="ftr" sz="quarter" idx="12"/>
-          </p:nvPr>
-        </p:nvSpPr>
-        <p:spPr/>
-        <p:txBody>
-          <a:bodyPr/>
-          <a:lstStyle/>
-          <a:p>
-            <a:pPr>
-              <a:defRPr/>
-            </a:pPr>
-            <a:endParaRPr lang="en-US"/>
+            <a:r>
+              <a:rPr lang="en-US" smtClean="0"/>
+              <a:t>Chef Software, Inc.</a:t>
+            </a:r>
+            <a:endParaRPr lang="en-US" dirty="0"/>
           </a:p>
         </p:txBody>
       </p:sp>
@@ -1827,12 +1605,12 @@
       </p:sp>
       <p:sp>
         <p:nvSpPr>
-          <p:cNvPr id="4" name="Slide Number Placeholder 3"/>
+          <p:cNvPr id="5" name="Header Placeholder 4"/>
           <p:cNvSpPr>
             <a:spLocks noGrp="1"/>
           </p:cNvSpPr>
           <p:nvPr>
-            <p:ph type="sldNum" sz="quarter" idx="10"/>
+            <p:ph type="hdr" sz="quarter" idx="11"/>
           </p:nvPr>
         </p:nvSpPr>
         <p:spPr/>
@@ -1843,25 +1621,22 @@
             <a:pPr>
               <a:defRPr/>
             </a:pPr>
-            <a:fld id="{DC3734AA-3150-D947-AC52-2F5DF48BFCD5}" type="slidenum">
+            <a:r>
               <a:rPr lang="en-US" smtClean="0"/>
-              <a:pPr>
-                <a:defRPr/>
-              </a:pPr>
-              <a:t>4</a:t>
-            </a:fld>
-            <a:endParaRPr lang="en-US" dirty="0"/>
-          </a:p>
-        </p:txBody>
-      </p:sp>
-      <p:sp>
-        <p:nvSpPr>
-          <p:cNvPr id="5" name="Header Placeholder 4"/>
+              <a:t>Chef Intermediate</a:t>
+            </a:r>
+            <a:endParaRPr lang="en-US"/>
+          </a:p>
+        </p:txBody>
+      </p:sp>
+      <p:sp>
+        <p:nvSpPr>
+          <p:cNvPr id="7" name="Date Placeholder 6"/>
           <p:cNvSpPr>
             <a:spLocks noGrp="1"/>
           </p:cNvSpPr>
           <p:nvPr>
-            <p:ph type="hdr" sz="quarter" idx="11"/>
+            <p:ph type="dt" idx="13"/>
           </p:nvPr>
         </p:nvSpPr>
         <p:spPr/>
@@ -1872,29 +1647,11 @@
             <a:pPr>
               <a:defRPr/>
             </a:pPr>
-            <a:endParaRPr lang="en-US"/>
-          </a:p>
-        </p:txBody>
-      </p:sp>
-      <p:sp>
-        <p:nvSpPr>
-          <p:cNvPr id="6" name="Footer Placeholder 5"/>
-          <p:cNvSpPr>
-            <a:spLocks noGrp="1"/>
-          </p:cNvSpPr>
-          <p:nvPr>
-            <p:ph type="ftr" sz="quarter" idx="12"/>
-          </p:nvPr>
-        </p:nvSpPr>
-        <p:spPr/>
-        <p:txBody>
-          <a:bodyPr/>
-          <a:lstStyle/>
-          <a:p>
-            <a:pPr>
-              <a:defRPr/>
-            </a:pPr>
-            <a:endParaRPr lang="en-US"/>
+            <a:r>
+              <a:rPr lang="en-US" smtClean="0"/>
+              <a:t>Chef Software, Inc.</a:t>
+            </a:r>
+            <a:endParaRPr lang="en-US" dirty="0"/>
           </a:p>
         </p:txBody>
       </p:sp>
@@ -1969,12 +1726,12 @@
       </p:sp>
       <p:sp>
         <p:nvSpPr>
-          <p:cNvPr id="4" name="Slide Number Placeholder 3"/>
+          <p:cNvPr id="5" name="Header Placeholder 4"/>
           <p:cNvSpPr>
             <a:spLocks noGrp="1"/>
           </p:cNvSpPr>
           <p:nvPr>
-            <p:ph type="sldNum" sz="quarter" idx="10"/>
+            <p:ph type="hdr" sz="quarter" idx="11"/>
           </p:nvPr>
         </p:nvSpPr>
         <p:spPr/>
@@ -1985,25 +1742,22 @@
             <a:pPr>
               <a:defRPr/>
             </a:pPr>
-            <a:fld id="{DC3734AA-3150-D947-AC52-2F5DF48BFCD5}" type="slidenum">
+            <a:r>
               <a:rPr lang="en-US" smtClean="0"/>
-              <a:pPr>
-                <a:defRPr/>
-              </a:pPr>
-              <a:t>5</a:t>
-            </a:fld>
-            <a:endParaRPr lang="en-US" dirty="0"/>
-          </a:p>
-        </p:txBody>
-      </p:sp>
-      <p:sp>
-        <p:nvSpPr>
-          <p:cNvPr id="5" name="Header Placeholder 4"/>
+              <a:t>Chef Intermediate</a:t>
+            </a:r>
+            <a:endParaRPr lang="en-US"/>
+          </a:p>
+        </p:txBody>
+      </p:sp>
+      <p:sp>
+        <p:nvSpPr>
+          <p:cNvPr id="7" name="Date Placeholder 6"/>
           <p:cNvSpPr>
             <a:spLocks noGrp="1"/>
           </p:cNvSpPr>
           <p:nvPr>
-            <p:ph type="hdr" sz="quarter" idx="11"/>
+            <p:ph type="dt" idx="13"/>
           </p:nvPr>
         </p:nvSpPr>
         <p:spPr/>
@@ -2014,29 +1768,11 @@
             <a:pPr>
               <a:defRPr/>
             </a:pPr>
-            <a:endParaRPr lang="en-US"/>
-          </a:p>
-        </p:txBody>
-      </p:sp>
-      <p:sp>
-        <p:nvSpPr>
-          <p:cNvPr id="6" name="Footer Placeholder 5"/>
-          <p:cNvSpPr>
-            <a:spLocks noGrp="1"/>
-          </p:cNvSpPr>
-          <p:nvPr>
-            <p:ph type="ftr" sz="quarter" idx="12"/>
-          </p:nvPr>
-        </p:nvSpPr>
-        <p:spPr/>
-        <p:txBody>
-          <a:bodyPr/>
-          <a:lstStyle/>
-          <a:p>
-            <a:pPr>
-              <a:defRPr/>
-            </a:pPr>
-            <a:endParaRPr lang="en-US"/>
+            <a:r>
+              <a:rPr lang="en-US" smtClean="0"/>
+              <a:t>Chef Software, Inc.</a:t>
+            </a:r>
+            <a:endParaRPr lang="en-US" dirty="0"/>
           </a:p>
         </p:txBody>
       </p:sp>
@@ -2111,12 +1847,12 @@
       </p:sp>
       <p:sp>
         <p:nvSpPr>
-          <p:cNvPr id="4" name="Slide Number Placeholder 3"/>
+          <p:cNvPr id="5" name="Header Placeholder 4"/>
           <p:cNvSpPr>
             <a:spLocks noGrp="1"/>
           </p:cNvSpPr>
           <p:nvPr>
-            <p:ph type="sldNum" sz="quarter" idx="10"/>
+            <p:ph type="hdr" sz="quarter" idx="11"/>
           </p:nvPr>
         </p:nvSpPr>
         <p:spPr/>
@@ -2127,25 +1863,22 @@
             <a:pPr>
               <a:defRPr/>
             </a:pPr>
-            <a:fld id="{DC3734AA-3150-D947-AC52-2F5DF48BFCD5}" type="slidenum">
+            <a:r>
               <a:rPr lang="en-US" smtClean="0"/>
-              <a:pPr>
-                <a:defRPr/>
-              </a:pPr>
-              <a:t>6</a:t>
-            </a:fld>
-            <a:endParaRPr lang="en-US" dirty="0"/>
-          </a:p>
-        </p:txBody>
-      </p:sp>
-      <p:sp>
-        <p:nvSpPr>
-          <p:cNvPr id="5" name="Header Placeholder 4"/>
+              <a:t>Chef Intermediate</a:t>
+            </a:r>
+            <a:endParaRPr lang="en-US"/>
+          </a:p>
+        </p:txBody>
+      </p:sp>
+      <p:sp>
+        <p:nvSpPr>
+          <p:cNvPr id="7" name="Date Placeholder 6"/>
           <p:cNvSpPr>
             <a:spLocks noGrp="1"/>
           </p:cNvSpPr>
           <p:nvPr>
-            <p:ph type="hdr" sz="quarter" idx="11"/>
+            <p:ph type="dt" idx="13"/>
           </p:nvPr>
         </p:nvSpPr>
         <p:spPr/>
@@ -2156,29 +1889,11 @@
             <a:pPr>
               <a:defRPr/>
             </a:pPr>
-            <a:endParaRPr lang="en-US"/>
-          </a:p>
-        </p:txBody>
-      </p:sp>
-      <p:sp>
-        <p:nvSpPr>
-          <p:cNvPr id="6" name="Footer Placeholder 5"/>
-          <p:cNvSpPr>
-            <a:spLocks noGrp="1"/>
-          </p:cNvSpPr>
-          <p:nvPr>
-            <p:ph type="ftr" sz="quarter" idx="12"/>
-          </p:nvPr>
-        </p:nvSpPr>
-        <p:spPr/>
-        <p:txBody>
-          <a:bodyPr/>
-          <a:lstStyle/>
-          <a:p>
-            <a:pPr>
-              <a:defRPr/>
-            </a:pPr>
-            <a:endParaRPr lang="en-US"/>
+            <a:r>
+              <a:rPr lang="en-US" smtClean="0"/>
+              <a:t>Chef Software, Inc.</a:t>
+            </a:r>
+            <a:endParaRPr lang="en-US" dirty="0"/>
           </a:p>
         </p:txBody>
       </p:sp>
@@ -2329,12 +2044,12 @@
       </p:sp>
       <p:sp>
         <p:nvSpPr>
-          <p:cNvPr id="4" name="Slide Number Placeholder 3"/>
+          <p:cNvPr id="5" name="Header Placeholder 4"/>
           <p:cNvSpPr>
             <a:spLocks noGrp="1"/>
           </p:cNvSpPr>
           <p:nvPr>
-            <p:ph type="sldNum" sz="quarter" idx="10"/>
+            <p:ph type="hdr" sz="quarter" idx="11"/>
           </p:nvPr>
         </p:nvSpPr>
         <p:spPr/>
@@ -2345,25 +2060,22 @@
             <a:pPr>
               <a:defRPr/>
             </a:pPr>
-            <a:fld id="{DC3734AA-3150-D947-AC52-2F5DF48BFCD5}" type="slidenum">
+            <a:r>
               <a:rPr lang="en-US" smtClean="0"/>
-              <a:pPr>
-                <a:defRPr/>
-              </a:pPr>
-              <a:t>7</a:t>
-            </a:fld>
-            <a:endParaRPr lang="en-US" dirty="0"/>
-          </a:p>
-        </p:txBody>
-      </p:sp>
-      <p:sp>
-        <p:nvSpPr>
-          <p:cNvPr id="5" name="Header Placeholder 4"/>
+              <a:t>Chef Intermediate</a:t>
+            </a:r>
+            <a:endParaRPr lang="en-US"/>
+          </a:p>
+        </p:txBody>
+      </p:sp>
+      <p:sp>
+        <p:nvSpPr>
+          <p:cNvPr id="7" name="Date Placeholder 6"/>
           <p:cNvSpPr>
             <a:spLocks noGrp="1"/>
           </p:cNvSpPr>
           <p:nvPr>
-            <p:ph type="hdr" sz="quarter" idx="11"/>
+            <p:ph type="dt" idx="13"/>
           </p:nvPr>
         </p:nvSpPr>
         <p:spPr/>
@@ -2374,29 +2086,11 @@
             <a:pPr>
               <a:defRPr/>
             </a:pPr>
-            <a:endParaRPr lang="en-US"/>
-          </a:p>
-        </p:txBody>
-      </p:sp>
-      <p:sp>
-        <p:nvSpPr>
-          <p:cNvPr id="6" name="Footer Placeholder 5"/>
-          <p:cNvSpPr>
-            <a:spLocks noGrp="1"/>
-          </p:cNvSpPr>
-          <p:nvPr>
-            <p:ph type="ftr" sz="quarter" idx="12"/>
-          </p:nvPr>
-        </p:nvSpPr>
-        <p:spPr/>
-        <p:txBody>
-          <a:bodyPr/>
-          <a:lstStyle/>
-          <a:p>
-            <a:pPr>
-              <a:defRPr/>
-            </a:pPr>
-            <a:endParaRPr lang="en-US"/>
+            <a:r>
+              <a:rPr lang="en-US" smtClean="0"/>
+              <a:t>Chef Software, Inc.</a:t>
+            </a:r>
+            <a:endParaRPr lang="en-US" dirty="0"/>
           </a:p>
         </p:txBody>
       </p:sp>
@@ -2487,12 +2181,12 @@
       </p:sp>
       <p:sp>
         <p:nvSpPr>
-          <p:cNvPr id="4" name="Slide Number Placeholder 3"/>
+          <p:cNvPr id="5" name="Header Placeholder 4"/>
           <p:cNvSpPr>
             <a:spLocks noGrp="1"/>
           </p:cNvSpPr>
           <p:nvPr>
-            <p:ph type="sldNum" sz="quarter" idx="10"/>
+            <p:ph type="hdr" sz="quarter" idx="11"/>
           </p:nvPr>
         </p:nvSpPr>
         <p:spPr/>
@@ -2503,25 +2197,22 @@
             <a:pPr>
               <a:defRPr/>
             </a:pPr>
-            <a:fld id="{DC3734AA-3150-D947-AC52-2F5DF48BFCD5}" type="slidenum">
+            <a:r>
               <a:rPr lang="en-US" smtClean="0"/>
-              <a:pPr>
-                <a:defRPr/>
-              </a:pPr>
-              <a:t>8</a:t>
-            </a:fld>
-            <a:endParaRPr lang="en-US" dirty="0"/>
-          </a:p>
-        </p:txBody>
-      </p:sp>
-      <p:sp>
-        <p:nvSpPr>
-          <p:cNvPr id="5" name="Header Placeholder 4"/>
+              <a:t>Chef Intermediate</a:t>
+            </a:r>
+            <a:endParaRPr lang="en-US"/>
+          </a:p>
+        </p:txBody>
+      </p:sp>
+      <p:sp>
+        <p:nvSpPr>
+          <p:cNvPr id="7" name="Date Placeholder 6"/>
           <p:cNvSpPr>
             <a:spLocks noGrp="1"/>
           </p:cNvSpPr>
           <p:nvPr>
-            <p:ph type="hdr" sz="quarter" idx="11"/>
+            <p:ph type="dt" idx="13"/>
           </p:nvPr>
         </p:nvSpPr>
         <p:spPr/>
@@ -2532,29 +2223,11 @@
             <a:pPr>
               <a:defRPr/>
             </a:pPr>
-            <a:endParaRPr lang="en-US"/>
-          </a:p>
-        </p:txBody>
-      </p:sp>
-      <p:sp>
-        <p:nvSpPr>
-          <p:cNvPr id="6" name="Footer Placeholder 5"/>
-          <p:cNvSpPr>
-            <a:spLocks noGrp="1"/>
-          </p:cNvSpPr>
-          <p:nvPr>
-            <p:ph type="ftr" sz="quarter" idx="12"/>
-          </p:nvPr>
-        </p:nvSpPr>
-        <p:spPr/>
-        <p:txBody>
-          <a:bodyPr/>
-          <a:lstStyle/>
-          <a:p>
-            <a:pPr>
-              <a:defRPr/>
-            </a:pPr>
-            <a:endParaRPr lang="en-US"/>
+            <a:r>
+              <a:rPr lang="en-US" smtClean="0"/>
+              <a:t>Chef Software, Inc.</a:t>
+            </a:r>
+            <a:endParaRPr lang="en-US" dirty="0"/>
           </a:p>
         </p:txBody>
       </p:sp>
@@ -2646,12 +2319,12 @@
       </p:sp>
       <p:sp>
         <p:nvSpPr>
-          <p:cNvPr id="4" name="Slide Number Placeholder 3"/>
+          <p:cNvPr id="5" name="Header Placeholder 4"/>
           <p:cNvSpPr>
             <a:spLocks noGrp="1"/>
           </p:cNvSpPr>
           <p:nvPr>
-            <p:ph type="sldNum" sz="quarter" idx="10"/>
+            <p:ph type="hdr" sz="quarter" idx="11"/>
           </p:nvPr>
         </p:nvSpPr>
         <p:spPr/>
@@ -2662,25 +2335,22 @@
             <a:pPr>
               <a:defRPr/>
             </a:pPr>
-            <a:fld id="{DC3734AA-3150-D947-AC52-2F5DF48BFCD5}" type="slidenum">
+            <a:r>
               <a:rPr lang="en-US" smtClean="0"/>
-              <a:pPr>
-                <a:defRPr/>
-              </a:pPr>
-              <a:t>9</a:t>
-            </a:fld>
-            <a:endParaRPr lang="en-US" dirty="0"/>
-          </a:p>
-        </p:txBody>
-      </p:sp>
-      <p:sp>
-        <p:nvSpPr>
-          <p:cNvPr id="5" name="Header Placeholder 4"/>
+              <a:t>Chef Intermediate</a:t>
+            </a:r>
+            <a:endParaRPr lang="en-US"/>
+          </a:p>
+        </p:txBody>
+      </p:sp>
+      <p:sp>
+        <p:nvSpPr>
+          <p:cNvPr id="7" name="Date Placeholder 6"/>
           <p:cNvSpPr>
             <a:spLocks noGrp="1"/>
           </p:cNvSpPr>
           <p:nvPr>
-            <p:ph type="hdr" sz="quarter" idx="11"/>
+            <p:ph type="dt" idx="13"/>
           </p:nvPr>
         </p:nvSpPr>
         <p:spPr/>
@@ -2691,29 +2361,11 @@
             <a:pPr>
               <a:defRPr/>
             </a:pPr>
-            <a:endParaRPr lang="en-US"/>
-          </a:p>
-        </p:txBody>
-      </p:sp>
-      <p:sp>
-        <p:nvSpPr>
-          <p:cNvPr id="6" name="Footer Placeholder 5"/>
-          <p:cNvSpPr>
-            <a:spLocks noGrp="1"/>
-          </p:cNvSpPr>
-          <p:nvPr>
-            <p:ph type="ftr" sz="quarter" idx="12"/>
-          </p:nvPr>
-        </p:nvSpPr>
-        <p:spPr/>
-        <p:txBody>
-          <a:bodyPr/>
-          <a:lstStyle/>
-          <a:p>
-            <a:pPr>
-              <a:defRPr/>
-            </a:pPr>
-            <a:endParaRPr lang="en-US"/>
+            <a:r>
+              <a:rPr lang="en-US" smtClean="0"/>
+              <a:t>Chef Software, Inc.</a:t>
+            </a:r>
+            <a:endParaRPr lang="en-US" dirty="0"/>
           </a:p>
         </p:txBody>
       </p:sp>
@@ -9108,7 +8760,7 @@
               <a:defRPr/>
             </a:pPr>
             <a:r>
-              <a:rPr lang="en-US" dirty="0">
+              <a:rPr lang="en-US" dirty="0" smtClean="0">
                 <a:solidFill>
                   <a:srgbClr val="7D868C"/>
                 </a:solidFill>
@@ -9119,7 +8771,7 @@
               <a:t>©</a:t>
             </a:r>
             <a:r>
-              <a:rPr lang="en-US" dirty="0" smtClean="0">
+              <a:rPr lang="is-IS" dirty="0" smtClean="0">
                 <a:solidFill>
                   <a:srgbClr val="7D868C"/>
                 </a:solidFill>
@@ -9127,7 +8779,18 @@
                 <a:ea typeface="+mn-ea"/>
                 <a:cs typeface="+mn-cs"/>
               </a:rPr>
-              <a:t>2016 </a:t>
+              <a:t>2017</a:t>
+            </a:r>
+            <a:r>
+              <a:rPr lang="en-US" dirty="0" smtClean="0">
+                <a:solidFill>
+                  <a:srgbClr val="7D868C"/>
+                </a:solidFill>
+                <a:latin typeface="+mn-lt"/>
+                <a:ea typeface="+mn-ea"/>
+                <a:cs typeface="+mn-cs"/>
+              </a:rPr>
+              <a:t> </a:t>
             </a:r>
             <a:r>
               <a:rPr lang="en-US" dirty="0">
@@ -9877,7 +9540,7 @@
               <a:defRPr/>
             </a:pPr>
             <a:r>
-              <a:rPr lang="en-US" dirty="0">
+              <a:rPr lang="en-US" dirty="0" smtClean="0">
                 <a:solidFill>
                   <a:srgbClr val="7D868C"/>
                 </a:solidFill>
@@ -9888,7 +9551,7 @@
               <a:t>©</a:t>
             </a:r>
             <a:r>
-              <a:rPr lang="en-US" dirty="0" smtClean="0">
+              <a:rPr lang="is-IS" dirty="0" smtClean="0">
                 <a:solidFill>
                   <a:srgbClr val="7D868C"/>
                 </a:solidFill>
@@ -9896,7 +9559,18 @@
                 <a:ea typeface="+mn-ea"/>
                 <a:cs typeface="+mn-cs"/>
               </a:rPr>
-              <a:t>2016 </a:t>
+              <a:t>2017</a:t>
+            </a:r>
+            <a:r>
+              <a:rPr lang="en-US" dirty="0" smtClean="0">
+                <a:solidFill>
+                  <a:srgbClr val="7D868C"/>
+                </a:solidFill>
+                <a:latin typeface="+mn-lt"/>
+                <a:ea typeface="+mn-ea"/>
+                <a:cs typeface="+mn-cs"/>
+              </a:rPr>
+              <a:t> </a:t>
             </a:r>
             <a:r>
               <a:rPr lang="en-US" dirty="0">

</xml_diff>

<commit_message>
rev footer slide 1-1
</commit_message>
<xml_diff>
--- a/01-introduction.pptx
+++ b/01-introduction.pptx
@@ -174,6 +174,10 @@
 </p:presentation>
 </file>
 
+<file path=ppt/revisionInfo.xml><?xml version="1.0" encoding="utf-8"?>
+<p1510:revInfo xmlns:a="http://schemas.openxmlformats.org/drawingml/2006/main" xmlns:r="http://schemas.openxmlformats.org/officeDocument/2006/relationships" xmlns:p1510="http://schemas.microsoft.com/office/powerpoint/2015/10/main"/>
+</file>
+
 <file path=ppt/handoutMasters/handoutMaster1.xml><?xml version="1.0" encoding="utf-8"?>
 <p:handoutMaster xmlns:a="http://schemas.openxmlformats.org/drawingml/2006/main" xmlns:r="http://schemas.openxmlformats.org/officeDocument/2006/relationships" xmlns:p="http://schemas.openxmlformats.org/presentationml/2006/main">
   <p:cSld>
@@ -237,10 +241,9 @@
               <a:defRPr/>
             </a:pPr>
             <a:r>
-              <a:rPr lang="en-US" smtClean="0"/>
+              <a:rPr lang="en-US"/>
               <a:t>Chef Intermediate</a:t>
             </a:r>
-            <a:endParaRPr lang="en-US"/>
           </a:p>
         </p:txBody>
       </p:sp>
@@ -285,7 +288,7 @@
               <a:defRPr/>
             </a:pPr>
             <a:r>
-              <a:rPr lang="en-US" smtClean="0"/>
+              <a:rPr lang="en-US"/>
               <a:t>Chef Software, Inc.</a:t>
             </a:r>
             <a:endParaRPr lang="en-US" dirty="0"/>
@@ -465,7 +468,7 @@
               <a:defRPr/>
             </a:pPr>
             <a:r>
-              <a:rPr lang="en-US" smtClean="0"/>
+              <a:rPr lang="en-US"/>
               <a:t>Chef Software, Inc.</a:t>
             </a:r>
             <a:endParaRPr lang="en-US" dirty="0"/>
@@ -533,38 +536,37 @@
           <a:p>
             <a:pPr lvl="0"/>
             <a:r>
-              <a:rPr lang="en-US" noProof="0" dirty="0" smtClean="0"/>
+              <a:rPr lang="en-US" noProof="0" dirty="0"/>
               <a:t>Click to edit Master text styles</a:t>
             </a:r>
           </a:p>
           <a:p>
             <a:pPr lvl="1"/>
             <a:r>
-              <a:rPr lang="en-US" noProof="0" dirty="0" smtClean="0"/>
+              <a:rPr lang="en-US" noProof="0" dirty="0"/>
               <a:t>Second level</a:t>
             </a:r>
           </a:p>
           <a:p>
             <a:pPr lvl="2"/>
             <a:r>
-              <a:rPr lang="en-US" noProof="0" dirty="0" smtClean="0"/>
+              <a:rPr lang="en-US" noProof="0" dirty="0"/>
               <a:t>Third level</a:t>
             </a:r>
           </a:p>
           <a:p>
             <a:pPr lvl="3"/>
             <a:r>
-              <a:rPr lang="en-US" noProof="0" dirty="0" smtClean="0"/>
+              <a:rPr lang="en-US" noProof="0" dirty="0"/>
               <a:t>Fourth level</a:t>
             </a:r>
           </a:p>
           <a:p>
             <a:pPr lvl="4"/>
             <a:r>
-              <a:rPr lang="en-US" noProof="0" dirty="0" smtClean="0"/>
+              <a:rPr lang="en-US" noProof="0" dirty="0"/>
               <a:t>Fifth level</a:t>
             </a:r>
-            <a:endParaRPr lang="en-US" noProof="0" dirty="0"/>
           </a:p>
         </p:txBody>
       </p:sp>
@@ -609,7 +611,7 @@
               <a:defRPr/>
             </a:pPr>
             <a:r>
-              <a:rPr lang="en-US" smtClean="0"/>
+              <a:rPr lang="en-US"/>
               <a:t>Chef Intermediate</a:t>
             </a:r>
             <a:endParaRPr lang="en-US" dirty="0"/>
@@ -818,10 +820,9 @@
           <a:lstStyle/>
           <a:p>
             <a:r>
-              <a:rPr lang="en-US" dirty="0" smtClean="0"/>
+              <a:rPr lang="en-US" dirty="0"/>
               <a:t>Welcome to Chef Intermediate</a:t>
             </a:r>
-            <a:endParaRPr lang="en-US" dirty="0"/>
           </a:p>
         </p:txBody>
       </p:sp>
@@ -844,10 +845,9 @@
               <a:defRPr/>
             </a:pPr>
             <a:r>
-              <a:rPr lang="en-US" smtClean="0"/>
+              <a:rPr lang="en-US"/>
               <a:t>Chef Intermediate</a:t>
             </a:r>
-            <a:endParaRPr lang="en-US"/>
           </a:p>
         </p:txBody>
       </p:sp>
@@ -870,7 +870,7 @@
               <a:defRPr/>
             </a:pPr>
             <a:r>
-              <a:rPr lang="en-US" smtClean="0"/>
+              <a:rPr lang="en-US"/>
               <a:t>Chef Software, Inc.</a:t>
             </a:r>
             <a:endParaRPr lang="en-US" dirty="0"/>
@@ -935,24 +935,24 @@
           <a:lstStyle/>
           <a:p>
             <a:r>
-              <a:rPr lang="en-US" dirty="0" smtClean="0"/>
+              <a:rPr lang="en-US" dirty="0"/>
               <a:t>Let</a:t>
             </a:r>
             <a:r>
-              <a:rPr lang="en-US" baseline="0" dirty="0" smtClean="0"/>
+              <a:rPr lang="en-US" baseline="0" dirty="0"/>
               <a:t> us end with a discussion about the following topics.</a:t>
             </a:r>
           </a:p>
           <a:p>
-            <a:endParaRPr lang="en-US" baseline="0" dirty="0" smtClean="0"/>
-          </a:p>
-          <a:p>
-            <a:r>
-              <a:rPr lang="en-US" baseline="0" dirty="0" smtClean="0"/>
+            <a:endParaRPr lang="en-US" baseline="0" dirty="0"/>
+          </a:p>
+          <a:p>
+            <a:r>
+              <a:rPr lang="en-US" baseline="0" dirty="0"/>
               <a:t>Instructor Note: With large groups I often find it better to have individuals turn to the individuals around them, form groups of whatever size they feel comfortable, and have them take turns asking and answering the questions. </a:t>
             </a:r>
             <a:r>
-              <a:rPr lang="en-US" baseline="0" smtClean="0"/>
+              <a:rPr lang="en-US" baseline="0"/>
               <a:t>When all the groups are done I then open the discussion up to the entire group allowing each group or individuals to share their answers.</a:t>
             </a:r>
             <a:endParaRPr lang="en-US" dirty="0"/>
@@ -978,10 +978,9 @@
               <a:defRPr/>
             </a:pPr>
             <a:r>
-              <a:rPr lang="en-US" smtClean="0"/>
+              <a:rPr lang="en-US"/>
               <a:t>Chef Intermediate</a:t>
             </a:r>
-            <a:endParaRPr lang="en-US"/>
           </a:p>
         </p:txBody>
       </p:sp>
@@ -1004,7 +1003,7 @@
               <a:defRPr/>
             </a:pPr>
             <a:r>
-              <a:rPr lang="en-US" smtClean="0"/>
+              <a:rPr lang="en-US"/>
               <a:t>Chef Software, Inc.</a:t>
             </a:r>
             <a:endParaRPr lang="en-US" dirty="0"/>
@@ -1069,15 +1068,15 @@
           <a:lstStyle/>
           <a:p>
             <a:r>
-              <a:rPr lang="en-US" dirty="0" smtClean="0"/>
+              <a:rPr lang="en-US" dirty="0"/>
               <a:t>Before</a:t>
             </a:r>
             <a:r>
-              <a:rPr lang="en-US" baseline="0" dirty="0" smtClean="0"/>
+              <a:rPr lang="en-US" baseline="0" dirty="0"/>
               <a:t> we continue let us stop for a moment answer </a:t>
             </a:r>
             <a:r>
-              <a:rPr lang="en-US" baseline="0" smtClean="0"/>
+              <a:rPr lang="en-US" baseline="0"/>
               <a:t>any questions that anyone might have at this time.</a:t>
             </a:r>
             <a:endParaRPr lang="en-US"/>
@@ -1103,10 +1102,9 @@
               <a:defRPr/>
             </a:pPr>
             <a:r>
-              <a:rPr lang="en-US" smtClean="0"/>
+              <a:rPr lang="en-US"/>
               <a:t>Chef Intermediate</a:t>
             </a:r>
-            <a:endParaRPr lang="en-US"/>
           </a:p>
         </p:txBody>
       </p:sp>
@@ -1129,7 +1127,7 @@
               <a:defRPr/>
             </a:pPr>
             <a:r>
-              <a:rPr lang="en-US" smtClean="0"/>
+              <a:rPr lang="en-US"/>
               <a:t>Chef Software, Inc.</a:t>
             </a:r>
             <a:endParaRPr lang="en-US" dirty="0"/>
@@ -1216,10 +1214,9 @@
               <a:defRPr/>
             </a:pPr>
             <a:r>
-              <a:rPr lang="en-US" smtClean="0"/>
+              <a:rPr lang="en-US"/>
               <a:t>Chef Intermediate</a:t>
             </a:r>
-            <a:endParaRPr lang="en-US"/>
           </a:p>
         </p:txBody>
       </p:sp>
@@ -1242,7 +1239,7 @@
               <a:defRPr/>
             </a:pPr>
             <a:r>
-              <a:rPr lang="en-US" smtClean="0"/>
+              <a:rPr lang="en-US"/>
               <a:t>Chef Software, Inc.</a:t>
             </a:r>
             <a:endParaRPr lang="en-US" dirty="0"/>
@@ -1307,20 +1304,20 @@
           <a:lstStyle/>
           <a:p>
             <a:r>
-              <a:rPr lang="en-US" dirty="0" smtClean="0"/>
+              <a:rPr lang="en-US" dirty="0"/>
               <a:t>Before</a:t>
             </a:r>
             <a:r>
-              <a:rPr lang="en-US" baseline="0" dirty="0" smtClean="0"/>
+              <a:rPr lang="en-US" baseline="0" dirty="0"/>
               <a:t> we start let me introduce myself. Then I would like it if everyone had a chance to introduce themselves.</a:t>
             </a:r>
           </a:p>
           <a:p>
-            <a:endParaRPr lang="en-US" baseline="0" dirty="0" smtClean="0"/>
-          </a:p>
-          <a:p>
-            <a:r>
-              <a:rPr lang="en-US" baseline="0" dirty="0" smtClean="0"/>
+            <a:endParaRPr lang="en-US" baseline="0" dirty="0"/>
+          </a:p>
+          <a:p>
+            <a:r>
+              <a:rPr lang="en-US" baseline="0" dirty="0"/>
               <a:t>Instructor Note: Often times with larger, in-person groups I prefer to have the individuals perform this introduction one-on-one. Having people leave their desks and greet as many people as they can during the time allotted. I often feel this works better as it removes the pressure from the single individual to introduce themselves in a way that is presenting themselves and not actually greeting people. When Online, I create a pre-defined order, announce that order, and then invite a person to speak, thank them when they are done.</a:t>
             </a:r>
             <a:endParaRPr lang="en-US" dirty="0"/>
@@ -1346,10 +1343,9 @@
               <a:defRPr/>
             </a:pPr>
             <a:r>
-              <a:rPr lang="en-US" smtClean="0"/>
+              <a:rPr lang="en-US"/>
               <a:t>Chef Intermediate</a:t>
             </a:r>
-            <a:endParaRPr lang="en-US"/>
           </a:p>
         </p:txBody>
       </p:sp>
@@ -1372,7 +1368,7 @@
               <a:defRPr/>
             </a:pPr>
             <a:r>
-              <a:rPr lang="en-US" smtClean="0"/>
+              <a:rPr lang="en-US"/>
               <a:t>Chef Software, Inc.</a:t>
             </a:r>
             <a:endParaRPr lang="en-US" dirty="0"/>
@@ -1437,37 +1433,37 @@
           <a:lstStyle/>
           <a:p>
             <a:r>
-              <a:rPr lang="en-US" dirty="0" smtClean="0"/>
+              <a:rPr lang="en-US" dirty="0"/>
               <a:t>The</a:t>
             </a:r>
             <a:r>
-              <a:rPr lang="en-US" baseline="0" dirty="0" smtClean="0"/>
+              <a:rPr lang="en-US" baseline="0" dirty="0"/>
               <a:t> goal of this training is to teach you techniques that will help you extend the functionality of your cookbooks. We also want to share the </a:t>
             </a:r>
             <a:r>
-              <a:rPr lang="en-US" dirty="0" smtClean="0"/>
+              <a:rPr lang="en-US" dirty="0"/>
               <a:t>thought process on why and how to best employ these techniques. </a:t>
             </a:r>
           </a:p>
           <a:p>
-            <a:endParaRPr lang="en-US" baseline="0" dirty="0" smtClean="0"/>
-          </a:p>
-          <a:p>
-            <a:r>
-              <a:rPr lang="en-US" baseline="0" dirty="0" smtClean="0"/>
+            <a:endParaRPr lang="en-US" baseline="0" dirty="0"/>
+          </a:p>
+          <a:p>
+            <a:r>
+              <a:rPr lang="en-US" baseline="0" dirty="0"/>
               <a:t>Chef is built on top of Ruby. This means you have the power of a programming language at your disposal and we will have to keep a tight focus on the challenges and exercises presented in this content. </a:t>
             </a:r>
             <a:r>
-              <a:rPr lang="en-US" dirty="0" smtClean="0"/>
+              <a:rPr lang="en-US" dirty="0"/>
               <a:t>During and throughout the content we will have discussion where we may have additional time to talk about many different topics but in this interest of time and popular opinion we may need to leave those discussions.</a:t>
             </a:r>
           </a:p>
           <a:p>
-            <a:endParaRPr lang="en-US" dirty="0" smtClean="0"/>
-          </a:p>
-          <a:p>
-            <a:r>
-              <a:rPr lang="en-US" baseline="0" dirty="0" smtClean="0"/>
+            <a:endParaRPr lang="en-US" dirty="0"/>
+          </a:p>
+          <a:p>
+            <a:r>
+              <a:rPr lang="en-US" baseline="0" dirty="0"/>
               <a:t>During the introductions you learned about the other individuals here in the course with you. They may have shared similar problems and domains. During the time that we are here respectfully reach out them so that you can continue the conversation, grow each others' knowledge, and become better professionals.</a:t>
             </a:r>
             <a:endParaRPr lang="en-US" dirty="0"/>
@@ -1493,10 +1489,9 @@
               <a:defRPr/>
             </a:pPr>
             <a:r>
-              <a:rPr lang="en-US" smtClean="0"/>
+              <a:rPr lang="en-US"/>
               <a:t>Chef Intermediate</a:t>
             </a:r>
-            <a:endParaRPr lang="en-US"/>
           </a:p>
         </p:txBody>
       </p:sp>
@@ -1519,7 +1514,7 @@
               <a:defRPr/>
             </a:pPr>
             <a:r>
-              <a:rPr lang="en-US" smtClean="0"/>
+              <a:rPr lang="en-US"/>
               <a:t>Chef Software, Inc.</a:t>
             </a:r>
             <a:endParaRPr lang="en-US" dirty="0"/>
@@ -1584,20 +1579,20 @@
           <a:lstStyle/>
           <a:p>
             <a:r>
-              <a:rPr lang="en-US" dirty="0" smtClean="0"/>
+              <a:rPr lang="en-US" dirty="0"/>
               <a:t>All throughout this</a:t>
             </a:r>
             <a:r>
-              <a:rPr lang="en-US" baseline="0" dirty="0" smtClean="0"/>
+              <a:rPr lang="en-US" baseline="0" dirty="0"/>
               <a:t> training I strongly encourage you to ask questions whenever you do not understand a topic, an acronym, concept, or software. By asking a question you better your learning and often times better the learning of those with you in this training. Asking questions is a sign of curiosity that we want to encourage and foster while we are here together.</a:t>
             </a:r>
           </a:p>
           <a:p>
-            <a:endParaRPr lang="en-US" baseline="0" dirty="0" smtClean="0"/>
-          </a:p>
-          <a:p>
-            <a:r>
-              <a:rPr lang="en-US" baseline="0" dirty="0" smtClean="0"/>
+            <a:endParaRPr lang="en-US" baseline="0" dirty="0"/>
+          </a:p>
+          <a:p>
+            <a:r>
+              <a:rPr lang="en-US" baseline="0" dirty="0"/>
               <a:t>This curiosity can also be employed by exploring the boundaries of the tools you are using and the language you are writing. The exercises and the labs we will perform will often lead you through examples that work from the beginning to the end. When you develop solutions it is rare that something works from the start all the way to the end. Errors and issues come up from typos or the incorrect usage of a command of the programming language. When you fall off the path it can often be hard to find your way back. Here, if you find yourself always on the correct path explore what happens when you step off of it, what you see, the error messages you are presented with, the new results you might find.</a:t>
             </a:r>
           </a:p>
@@ -1622,10 +1617,9 @@
               <a:defRPr/>
             </a:pPr>
             <a:r>
-              <a:rPr lang="en-US" smtClean="0"/>
+              <a:rPr lang="en-US"/>
               <a:t>Chef Intermediate</a:t>
             </a:r>
-            <a:endParaRPr lang="en-US"/>
           </a:p>
         </p:txBody>
       </p:sp>
@@ -1648,7 +1642,7 @@
               <a:defRPr/>
             </a:pPr>
             <a:r>
-              <a:rPr lang="en-US" smtClean="0"/>
+              <a:rPr lang="en-US"/>
               <a:t>Chef Software, Inc.</a:t>
             </a:r>
             <a:endParaRPr lang="en-US" dirty="0"/>
@@ -1713,11 +1707,11 @@
           <a:lstStyle/>
           <a:p>
             <a:r>
-              <a:rPr lang="en-US" dirty="0" smtClean="0"/>
+              <a:rPr lang="en-US" dirty="0"/>
               <a:t>The content of this training has been</a:t>
             </a:r>
             <a:r>
-              <a:rPr lang="en-US" baseline="0" dirty="0" smtClean="0"/>
+              <a:rPr lang="en-US" baseline="0" dirty="0"/>
               <a:t> designed in a way to emphasize this hands-on approach to the content. Together, we will perform exercises together that accomplish an understood objective. After that is done you will often emphasize an activity by performing a lab. The lab is designed to challenge your understanding and retention of the previously accomplished exercises. You can work through this labs on your own or in groups. After completing the labs we will all come together again to review the exercise. Finally, we will end each section with a discussion about the topics that we introduced. These discussions will often ask you to share your opinions, recent experiences, or previous experiences within this domain.</a:t>
             </a:r>
             <a:endParaRPr lang="en-US" dirty="0"/>
@@ -1743,10 +1737,9 @@
               <a:defRPr/>
             </a:pPr>
             <a:r>
-              <a:rPr lang="en-US" smtClean="0"/>
+              <a:rPr lang="en-US"/>
               <a:t>Chef Intermediate</a:t>
             </a:r>
-            <a:endParaRPr lang="en-US"/>
           </a:p>
         </p:txBody>
       </p:sp>
@@ -1769,7 +1762,7 @@
               <a:defRPr/>
             </a:pPr>
             <a:r>
-              <a:rPr lang="en-US" smtClean="0"/>
+              <a:rPr lang="en-US"/>
               <a:t>Chef Software, Inc.</a:t>
             </a:r>
             <a:endParaRPr lang="en-US" dirty="0"/>
@@ -1834,11 +1827,11 @@
           <a:lstStyle/>
           <a:p>
             <a:r>
-              <a:rPr lang="en-US" dirty="0" smtClean="0"/>
+              <a:rPr lang="en-US" dirty="0"/>
               <a:t>This is the outline of the</a:t>
             </a:r>
             <a:r>
-              <a:rPr lang="en-US" baseline="0" dirty="0" smtClean="0"/>
+              <a:rPr lang="en-US" baseline="0" dirty="0"/>
               <a:t> events for this training. Please take a moment to review this list to ensure that the topics listed here meet your expectations. Take a moment to note which topics are of most interest to you. Also note which topics are not present here on this list. We will discuss your thoughts at the end of the section.</a:t>
             </a:r>
             <a:endParaRPr lang="en-US" dirty="0"/>
@@ -1864,10 +1857,9 @@
               <a:defRPr/>
             </a:pPr>
             <a:r>
-              <a:rPr lang="en-US" smtClean="0"/>
+              <a:rPr lang="en-US"/>
               <a:t>Chef Intermediate</a:t>
             </a:r>
-            <a:endParaRPr lang="en-US"/>
           </a:p>
         </p:txBody>
       </p:sp>
@@ -1890,7 +1882,7 @@
               <a:defRPr/>
             </a:pPr>
             <a:r>
-              <a:rPr lang="en-US" smtClean="0"/>
+              <a:rPr lang="en-US"/>
               <a:t>Chef Software, Inc.</a:t>
             </a:r>
             <a:endParaRPr lang="en-US" dirty="0"/>
@@ -1972,19 +1964,19 @@
               <a:defRPr/>
             </a:pPr>
             <a:r>
-              <a:rPr lang="en-US" dirty="0" smtClean="0"/>
+              <a:rPr lang="en-US" dirty="0"/>
               <a:t>As I mentioned there</a:t>
             </a:r>
             <a:r>
-              <a:rPr lang="en-US" baseline="0" dirty="0" smtClean="0"/>
+              <a:rPr lang="en-US" baseline="0" dirty="0"/>
               <a:t> is a lot work planned for the day. To ensure we </a:t>
             </a:r>
             <a:r>
-              <a:rPr lang="en-US" dirty="0" smtClean="0"/>
+              <a:rPr lang="en-US" dirty="0"/>
               <a:t>focus on the concepts we introduce and not on troubleshooting systems we are providing you</a:t>
             </a:r>
             <a:r>
-              <a:rPr lang="en-US" baseline="0" dirty="0" smtClean="0"/>
+              <a:rPr lang="en-US" baseline="0" dirty="0"/>
               <a:t> a workstation with the necessary tools installed to get started right away.</a:t>
             </a:r>
           </a:p>
@@ -2006,7 +1998,7 @@
               <a:tabLst/>
               <a:defRPr/>
             </a:pPr>
-            <a:endParaRPr lang="en-US" baseline="0" dirty="0" smtClean="0"/>
+            <a:endParaRPr lang="en-US" baseline="0" dirty="0"/>
           </a:p>
           <a:p>
             <a:pPr marL="0" marR="0" indent="0" algn="l" defTabSz="1217613" rtl="0" eaLnBrk="1" fontAlgn="base" latinLnBrk="0" hangingPunct="1">
@@ -2027,18 +2019,18 @@
               <a:defRPr/>
             </a:pPr>
             <a:r>
-              <a:rPr lang="en-US" baseline="0" dirty="0" smtClean="0"/>
+              <a:rPr lang="en-US" baseline="0" dirty="0"/>
               <a:t>Instructor Note: </a:t>
             </a:r>
             <a:r>
-              <a:rPr lang="en-US" dirty="0" smtClean="0"/>
+              <a:rPr lang="en-US" dirty="0"/>
               <a:t>At the end of the training</a:t>
             </a:r>
             <a:r>
-              <a:rPr lang="en-US" baseline="0" dirty="0" smtClean="0"/>
+              <a:rPr lang="en-US" baseline="0" dirty="0"/>
               <a:t> it is often a good idea to offer your services to help individuals install necessary software or troubleshoot their systems.</a:t>
             </a:r>
-            <a:endParaRPr lang="en-US" dirty="0" smtClean="0"/>
+            <a:endParaRPr lang="en-US" dirty="0"/>
           </a:p>
         </p:txBody>
       </p:sp>
@@ -2061,10 +2053,9 @@
               <a:defRPr/>
             </a:pPr>
             <a:r>
-              <a:rPr lang="en-US" smtClean="0"/>
+              <a:rPr lang="en-US"/>
               <a:t>Chef Intermediate</a:t>
             </a:r>
-            <a:endParaRPr lang="en-US"/>
           </a:p>
         </p:txBody>
       </p:sp>
@@ -2087,7 +2078,7 @@
               <a:defRPr/>
             </a:pPr>
             <a:r>
-              <a:rPr lang="en-US" smtClean="0"/>
+              <a:rPr lang="en-US"/>
               <a:t>Chef Software, Inc.</a:t>
             </a:r>
             <a:endParaRPr lang="en-US" dirty="0"/>
@@ -2152,28 +2143,28 @@
           <a:lstStyle/>
           <a:p>
             <a:r>
-              <a:rPr lang="en-US" dirty="0" smtClean="0"/>
+              <a:rPr lang="en-US" dirty="0"/>
               <a:t>I will provide you with the address,</a:t>
             </a:r>
             <a:r>
-              <a:rPr lang="en-US" baseline="0" dirty="0" smtClean="0"/>
+              <a:rPr lang="en-US" baseline="0" dirty="0"/>
               <a:t> username and password of the workstation. With that information you will need to use the SSH tool that you have installed to connect that workstation.</a:t>
             </a:r>
           </a:p>
           <a:p>
-            <a:endParaRPr lang="en-US" baseline="0" dirty="0" smtClean="0"/>
-          </a:p>
-          <a:p>
-            <a:r>
-              <a:rPr lang="en-US" baseline="0" dirty="0" smtClean="0"/>
+            <a:endParaRPr lang="en-US" baseline="0" dirty="0"/>
+          </a:p>
+          <a:p>
+            <a:r>
+              <a:rPr lang="en-US" baseline="0" dirty="0"/>
               <a:t>This demonstrates how you might connect to the remote machine using your terminal or command-prompt if you have access to the application </a:t>
             </a:r>
             <a:r>
-              <a:rPr lang="en-US" baseline="0" dirty="0" err="1" smtClean="0"/>
+              <a:rPr lang="en-US" baseline="0" dirty="0" err="1"/>
               <a:t>ssh</a:t>
             </a:r>
             <a:r>
-              <a:rPr lang="en-US" baseline="0" dirty="0" smtClean="0"/>
+              <a:rPr lang="en-US" baseline="0" dirty="0"/>
               <a:t>. This may be different based on your operating system.</a:t>
             </a:r>
           </a:p>
@@ -2198,10 +2189,9 @@
               <a:defRPr/>
             </a:pPr>
             <a:r>
-              <a:rPr lang="en-US" smtClean="0"/>
+              <a:rPr lang="en-US"/>
               <a:t>Chef Intermediate</a:t>
             </a:r>
-            <a:endParaRPr lang="en-US"/>
           </a:p>
         </p:txBody>
       </p:sp>
@@ -2224,7 +2214,7 @@
               <a:defRPr/>
             </a:pPr>
             <a:r>
-              <a:rPr lang="en-US" smtClean="0"/>
+              <a:rPr lang="en-US"/>
               <a:t>Chef Software, Inc.</a:t>
             </a:r>
             <a:endParaRPr lang="en-US" dirty="0"/>
@@ -2306,14 +2296,14 @@
               <a:defRPr/>
             </a:pPr>
             <a:r>
-              <a:rPr lang="en-US" dirty="0" smtClean="0"/>
+              <a:rPr lang="en-US" dirty="0"/>
               <a:t>Now</a:t>
             </a:r>
             <a:r>
-              <a:rPr lang="en-US" baseline="0" dirty="0" smtClean="0"/>
+              <a:rPr lang="en-US" baseline="0" dirty="0"/>
               <a:t> that you are connected to that workstation we have taken care of all the necessary work to get started with the training.</a:t>
             </a:r>
-            <a:endParaRPr lang="en-US" dirty="0" smtClean="0"/>
+            <a:endParaRPr lang="en-US" dirty="0"/>
           </a:p>
         </p:txBody>
       </p:sp>
@@ -2336,10 +2326,9 @@
               <a:defRPr/>
             </a:pPr>
             <a:r>
-              <a:rPr lang="en-US" smtClean="0"/>
+              <a:rPr lang="en-US"/>
               <a:t>Chef Intermediate</a:t>
             </a:r>
-            <a:endParaRPr lang="en-US"/>
           </a:p>
         </p:txBody>
       </p:sp>
@@ -2362,7 +2351,7 @@
               <a:defRPr/>
             </a:pPr>
             <a:r>
-              <a:rPr lang="en-US" smtClean="0"/>
+              <a:rPr lang="en-US"/>
               <a:t>Chef Software, Inc.</a:t>
             </a:r>
             <a:endParaRPr lang="en-US" dirty="0"/>
@@ -2445,7 +2434,7 @@
           </a:lstStyle>
           <a:p>
             <a:r>
-              <a:rPr lang="en-US" smtClean="0"/>
+              <a:rPr lang="en-US"/>
               <a:t>Click to edit Master title style</a:t>
             </a:r>
             <a:endParaRPr lang="en-US" dirty="0"/>
@@ -2503,7 +2492,7 @@
           <a:p>
             <a:pPr lvl="0"/>
             <a:r>
-              <a:rPr lang="en-US" smtClean="0"/>
+              <a:rPr lang="en-US"/>
               <a:t>Click to edit Master text styles</a:t>
             </a:r>
           </a:p>
@@ -2522,13 +2511,6 @@
   <p:transition spd="med">
     <p:fade/>
   </p:transition>
-  <p:timing>
-    <p:tnLst>
-      <p:par>
-        <p:cTn id="1" dur="indefinite" restart="never" nodeType="tmRoot"/>
-      </p:par>
-    </p:tnLst>
-  </p:timing>
 </p:sldLayout>
 </file>
 
@@ -2592,7 +2574,7 @@
           </a:lstStyle>
           <a:p>
             <a:r>
-              <a:rPr lang="en-US" smtClean="0"/>
+              <a:rPr lang="en-US"/>
               <a:t>Click to edit Master title style</a:t>
             </a:r>
             <a:endParaRPr lang="en-US" dirty="0"/>
@@ -2650,7 +2632,7 @@
           <a:p>
             <a:pPr lvl="0"/>
             <a:r>
-              <a:rPr lang="en-US" dirty="0" smtClean="0"/>
+              <a:rPr lang="en-US" dirty="0"/>
               <a:t>source code</a:t>
             </a:r>
           </a:p>
@@ -2696,28 +2678,28 @@
           <a:p>
             <a:pPr lvl="0"/>
             <a:r>
-              <a:rPr lang="en-US" smtClean="0"/>
+              <a:rPr lang="en-US"/>
               <a:t>Click to edit Master text styles</a:t>
             </a:r>
           </a:p>
           <a:p>
             <a:pPr lvl="1"/>
             <a:r>
-              <a:rPr lang="en-US" smtClean="0"/>
+              <a:rPr lang="en-US"/>
               <a:t>Second level</a:t>
             </a:r>
           </a:p>
           <a:p>
             <a:pPr lvl="2"/>
             <a:r>
-              <a:rPr lang="en-US" smtClean="0"/>
+              <a:rPr lang="en-US"/>
               <a:t>Third level</a:t>
             </a:r>
           </a:p>
           <a:p>
             <a:pPr lvl="3"/>
             <a:r>
-              <a:rPr lang="en-US" smtClean="0"/>
+              <a:rPr lang="en-US"/>
               <a:t>Fourth level</a:t>
             </a:r>
           </a:p>
@@ -2761,7 +2743,7 @@
           <a:p>
             <a:pPr lvl="0"/>
             <a:r>
-              <a:rPr lang="en-US" dirty="0" smtClean="0"/>
+              <a:rPr lang="en-US" dirty="0"/>
               <a:t>-</a:t>
             </a:r>
           </a:p>
@@ -2805,7 +2787,7 @@
           <a:p>
             <a:pPr lvl="0"/>
             <a:r>
-              <a:rPr lang="en-US" dirty="0" smtClean="0"/>
+              <a:rPr lang="en-US" dirty="0"/>
               <a:t>+</a:t>
             </a:r>
           </a:p>
@@ -2824,13 +2806,6 @@
   <p:transition spd="med">
     <p:fade/>
   </p:transition>
-  <p:timing>
-    <p:tnLst>
-      <p:par>
-        <p:cTn id="1" dur="indefinite" restart="never" nodeType="tmRoot"/>
-      </p:par>
-    </p:tnLst>
-  </p:timing>
 </p:sldLayout>
 </file>
 
@@ -2961,14 +2936,14 @@
           </a:ln>
           <a:extLst>
             <a:ext uri="{909E8E84-426E-40dd-AFC4-6F175D3DCCD1}">
-              <a14:hiddenFill xmlns:a14="http://schemas.microsoft.com/office/drawing/2010/main" xmlns="">
+              <a14:hiddenFill xmlns="" xmlns:a14="http://schemas.microsoft.com/office/drawing/2010/main">
                 <a:solidFill>
                   <a:srgbClr val="FFFFFF"/>
                 </a:solidFill>
               </a14:hiddenFill>
             </a:ext>
             <a:ext uri="{91240B29-F687-4f45-9708-019B960494DF}">
-              <a14:hiddenLine xmlns:a14="http://schemas.microsoft.com/office/drawing/2010/main" xmlns="" w="9525">
+              <a14:hiddenLine xmlns="" xmlns:a14="http://schemas.microsoft.com/office/drawing/2010/main" w="9525">
                 <a:solidFill>
                   <a:srgbClr val="000000"/>
                 </a:solidFill>
@@ -3116,14 +3091,14 @@
           </a:ln>
           <a:extLst>
             <a:ext uri="{909E8E84-426E-40dd-AFC4-6F175D3DCCD1}">
-              <a14:hiddenFill xmlns:a14="http://schemas.microsoft.com/office/drawing/2010/main" xmlns="">
+              <a14:hiddenFill xmlns="" xmlns:a14="http://schemas.microsoft.com/office/drawing/2010/main">
                 <a:solidFill>
                   <a:srgbClr val="FFFFFF"/>
                 </a:solidFill>
               </a14:hiddenFill>
             </a:ext>
             <a:ext uri="{91240B29-F687-4f45-9708-019B960494DF}">
-              <a14:hiddenLine xmlns:a14="http://schemas.microsoft.com/office/drawing/2010/main" xmlns="" w="9525">
+              <a14:hiddenLine xmlns="" xmlns:a14="http://schemas.microsoft.com/office/drawing/2010/main" w="9525">
                 <a:solidFill>
                   <a:srgbClr val="000000"/>
                 </a:solidFill>
@@ -3351,21 +3326,21 @@
           <a:p>
             <a:pPr lvl="0"/>
             <a:r>
-              <a:rPr lang="en-US" smtClean="0"/>
+              <a:rPr lang="en-US"/>
               <a:t>Click to edit Master text styles</a:t>
             </a:r>
           </a:p>
           <a:p>
             <a:pPr lvl="1"/>
             <a:r>
-              <a:rPr lang="en-US" smtClean="0"/>
+              <a:rPr lang="en-US"/>
               <a:t>Second level</a:t>
             </a:r>
           </a:p>
           <a:p>
             <a:pPr lvl="2"/>
             <a:r>
-              <a:rPr lang="en-US" smtClean="0"/>
+              <a:rPr lang="en-US"/>
               <a:t>Third level</a:t>
             </a:r>
           </a:p>
@@ -3411,21 +3386,21 @@
           <a:p>
             <a:pPr lvl="0"/>
             <a:r>
-              <a:rPr lang="en-US" smtClean="0"/>
+              <a:rPr lang="en-US"/>
               <a:t>Click to edit Master text styles</a:t>
             </a:r>
           </a:p>
           <a:p>
             <a:pPr lvl="1"/>
             <a:r>
-              <a:rPr lang="en-US" smtClean="0"/>
+              <a:rPr lang="en-US"/>
               <a:t>Second level</a:t>
             </a:r>
           </a:p>
           <a:p>
             <a:pPr lvl="2"/>
             <a:r>
-              <a:rPr lang="en-US" smtClean="0"/>
+              <a:rPr lang="en-US"/>
               <a:t>Third level</a:t>
             </a:r>
           </a:p>
@@ -3465,7 +3440,7 @@
           <a:p>
             <a:pPr lvl="0"/>
             <a:r>
-              <a:rPr lang="en-US" dirty="0" smtClean="0"/>
+              <a:rPr lang="en-US" dirty="0"/>
               <a:t>A</a:t>
             </a:r>
           </a:p>
@@ -3505,7 +3480,7 @@
           <a:p>
             <a:pPr lvl="0"/>
             <a:r>
-              <a:rPr lang="en-US" dirty="0" smtClean="0"/>
+              <a:rPr lang="en-US" dirty="0"/>
               <a:t>B</a:t>
             </a:r>
           </a:p>
@@ -3524,13 +3499,6 @@
   <p:transition spd="med">
     <p:fade/>
   </p:transition>
-  <p:timing>
-    <p:tnLst>
-      <p:par>
-        <p:cTn id="1" dur="indefinite" restart="never" nodeType="tmRoot"/>
-      </p:par>
-    </p:tnLst>
-  </p:timing>
 </p:sldLayout>
 </file>
 
@@ -3621,14 +3589,14 @@
           </a:ln>
           <a:extLst>
             <a:ext uri="{909E8E84-426E-40dd-AFC4-6F175D3DCCD1}">
-              <a14:hiddenFill xmlns:a14="http://schemas.microsoft.com/office/drawing/2010/main" xmlns="">
+              <a14:hiddenFill xmlns="" xmlns:a14="http://schemas.microsoft.com/office/drawing/2010/main">
                 <a:solidFill>
                   <a:srgbClr val="FFFFFF"/>
                 </a:solidFill>
               </a14:hiddenFill>
             </a:ext>
             <a:ext uri="{91240B29-F687-4f45-9708-019B960494DF}">
-              <a14:hiddenLine xmlns:a14="http://schemas.microsoft.com/office/drawing/2010/main" xmlns="" w="9525">
+              <a14:hiddenLine xmlns="" xmlns:a14="http://schemas.microsoft.com/office/drawing/2010/main" w="9525">
                 <a:solidFill>
                   <a:srgbClr val="000000"/>
                 </a:solidFill>
@@ -3653,13 +3621,6 @@
   <p:transition spd="med">
     <p:fade/>
   </p:transition>
-  <p:timing>
-    <p:tnLst>
-      <p:par>
-        <p:cTn id="1" dur="indefinite" restart="never" nodeType="tmRoot"/>
-      </p:par>
-    </p:tnLst>
-  </p:timing>
 </p:sldLayout>
 </file>
 
@@ -3798,10 +3759,9 @@
           </a:lstStyle>
           <a:p>
             <a:r>
-              <a:rPr lang="en-US" dirty="0" smtClean="0"/>
+              <a:rPr lang="en-US" dirty="0"/>
               <a:t>Motivation</a:t>
             </a:r>
-            <a:endParaRPr lang="en-US" dirty="0"/>
           </a:p>
         </p:txBody>
       </p:sp>
@@ -3928,7 +3888,7 @@
           </a:lstStyle>
           <a:p>
             <a:r>
-              <a:rPr lang="en-US" dirty="0" smtClean="0"/>
+              <a:rPr lang="en-US" dirty="0"/>
               <a:t>Click to edit Master subtitle style</a:t>
             </a:r>
           </a:p>
@@ -3947,13 +3907,6 @@
   <p:transition spd="med">
     <p:fade/>
   </p:transition>
-  <p:timing>
-    <p:tnLst>
-      <p:par>
-        <p:cTn id="1" dur="indefinite" restart="never" nodeType="tmRoot"/>
-      </p:par>
-    </p:tnLst>
-  </p:timing>
 </p:sldLayout>
 </file>
 
@@ -4092,10 +4045,9 @@
           </a:lstStyle>
           <a:p>
             <a:r>
-              <a:rPr lang="en-US" dirty="0" smtClean="0"/>
+              <a:rPr lang="en-US" dirty="0"/>
               <a:t>Problem</a:t>
             </a:r>
-            <a:endParaRPr lang="en-US" dirty="0"/>
           </a:p>
         </p:txBody>
       </p:sp>
@@ -4222,7 +4174,7 @@
           </a:lstStyle>
           <a:p>
             <a:r>
-              <a:rPr lang="en-US" dirty="0" smtClean="0"/>
+              <a:rPr lang="en-US" dirty="0"/>
               <a:t>Click to edit Master subtitle style</a:t>
             </a:r>
           </a:p>
@@ -4241,13 +4193,6 @@
   <p:transition spd="med">
     <p:fade/>
   </p:transition>
-  <p:timing>
-    <p:tnLst>
-      <p:par>
-        <p:cTn id="1" dur="indefinite" restart="never" nodeType="tmRoot"/>
-      </p:par>
-    </p:tnLst>
-  </p:timing>
 </p:sldLayout>
 </file>
 
@@ -4302,7 +4247,7 @@
               <a:defRPr/>
             </a:pPr>
             <a:r>
-              <a:rPr lang="en-US" sz="16933" dirty="0" smtClean="0">
+              <a:rPr lang="en-US" sz="16933" dirty="0">
                 <a:ln w="18415" cmpd="sng">
                   <a:solidFill>
                     <a:srgbClr val="FFFFFF"/>
@@ -4321,23 +4266,6 @@
               </a:rPr>
               <a:t>REFERENCE</a:t>
             </a:r>
-            <a:endParaRPr lang="en-US" sz="16933" dirty="0">
-              <a:ln w="18415" cmpd="sng">
-                <a:solidFill>
-                  <a:srgbClr val="FFFFFF"/>
-                </a:solidFill>
-                <a:prstDash val="solid"/>
-              </a:ln>
-              <a:solidFill>
-                <a:schemeClr val="bg2">
-                  <a:lumMod val="95000"/>
-                  <a:alpha val="50000"/>
-                </a:schemeClr>
-              </a:solidFill>
-              <a:latin typeface="+mn-lt"/>
-              <a:ea typeface="+mn-ea"/>
-              <a:cs typeface="+mn-cs"/>
-            </a:endParaRPr>
           </a:p>
         </p:txBody>
       </p:sp>
@@ -4403,10 +4331,9 @@
           </a:lstStyle>
           <a:p>
             <a:r>
-              <a:rPr lang="en-US" dirty="0" smtClean="0"/>
+              <a:rPr lang="en-US" dirty="0"/>
               <a:t>Documentation</a:t>
             </a:r>
-            <a:endParaRPr lang="en-US" dirty="0"/>
           </a:p>
         </p:txBody>
       </p:sp>
@@ -4533,7 +4460,7 @@
           </a:lstStyle>
           <a:p>
             <a:r>
-              <a:rPr lang="en-US" dirty="0" smtClean="0"/>
+              <a:rPr lang="en-US" dirty="0"/>
               <a:t>Click to edit Master subtitle style</a:t>
             </a:r>
           </a:p>
@@ -4573,14 +4500,14 @@
           <a:p>
             <a:pPr lvl="0"/>
             <a:r>
-              <a:rPr lang="en-US" dirty="0" smtClean="0"/>
+              <a:rPr lang="en-US" dirty="0"/>
               <a:t>http://</a:t>
             </a:r>
             <a:r>
-              <a:rPr lang="en-US" dirty="0" err="1" smtClean="0"/>
+              <a:rPr lang="en-US" dirty="0" err="1"/>
               <a:t>docs.chef.io</a:t>
             </a:r>
-            <a:endParaRPr lang="en-US" dirty="0" smtClean="0"/>
+            <a:endParaRPr lang="en-US" dirty="0"/>
           </a:p>
         </p:txBody>
       </p:sp>
@@ -4597,13 +4524,6 @@
   <p:transition spd="med">
     <p:fade/>
   </p:transition>
-  <p:timing>
-    <p:tnLst>
-      <p:par>
-        <p:cTn id="1" dur="indefinite" restart="never" nodeType="tmRoot"/>
-      </p:par>
-    </p:tnLst>
-  </p:timing>
 </p:sldLayout>
 </file>
 
@@ -4742,10 +4662,9 @@
           </a:lstStyle>
           <a:p>
             <a:r>
-              <a:rPr lang="en-US" dirty="0" smtClean="0"/>
+              <a:rPr lang="en-US" dirty="0"/>
               <a:t>Concept</a:t>
             </a:r>
-            <a:endParaRPr lang="en-US" dirty="0"/>
           </a:p>
         </p:txBody>
       </p:sp>
@@ -4872,7 +4791,7 @@
           </a:lstStyle>
           <a:p>
             <a:r>
-              <a:rPr lang="en-US" dirty="0" smtClean="0"/>
+              <a:rPr lang="en-US" dirty="0"/>
               <a:t>Click to edit Master subtitle style</a:t>
             </a:r>
           </a:p>
@@ -4891,13 +4810,6 @@
   <p:transition spd="med">
     <p:fade/>
   </p:transition>
-  <p:timing>
-    <p:tnLst>
-      <p:par>
-        <p:cTn id="1" dur="indefinite" restart="never" nodeType="tmRoot"/>
-      </p:par>
-    </p:tnLst>
-  </p:timing>
 </p:sldLayout>
 </file>
 
@@ -5036,10 +4948,9 @@
           </a:lstStyle>
           <a:p>
             <a:r>
-              <a:rPr lang="en-US" dirty="0" smtClean="0"/>
+              <a:rPr lang="en-US" dirty="0"/>
               <a:t>Group Exercise</a:t>
             </a:r>
-            <a:endParaRPr lang="en-US" dirty="0"/>
           </a:p>
         </p:txBody>
       </p:sp>
@@ -5084,7 +4995,7 @@
           <a:p>
             <a:pPr lvl="0"/>
             <a:r>
-              <a:rPr lang="en-US" dirty="0" smtClean="0"/>
+              <a:rPr lang="en-US" dirty="0"/>
               <a:t>Click to edit Master text styles</a:t>
             </a:r>
           </a:p>
@@ -5112,14 +5023,14 @@
           </a:ln>
           <a:extLst>
             <a:ext uri="{909E8E84-426E-40dd-AFC4-6F175D3DCCD1}">
-              <a14:hiddenFill xmlns:a14="http://schemas.microsoft.com/office/drawing/2010/main" xmlns="">
+              <a14:hiddenFill xmlns="" xmlns:a14="http://schemas.microsoft.com/office/drawing/2010/main">
                 <a:solidFill>
                   <a:srgbClr val="FFFFFF"/>
                 </a:solidFill>
               </a14:hiddenFill>
             </a:ext>
             <a:ext uri="{91240B29-F687-4f45-9708-019B960494DF}">
-              <a14:hiddenLine xmlns:a14="http://schemas.microsoft.com/office/drawing/2010/main" xmlns="" w="9525">
+              <a14:hiddenLine xmlns="" xmlns:a14="http://schemas.microsoft.com/office/drawing/2010/main" w="9525">
                 <a:solidFill>
                   <a:srgbClr val="000000"/>
                 </a:solidFill>
@@ -5279,28 +5190,28 @@
           <a:p>
             <a:pPr lvl="0"/>
             <a:r>
-              <a:rPr lang="en-US" dirty="0" smtClean="0"/>
+              <a:rPr lang="en-US" dirty="0"/>
               <a:t>Click to edit Master text styles</a:t>
             </a:r>
           </a:p>
           <a:p>
             <a:pPr lvl="1"/>
             <a:r>
-              <a:rPr lang="en-US" dirty="0" smtClean="0"/>
+              <a:rPr lang="en-US" dirty="0"/>
               <a:t>Second level</a:t>
             </a:r>
           </a:p>
           <a:p>
             <a:pPr lvl="2"/>
             <a:r>
-              <a:rPr lang="en-US" dirty="0" smtClean="0"/>
+              <a:rPr lang="en-US" dirty="0"/>
               <a:t>Third level</a:t>
             </a:r>
           </a:p>
           <a:p>
             <a:pPr lvl="3"/>
             <a:r>
-              <a:rPr lang="en-US" dirty="0" smtClean="0"/>
+              <a:rPr lang="en-US" dirty="0"/>
               <a:t>Fourth level</a:t>
             </a:r>
           </a:p>
@@ -5319,13 +5230,6 @@
   <p:transition spd="med">
     <p:fade/>
   </p:transition>
-  <p:timing>
-    <p:tnLst>
-      <p:par>
-        <p:cTn id="1" dur="indefinite" restart="never" nodeType="tmRoot"/>
-      </p:par>
-    </p:tnLst>
-  </p:timing>
 </p:sldLayout>
 </file>
 
@@ -5464,10 +5368,9 @@
           </a:lstStyle>
           <a:p>
             <a:r>
-              <a:rPr lang="en-US" dirty="0" smtClean="0"/>
+              <a:rPr lang="en-US" dirty="0"/>
               <a:t>Lab</a:t>
             </a:r>
-            <a:endParaRPr lang="en-US" dirty="0"/>
           </a:p>
         </p:txBody>
       </p:sp>
@@ -5595,7 +5498,7 @@
           </a:lstStyle>
           <a:p>
             <a:r>
-              <a:rPr lang="en-US" dirty="0" smtClean="0"/>
+              <a:rPr lang="en-US" dirty="0"/>
               <a:t>Click to edit Master subtitle style</a:t>
             </a:r>
           </a:p>
@@ -5644,13 +5547,6 @@
   <p:transition spd="med">
     <p:fade/>
   </p:transition>
-  <p:timing>
-    <p:tnLst>
-      <p:par>
-        <p:cTn id="1" dur="indefinite" restart="never" nodeType="tmRoot"/>
-      </p:par>
-    </p:tnLst>
-  </p:timing>
 </p:sldLayout>
 </file>
 
@@ -5789,10 +5685,9 @@
           </a:lstStyle>
           <a:p>
             <a:r>
-              <a:rPr lang="en-US" dirty="0" smtClean="0"/>
+              <a:rPr lang="en-US" dirty="0"/>
               <a:t>Commit</a:t>
             </a:r>
-            <a:endParaRPr lang="en-US" dirty="0"/>
           </a:p>
         </p:txBody>
       </p:sp>
@@ -5921,30 +5816,30 @@
           </a:lstStyle>
           <a:p>
             <a:r>
-              <a:rPr lang="en-US" dirty="0" smtClean="0"/>
+              <a:rPr lang="en-US" dirty="0"/>
               <a:t>$ cd repo</a:t>
             </a:r>
           </a:p>
           <a:p>
             <a:r>
-              <a:rPr lang="en-US" dirty="0" smtClean="0"/>
+              <a:rPr lang="en-US" dirty="0"/>
               <a:t>$ git </a:t>
             </a:r>
             <a:r>
-              <a:rPr lang="en-US" dirty="0" err="1" smtClean="0"/>
+              <a:rPr lang="en-US" dirty="0" err="1"/>
               <a:t>init</a:t>
             </a:r>
-            <a:endParaRPr lang="en-US" dirty="0" smtClean="0"/>
-          </a:p>
-          <a:p>
-            <a:r>
-              <a:rPr lang="en-US" dirty="0" smtClean="0"/>
+            <a:endParaRPr lang="en-US" dirty="0"/>
+          </a:p>
+          <a:p>
+            <a:r>
+              <a:rPr lang="en-US" dirty="0"/>
               <a:t>$ git add .</a:t>
             </a:r>
           </a:p>
           <a:p>
             <a:r>
-              <a:rPr lang="en-US" dirty="0" smtClean="0"/>
+              <a:rPr lang="en-US" dirty="0"/>
               <a:t>$ git commit -m "Work Complete"</a:t>
             </a:r>
           </a:p>
@@ -5963,13 +5858,6 @@
   <p:transition spd="med">
     <p:fade/>
   </p:transition>
-  <p:timing>
-    <p:tnLst>
-      <p:par>
-        <p:cTn id="1" dur="indefinite" restart="never" nodeType="tmRoot"/>
-      </p:par>
-    </p:tnLst>
-  </p:timing>
 </p:sldLayout>
 </file>
 
@@ -6022,7 +5910,7 @@
           <a:lstStyle/>
           <a:p>
             <a:r>
-              <a:rPr lang="en-US" smtClean="0"/>
+              <a:rPr lang="en-US"/>
               <a:t>Click to edit Master title style</a:t>
             </a:r>
             <a:endParaRPr lang="en-US" dirty="0"/>
@@ -6114,21 +6002,21 @@
           <a:p>
             <a:pPr lvl="0"/>
             <a:r>
-              <a:rPr lang="en-US" smtClean="0"/>
+              <a:rPr lang="en-US"/>
               <a:t>Click to edit Master text styles</a:t>
             </a:r>
           </a:p>
           <a:p>
             <a:pPr lvl="1"/>
             <a:r>
-              <a:rPr lang="en-US" smtClean="0"/>
+              <a:rPr lang="en-US"/>
               <a:t>Second level</a:t>
             </a:r>
           </a:p>
           <a:p>
             <a:pPr lvl="2"/>
             <a:r>
-              <a:rPr lang="en-US" smtClean="0"/>
+              <a:rPr lang="en-US"/>
               <a:t>Third level</a:t>
             </a:r>
           </a:p>
@@ -6147,13 +6035,6 @@
   <p:transition spd="med">
     <p:fade/>
   </p:transition>
-  <p:timing>
-    <p:tnLst>
-      <p:par>
-        <p:cTn id="1" dur="indefinite" restart="never" nodeType="tmRoot"/>
-      </p:par>
-    </p:tnLst>
-  </p:timing>
 </p:sldLayout>
 </file>
 
@@ -6208,7 +6089,7 @@
               <a:defRPr/>
             </a:pPr>
             <a:r>
-              <a:rPr lang="en-US" sz="16933" dirty="0" smtClean="0">
+              <a:rPr lang="en-US" sz="16933" dirty="0">
                 <a:ln w="18415" cmpd="sng">
                   <a:solidFill>
                     <a:srgbClr val="FFFFFF"/>
@@ -6227,23 +6108,6 @@
               </a:rPr>
               <a:t>DISCUSSION</a:t>
             </a:r>
-            <a:endParaRPr lang="en-US" sz="16933" dirty="0">
-              <a:ln w="18415" cmpd="sng">
-                <a:solidFill>
-                  <a:srgbClr val="FFFFFF"/>
-                </a:solidFill>
-                <a:prstDash val="solid"/>
-              </a:ln>
-              <a:solidFill>
-                <a:schemeClr val="bg2">
-                  <a:lumMod val="95000"/>
-                  <a:alpha val="50000"/>
-                </a:schemeClr>
-              </a:solidFill>
-              <a:latin typeface="+mn-lt"/>
-              <a:ea typeface="+mn-ea"/>
-              <a:cs typeface="+mn-cs"/>
-            </a:endParaRPr>
           </a:p>
         </p:txBody>
       </p:sp>
@@ -6309,10 +6173,9 @@
           </a:lstStyle>
           <a:p>
             <a:r>
-              <a:rPr lang="en-US" dirty="0" smtClean="0"/>
+              <a:rPr lang="en-US" dirty="0"/>
               <a:t>Discussion</a:t>
             </a:r>
-            <a:endParaRPr lang="en-US" dirty="0"/>
           </a:p>
         </p:txBody>
       </p:sp>
@@ -6439,7 +6302,7 @@
           </a:lstStyle>
           <a:p>
             <a:r>
-              <a:rPr lang="en-US" dirty="0" smtClean="0"/>
+              <a:rPr lang="en-US" dirty="0"/>
               <a:t>Questions</a:t>
             </a:r>
           </a:p>
@@ -6458,13 +6321,6 @@
   <p:transition spd="med">
     <p:fade/>
   </p:transition>
-  <p:timing>
-    <p:tnLst>
-      <p:par>
-        <p:cTn id="1" dur="indefinite" restart="never" nodeType="tmRoot"/>
-      </p:par>
-    </p:tnLst>
-  </p:timing>
 </p:sldLayout>
 </file>
 
@@ -6538,14 +6394,14 @@
           </a:ln>
           <a:extLst>
             <a:ext uri="{909E8E84-426E-40dd-AFC4-6F175D3DCCD1}">
-              <a14:hiddenFill xmlns:a14="http://schemas.microsoft.com/office/drawing/2010/main" xmlns="">
+              <a14:hiddenFill xmlns="" xmlns:a14="http://schemas.microsoft.com/office/drawing/2010/main">
                 <a:solidFill>
                   <a:srgbClr val="FFFFFF"/>
                 </a:solidFill>
               </a14:hiddenFill>
             </a:ext>
             <a:ext uri="{91240B29-F687-4f45-9708-019B960494DF}">
-              <a14:hiddenLine xmlns:a14="http://schemas.microsoft.com/office/drawing/2010/main" xmlns="" w="9525">
+              <a14:hiddenLine xmlns="" xmlns:a14="http://schemas.microsoft.com/office/drawing/2010/main" w="9525">
                 <a:solidFill>
                   <a:srgbClr val="000000"/>
                 </a:solidFill>
@@ -6677,7 +6533,7 @@
           <a:p>
             <a:pPr lvl="0"/>
             <a:r>
-              <a:rPr lang="en-US" dirty="0" smtClean="0"/>
+              <a:rPr lang="en-US" dirty="0"/>
               <a:t>RESULT</a:t>
             </a:r>
           </a:p>
@@ -6724,7 +6580,7 @@
           <a:p>
             <a:pPr lvl="0"/>
             <a:r>
-              <a:rPr lang="en-US" dirty="0" smtClean="0"/>
+              <a:rPr lang="en-US" dirty="0"/>
               <a:t>&gt; command</a:t>
             </a:r>
           </a:p>
@@ -6776,7 +6632,7 @@
           <a:p>
             <a:pPr lvl="0"/>
             <a:r>
-              <a:rPr lang="en-US" dirty="0" smtClean="0"/>
+              <a:rPr lang="en-US" dirty="0"/>
               <a:t> </a:t>
             </a:r>
           </a:p>
@@ -6804,7 +6660,7 @@
           </a:lstStyle>
           <a:p>
             <a:r>
-              <a:rPr lang="en-US" smtClean="0"/>
+              <a:rPr lang="en-US"/>
               <a:t>Click to edit Master title style</a:t>
             </a:r>
             <a:endParaRPr lang="en-US" dirty="0"/>
@@ -6824,13 +6680,6 @@
   <p:transition spd="med">
     <p:fade/>
   </p:transition>
-  <p:timing>
-    <p:tnLst>
-      <p:par>
-        <p:cTn id="1" dur="indefinite" restart="never" nodeType="tmRoot"/>
-      </p:par>
-    </p:tnLst>
-  </p:timing>
 </p:sldLayout>
 </file>
 
@@ -6894,7 +6743,7 @@
           </a:lstStyle>
           <a:p>
             <a:r>
-              <a:rPr lang="en-US" smtClean="0"/>
+              <a:rPr lang="en-US"/>
               <a:t>Click to edit Master title style</a:t>
             </a:r>
             <a:endParaRPr lang="en-US" dirty="0"/>
@@ -6958,7 +6807,7 @@
           <a:p>
             <a:pPr lvl="0"/>
             <a:r>
-              <a:rPr lang="en-US" dirty="0" smtClean="0"/>
+              <a:rPr lang="en-US" dirty="0"/>
               <a:t>command or result</a:t>
             </a:r>
           </a:p>
@@ -7004,21 +6853,21 @@
           <a:p>
             <a:pPr lvl="0"/>
             <a:r>
-              <a:rPr lang="en-US" smtClean="0"/>
+              <a:rPr lang="en-US"/>
               <a:t>Click to edit Master text styles</a:t>
             </a:r>
           </a:p>
           <a:p>
             <a:pPr lvl="1"/>
             <a:r>
-              <a:rPr lang="en-US" smtClean="0"/>
+              <a:rPr lang="en-US"/>
               <a:t>Second level</a:t>
             </a:r>
           </a:p>
           <a:p>
             <a:pPr lvl="2"/>
             <a:r>
-              <a:rPr lang="en-US" smtClean="0"/>
+              <a:rPr lang="en-US"/>
               <a:t>Third level</a:t>
             </a:r>
           </a:p>
@@ -7037,13 +6886,6 @@
   <p:transition spd="med">
     <p:fade/>
   </p:transition>
-  <p:timing>
-    <p:tnLst>
-      <p:par>
-        <p:cTn id="1" dur="indefinite" restart="never" nodeType="tmRoot"/>
-      </p:par>
-    </p:tnLst>
-  </p:timing>
 </p:sldLayout>
 </file>
 
@@ -7117,14 +6959,14 @@
           </a:ln>
           <a:extLst>
             <a:ext uri="{909E8E84-426E-40dd-AFC4-6F175D3DCCD1}">
-              <a14:hiddenFill xmlns:a14="http://schemas.microsoft.com/office/drawing/2010/main" xmlns="">
+              <a14:hiddenFill xmlns="" xmlns:a14="http://schemas.microsoft.com/office/drawing/2010/main">
                 <a:solidFill>
                   <a:srgbClr val="FFFFFF"/>
                 </a:solidFill>
               </a14:hiddenFill>
             </a:ext>
             <a:ext uri="{91240B29-F687-4f45-9708-019B960494DF}">
-              <a14:hiddenLine xmlns:a14="http://schemas.microsoft.com/office/drawing/2010/main" xmlns="" w="9525">
+              <a14:hiddenLine xmlns="" xmlns:a14="http://schemas.microsoft.com/office/drawing/2010/main" w="9525">
                 <a:solidFill>
                   <a:srgbClr val="000000"/>
                 </a:solidFill>
@@ -7196,7 +7038,7 @@
           </a:lstStyle>
           <a:p>
             <a:r>
-              <a:rPr lang="en-US" smtClean="0"/>
+              <a:rPr lang="en-US"/>
               <a:t>Click to edit Master title style</a:t>
             </a:r>
             <a:endParaRPr lang="en-US" dirty="0"/>
@@ -7290,7 +7132,7 @@
           <a:p>
             <a:pPr lvl="0"/>
             <a:r>
-              <a:rPr lang="en-US" dirty="0" smtClean="0"/>
+              <a:rPr lang="en-US" dirty="0"/>
               <a:t>RESULT</a:t>
             </a:r>
           </a:p>
@@ -7339,7 +7181,7 @@
           <a:p>
             <a:pPr lvl="0"/>
             <a:r>
-              <a:rPr lang="en-US" dirty="0" smtClean="0"/>
+              <a:rPr lang="en-US" dirty="0"/>
               <a:t>&gt; command</a:t>
             </a:r>
           </a:p>
@@ -7391,7 +7233,7 @@
           <a:p>
             <a:pPr lvl="0"/>
             <a:r>
-              <a:rPr lang="en-US" dirty="0" smtClean="0"/>
+              <a:rPr lang="en-US" dirty="0"/>
               <a:t> </a:t>
             </a:r>
           </a:p>
@@ -7410,13 +7252,6 @@
   <p:transition spd="med">
     <p:fade/>
   </p:transition>
-  <p:timing>
-    <p:tnLst>
-      <p:par>
-        <p:cTn id="1" dur="indefinite" restart="never" nodeType="tmRoot"/>
-      </p:par>
-    </p:tnLst>
-  </p:timing>
 </p:sldLayout>
 </file>
 
@@ -7480,7 +7315,7 @@
           </a:lstStyle>
           <a:p>
             <a:r>
-              <a:rPr lang="en-US" smtClean="0"/>
+              <a:rPr lang="en-US"/>
               <a:t>Click to edit Master title style</a:t>
             </a:r>
             <a:endParaRPr lang="en-US" dirty="0"/>
@@ -7546,7 +7381,7 @@
           <a:p>
             <a:pPr lvl="0"/>
             <a:r>
-              <a:rPr lang="en-US" dirty="0" smtClean="0"/>
+              <a:rPr lang="en-US" dirty="0"/>
               <a:t>command or result</a:t>
             </a:r>
           </a:p>
@@ -7592,21 +7427,21 @@
           <a:p>
             <a:pPr lvl="0"/>
             <a:r>
-              <a:rPr lang="en-US" smtClean="0"/>
+              <a:rPr lang="en-US"/>
               <a:t>Click to edit Master text styles</a:t>
             </a:r>
           </a:p>
           <a:p>
             <a:pPr lvl="1"/>
             <a:r>
-              <a:rPr lang="en-US" smtClean="0"/>
+              <a:rPr lang="en-US"/>
               <a:t>Second level</a:t>
             </a:r>
           </a:p>
           <a:p>
             <a:pPr lvl="2"/>
             <a:r>
-              <a:rPr lang="en-US" smtClean="0"/>
+              <a:rPr lang="en-US"/>
               <a:t>Third level</a:t>
             </a:r>
           </a:p>
@@ -7625,13 +7460,6 @@
   <p:transition spd="med">
     <p:fade/>
   </p:transition>
-  <p:timing>
-    <p:tnLst>
-      <p:par>
-        <p:cTn id="1" dur="indefinite" restart="never" nodeType="tmRoot"/>
-      </p:par>
-    </p:tnLst>
-  </p:timing>
 </p:sldLayout>
 </file>
 
@@ -7705,14 +7533,14 @@
           </a:ln>
           <a:extLst>
             <a:ext uri="{909E8E84-426E-40dd-AFC4-6F175D3DCCD1}">
-              <a14:hiddenFill xmlns:a14="http://schemas.microsoft.com/office/drawing/2010/main" xmlns="">
+              <a14:hiddenFill xmlns="" xmlns:a14="http://schemas.microsoft.com/office/drawing/2010/main">
                 <a:solidFill>
                   <a:srgbClr val="FFFFFF"/>
                 </a:solidFill>
               </a14:hiddenFill>
             </a:ext>
             <a:ext uri="{91240B29-F687-4f45-9708-019B960494DF}">
-              <a14:hiddenLine xmlns:a14="http://schemas.microsoft.com/office/drawing/2010/main" xmlns="" w="9525">
+              <a14:hiddenLine xmlns="" xmlns:a14="http://schemas.microsoft.com/office/drawing/2010/main" w="9525">
                 <a:solidFill>
                   <a:srgbClr val="000000"/>
                 </a:solidFill>
@@ -7749,7 +7577,7 @@
           </a:lstStyle>
           <a:p>
             <a:r>
-              <a:rPr lang="en-US" smtClean="0"/>
+              <a:rPr lang="en-US"/>
               <a:t>Click to edit Master title style</a:t>
             </a:r>
             <a:endParaRPr lang="en-US" dirty="0"/>
@@ -7819,7 +7647,7 @@
           <a:p>
             <a:pPr lvl="0"/>
             <a:r>
-              <a:rPr lang="en-US" dirty="0" smtClean="0"/>
+              <a:rPr lang="en-US" dirty="0"/>
               <a:t>SOURCE</a:t>
             </a:r>
           </a:p>
@@ -7863,22 +7691,22 @@
           <a:p>
             <a:pPr lvl="0"/>
             <a:r>
-              <a:rPr lang="en-US" dirty="0" smtClean="0"/>
+              <a:rPr lang="en-US" dirty="0"/>
               <a:t>/</a:t>
             </a:r>
             <a:r>
-              <a:rPr lang="en-US" dirty="0" err="1" smtClean="0"/>
+              <a:rPr lang="en-US" dirty="0" err="1"/>
               <a:t>filepath</a:t>
             </a:r>
             <a:r>
-              <a:rPr lang="en-US" dirty="0" smtClean="0"/>
+              <a:rPr lang="en-US" dirty="0"/>
               <a:t>/</a:t>
             </a:r>
             <a:r>
-              <a:rPr lang="en-US" dirty="0" err="1" smtClean="0"/>
+              <a:rPr lang="en-US" dirty="0" err="1"/>
               <a:t>file.rb</a:t>
             </a:r>
-            <a:endParaRPr lang="en-US" dirty="0" smtClean="0"/>
+            <a:endParaRPr lang="en-US" dirty="0"/>
           </a:p>
         </p:txBody>
       </p:sp>
@@ -7920,7 +7748,7 @@
           <a:p>
             <a:pPr lvl="0"/>
             <a:r>
-              <a:rPr lang="en-US" dirty="0" smtClean="0"/>
+              <a:rPr lang="en-US" dirty="0"/>
               <a:t>-</a:t>
             </a:r>
           </a:p>
@@ -7964,7 +7792,7 @@
           <a:p>
             <a:pPr lvl="0"/>
             <a:r>
-              <a:rPr lang="en-US" dirty="0" smtClean="0"/>
+              <a:rPr lang="en-US" dirty="0"/>
               <a:t>+</a:t>
             </a:r>
           </a:p>
@@ -7983,13 +7811,6 @@
   <p:transition spd="med">
     <p:fade/>
   </p:transition>
-  <p:timing>
-    <p:tnLst>
-      <p:par>
-        <p:cTn id="1" dur="indefinite" restart="never" nodeType="tmRoot"/>
-      </p:par>
-    </p:tnLst>
-  </p:timing>
 </p:sldLayout>
 </file>
 
@@ -8053,7 +7874,7 @@
           </a:lstStyle>
           <a:p>
             <a:r>
-              <a:rPr lang="en-US" smtClean="0"/>
+              <a:rPr lang="en-US"/>
               <a:t>Click to edit Master title style</a:t>
             </a:r>
             <a:endParaRPr lang="en-US" dirty="0"/>
@@ -8111,7 +7932,7 @@
           <a:p>
             <a:pPr lvl="0"/>
             <a:r>
-              <a:rPr lang="en-US" dirty="0" smtClean="0"/>
+              <a:rPr lang="en-US" dirty="0"/>
               <a:t>source code without a file</a:t>
             </a:r>
           </a:p>
@@ -8155,7 +7976,7 @@
           <a:p>
             <a:pPr lvl="0"/>
             <a:r>
-              <a:rPr lang="en-US" dirty="0" smtClean="0"/>
+              <a:rPr lang="en-US" dirty="0"/>
               <a:t>-</a:t>
             </a:r>
           </a:p>
@@ -8199,7 +8020,7 @@
           <a:p>
             <a:pPr lvl="0"/>
             <a:r>
-              <a:rPr lang="en-US" dirty="0" smtClean="0"/>
+              <a:rPr lang="en-US" dirty="0"/>
               <a:t>+</a:t>
             </a:r>
           </a:p>
@@ -8218,13 +8039,6 @@
   <p:transition spd="med">
     <p:fade/>
   </p:transition>
-  <p:timing>
-    <p:tnLst>
-      <p:par>
-        <p:cTn id="1" dur="indefinite" restart="never" nodeType="tmRoot"/>
-      </p:par>
-    </p:tnLst>
-  </p:timing>
 </p:sldLayout>
 </file>
 
@@ -8288,7 +8102,7 @@
           </a:lstStyle>
           <a:p>
             <a:r>
-              <a:rPr lang="en-US" smtClean="0"/>
+              <a:rPr lang="en-US"/>
               <a:t>Click to edit Master title style</a:t>
             </a:r>
             <a:endParaRPr lang="en-US" dirty="0"/>
@@ -8346,7 +8160,7 @@
           <a:p>
             <a:pPr lvl="0"/>
             <a:r>
-              <a:rPr lang="en-US" dirty="0" smtClean="0"/>
+              <a:rPr lang="en-US" dirty="0"/>
               <a:t>source code</a:t>
             </a:r>
           </a:p>
@@ -8392,21 +8206,21 @@
           <a:p>
             <a:pPr lvl="0"/>
             <a:r>
-              <a:rPr lang="en-US" smtClean="0"/>
+              <a:rPr lang="en-US"/>
               <a:t>Click to edit Master text styles</a:t>
             </a:r>
           </a:p>
           <a:p>
             <a:pPr lvl="1"/>
             <a:r>
-              <a:rPr lang="en-US" smtClean="0"/>
+              <a:rPr lang="en-US"/>
               <a:t>Second level</a:t>
             </a:r>
           </a:p>
           <a:p>
             <a:pPr lvl="2"/>
             <a:r>
-              <a:rPr lang="en-US" smtClean="0"/>
+              <a:rPr lang="en-US"/>
               <a:t>Third level</a:t>
             </a:r>
           </a:p>
@@ -8450,7 +8264,7 @@
           <a:p>
             <a:pPr lvl="0"/>
             <a:r>
-              <a:rPr lang="en-US" dirty="0" smtClean="0"/>
+              <a:rPr lang="en-US" dirty="0"/>
               <a:t>-</a:t>
             </a:r>
           </a:p>
@@ -8494,7 +8308,7 @@
           <a:p>
             <a:pPr lvl="0"/>
             <a:r>
-              <a:rPr lang="en-US" dirty="0" smtClean="0"/>
+              <a:rPr lang="en-US" dirty="0"/>
               <a:t>+</a:t>
             </a:r>
           </a:p>
@@ -8513,13 +8327,6 @@
   <p:transition spd="med">
     <p:fade/>
   </p:transition>
-  <p:timing>
-    <p:tnLst>
-      <p:par>
-        <p:cTn id="1" dur="indefinite" restart="never" nodeType="tmRoot"/>
-      </p:par>
-    </p:tnLst>
-  </p:timing>
 </p:sldLayout>
 </file>
 
@@ -8584,7 +8391,7 @@
           <a:lstStyle/>
           <a:p>
             <a:r>
-              <a:rPr lang="en-CA" dirty="0" smtClean="0"/>
+              <a:rPr lang="en-CA" dirty="0"/>
               <a:t>Title Text</a:t>
             </a:r>
             <a:endParaRPr lang="en-US" dirty="0"/>
@@ -8618,21 +8425,21 @@
           <a:p>
             <a:pPr lvl="0"/>
             <a:r>
-              <a:rPr lang="en-US" dirty="0" smtClean="0"/>
+              <a:rPr lang="en-US" dirty="0"/>
               <a:t>Click to edit Master text styles</a:t>
             </a:r>
           </a:p>
           <a:p>
             <a:pPr lvl="1"/>
             <a:r>
-              <a:rPr lang="en-US" dirty="0" smtClean="0"/>
+              <a:rPr lang="en-US" dirty="0"/>
               <a:t>Second level</a:t>
             </a:r>
           </a:p>
           <a:p>
             <a:pPr lvl="2"/>
             <a:r>
-              <a:rPr lang="en-US" dirty="0" smtClean="0"/>
+              <a:rPr lang="en-US" dirty="0"/>
               <a:t>Third level</a:t>
             </a:r>
           </a:p>
@@ -8673,14 +8480,14 @@
           </a:ln>
           <a:extLst>
             <a:ext uri="{909E8E84-426E-40dd-AFC4-6F175D3DCCD1}">
-              <a14:hiddenFill xmlns:a14="http://schemas.microsoft.com/office/drawing/2010/main" xmlns="">
+              <a14:hiddenFill xmlns="" xmlns:a14="http://schemas.microsoft.com/office/drawing/2010/main">
                 <a:solidFill>
                   <a:srgbClr val="FFFFFF"/>
                 </a:solidFill>
               </a14:hiddenFill>
             </a:ext>
             <a:ext uri="{91240B29-F687-4f45-9708-019B960494DF}">
-              <a14:hiddenLine xmlns:a14="http://schemas.microsoft.com/office/drawing/2010/main" xmlns="" w="9525">
+              <a14:hiddenLine xmlns="" xmlns:a14="http://schemas.microsoft.com/office/drawing/2010/main" w="9525">
                 <a:solidFill>
                   <a:srgbClr val="000000"/>
                 </a:solidFill>
@@ -8760,7 +8567,7 @@
               <a:defRPr/>
             </a:pPr>
             <a:r>
-              <a:rPr lang="en-US" dirty="0" smtClean="0">
+              <a:rPr lang="en-US" dirty="0">
                 <a:solidFill>
                   <a:srgbClr val="7D868C"/>
                 </a:solidFill>
@@ -8771,7 +8578,7 @@
               <a:t>©</a:t>
             </a:r>
             <a:r>
-              <a:rPr lang="is-IS" dirty="0" smtClean="0">
+              <a:rPr lang="is-IS" dirty="0">
                 <a:solidFill>
                   <a:srgbClr val="7D868C"/>
                 </a:solidFill>
@@ -8782,7 +8589,7 @@
               <a:t>2017</a:t>
             </a:r>
             <a:r>
-              <a:rPr lang="en-US" dirty="0" smtClean="0">
+              <a:rPr lang="en-US" dirty="0">
                 <a:solidFill>
                   <a:srgbClr val="7D868C"/>
                 </a:solidFill>
@@ -8790,18 +8597,7 @@
                 <a:ea typeface="+mn-ea"/>
                 <a:cs typeface="+mn-cs"/>
               </a:rPr>
-              <a:t> </a:t>
-            </a:r>
-            <a:r>
-              <a:rPr lang="en-US" dirty="0">
-                <a:solidFill>
-                  <a:srgbClr val="7D868C"/>
-                </a:solidFill>
-                <a:latin typeface="+mn-lt"/>
-                <a:ea typeface="+mn-ea"/>
-                <a:cs typeface="+mn-cs"/>
-              </a:rPr>
-              <a:t>Chef Software Inc</a:t>
+              <a:t> Chef Software Inc</a:t>
             </a:r>
             <a:r>
               <a:rPr lang="en-US" dirty="0">
@@ -8922,13 +8718,6 @@
   <p:transition spd="med">
     <p:fade/>
   </p:transition>
-  <p:timing>
-    <p:tnLst>
-      <p:par>
-        <p:cTn id="1" dur="indefinite" restart="never" nodeType="tmRoot"/>
-      </p:par>
-    </p:tnLst>
-  </p:timing>
   <p:hf hdr="0" dt="0"/>
   <p:txStyles>
     <p:titleStyle>
@@ -9411,7 +9200,7 @@
           <a:lstStyle/>
           <a:p>
             <a:r>
-              <a:rPr lang="en-CA" dirty="0" smtClean="0"/>
+              <a:rPr lang="en-CA" dirty="0"/>
               <a:t>Title Text</a:t>
             </a:r>
             <a:endParaRPr lang="en-US" dirty="0"/>
@@ -9453,14 +9242,14 @@
           </a:ln>
           <a:extLst>
             <a:ext uri="{909E8E84-426E-40dd-AFC4-6F175D3DCCD1}">
-              <a14:hiddenFill xmlns:a14="http://schemas.microsoft.com/office/drawing/2010/main" xmlns="">
+              <a14:hiddenFill xmlns="" xmlns:a14="http://schemas.microsoft.com/office/drawing/2010/main">
                 <a:solidFill>
                   <a:srgbClr val="FFFFFF"/>
                 </a:solidFill>
               </a14:hiddenFill>
             </a:ext>
             <a:ext uri="{91240B29-F687-4f45-9708-019B960494DF}">
-              <a14:hiddenLine xmlns:a14="http://schemas.microsoft.com/office/drawing/2010/main" xmlns="" w="9525">
+              <a14:hiddenLine xmlns="" xmlns:a14="http://schemas.microsoft.com/office/drawing/2010/main" w="9525">
                 <a:solidFill>
                   <a:srgbClr val="000000"/>
                 </a:solidFill>
@@ -9540,7 +9329,7 @@
               <a:defRPr/>
             </a:pPr>
             <a:r>
-              <a:rPr lang="en-US" dirty="0" smtClean="0">
+              <a:rPr lang="en-US" dirty="0">
                 <a:solidFill>
                   <a:srgbClr val="7D868C"/>
                 </a:solidFill>
@@ -9551,7 +9340,7 @@
               <a:t>©</a:t>
             </a:r>
             <a:r>
-              <a:rPr lang="is-IS" dirty="0" smtClean="0">
+              <a:rPr lang="is-IS" dirty="0">
                 <a:solidFill>
                   <a:srgbClr val="7D868C"/>
                 </a:solidFill>
@@ -9562,7 +9351,7 @@
               <a:t>2017</a:t>
             </a:r>
             <a:r>
-              <a:rPr lang="en-US" dirty="0" smtClean="0">
+              <a:rPr lang="en-US" dirty="0">
                 <a:solidFill>
                   <a:srgbClr val="7D868C"/>
                 </a:solidFill>
@@ -9570,18 +9359,7 @@
                 <a:ea typeface="+mn-ea"/>
                 <a:cs typeface="+mn-cs"/>
               </a:rPr>
-              <a:t> </a:t>
-            </a:r>
-            <a:r>
-              <a:rPr lang="en-US" dirty="0">
-                <a:solidFill>
-                  <a:srgbClr val="7D868C"/>
-                </a:solidFill>
-                <a:latin typeface="+mn-lt"/>
-                <a:ea typeface="+mn-ea"/>
-                <a:cs typeface="+mn-cs"/>
-              </a:rPr>
-              <a:t>Chef Software Inc</a:t>
+              <a:t> Chef Software Inc</a:t>
             </a:r>
             <a:r>
               <a:rPr lang="en-US" dirty="0">
@@ -9773,13 +9551,6 @@
   <p:transition spd="med">
     <p:fade/>
   </p:transition>
-  <p:timing>
-    <p:tnLst>
-      <p:par>
-        <p:cTn id="1" dur="indefinite" restart="never" nodeType="tmRoot"/>
-      </p:par>
-    </p:tnLst>
-  </p:timing>
   <p:hf hdr="0" dt="0"/>
   <p:txStyles>
     <p:titleStyle>
@@ -10234,10 +10005,9 @@
           <a:lstStyle/>
           <a:p>
             <a:r>
-              <a:rPr lang="en-US" dirty="0" smtClean="0"/>
+              <a:rPr lang="en-US" dirty="0"/>
               <a:t>Chef Intermediate</a:t>
             </a:r>
-            <a:endParaRPr lang="en-US" dirty="0"/>
           </a:p>
         </p:txBody>
       </p:sp>
@@ -10290,6 +10060,205 @@
           </a:prstGeom>
         </p:spPr>
       </p:pic>
+      <p:sp>
+        <p:nvSpPr>
+          <p:cNvPr id="5" name="Footer Placeholder 2">
+            <a:extLst>
+              <a:ext uri="{FF2B5EF4-FFF2-40B4-BE49-F238E27FC236}">
+                <a16:creationId xmlns:a16="http://schemas.microsoft.com/office/drawing/2014/main" id="{6D4DC3BC-C243-4D17-8EB3-A6BD09749147}"/>
+              </a:ext>
+            </a:extLst>
+          </p:cNvPr>
+          <p:cNvSpPr txBox="1">
+            <a:spLocks/>
+          </p:cNvSpPr>
+          <p:nvPr/>
+        </p:nvSpPr>
+        <p:spPr bwMode="white">
+          <a:xfrm>
+            <a:off x="11802843" y="8529789"/>
+            <a:ext cx="3693831" cy="461665"/>
+          </a:xfrm>
+          <a:prstGeom prst="rect">
+            <a:avLst/>
+          </a:prstGeom>
+        </p:spPr>
+        <p:txBody>
+          <a:bodyPr vert="horz" wrap="square" lIns="91440" tIns="91440" rIns="91440" bIns="91440" rtlCol="0">
+            <a:spAutoFit/>
+          </a:bodyPr>
+          <a:lstStyle>
+            <a:lvl1pPr marL="0" indent="0" algn="l" defTabSz="1217613" rtl="0" eaLnBrk="1" fontAlgn="base" hangingPunct="1">
+              <a:spcBef>
+                <a:spcPts val="800"/>
+              </a:spcBef>
+              <a:spcAft>
+                <a:spcPct val="0"/>
+              </a:spcAft>
+              <a:buSzPct val="90000"/>
+              <a:buFont typeface="Arial" charset="0"/>
+              <a:buNone/>
+              <a:defRPr sz="2133" b="0" kern="1200" baseline="0">
+                <a:solidFill>
+                  <a:schemeClr val="accent3">
+                    <a:lumMod val="50000"/>
+                  </a:schemeClr>
+                </a:solidFill>
+                <a:latin typeface="+mn-lt"/>
+                <a:ea typeface="ＭＳ Ｐゴシック" charset="0"/>
+                <a:cs typeface="ＭＳ Ｐゴシック" charset="0"/>
+              </a:defRPr>
+            </a:lvl1pPr>
+            <a:lvl2pPr marL="309026" indent="0" algn="l" defTabSz="1217613" rtl="0" eaLnBrk="1" fontAlgn="base" hangingPunct="1">
+              <a:spcBef>
+                <a:spcPts val="800"/>
+              </a:spcBef>
+              <a:spcAft>
+                <a:spcPct val="0"/>
+              </a:spcAft>
+              <a:buSzPct val="90000"/>
+              <a:buFont typeface="Arial" charset="0"/>
+              <a:buNone/>
+              <a:defRPr sz="2133" b="1" kern="1200">
+                <a:solidFill>
+                  <a:srgbClr val="3E4346"/>
+                </a:solidFill>
+                <a:latin typeface="+mn-lt"/>
+                <a:ea typeface="ＭＳ Ｐゴシック" charset="0"/>
+                <a:cs typeface="+mn-cs"/>
+              </a:defRPr>
+            </a:lvl2pPr>
+            <a:lvl3pPr marL="609585" indent="0" algn="l" defTabSz="1217613" rtl="0" eaLnBrk="1" fontAlgn="base" hangingPunct="1">
+              <a:spcBef>
+                <a:spcPts val="800"/>
+              </a:spcBef>
+              <a:spcAft>
+                <a:spcPct val="0"/>
+              </a:spcAft>
+              <a:buSzPct val="90000"/>
+              <a:buFont typeface="Arial" charset="0"/>
+              <a:buNone/>
+              <a:defRPr sz="2133" b="1" kern="1200">
+                <a:solidFill>
+                  <a:srgbClr val="3E4346"/>
+                </a:solidFill>
+                <a:latin typeface="+mn-lt"/>
+                <a:ea typeface="ＭＳ Ｐゴシック" charset="0"/>
+                <a:cs typeface="+mn-cs"/>
+              </a:defRPr>
+            </a:lvl3pPr>
+            <a:lvl4pPr marL="840296" indent="0" algn="l" defTabSz="1217613" rtl="0" eaLnBrk="1" fontAlgn="base" hangingPunct="1">
+              <a:spcBef>
+                <a:spcPts val="800"/>
+              </a:spcBef>
+              <a:spcAft>
+                <a:spcPct val="0"/>
+              </a:spcAft>
+              <a:buSzPct val="90000"/>
+              <a:buFont typeface="Arial" charset="0"/>
+              <a:buNone/>
+              <a:defRPr sz="2133" b="1" kern="1200">
+                <a:solidFill>
+                  <a:srgbClr val="3E4346"/>
+                </a:solidFill>
+                <a:latin typeface="+mn-lt"/>
+                <a:ea typeface="ＭＳ Ｐゴシック" charset="0"/>
+                <a:cs typeface="+mn-cs"/>
+              </a:defRPr>
+            </a:lvl4pPr>
+            <a:lvl5pPr marL="1068889" indent="0" algn="l" defTabSz="1217613" rtl="0" eaLnBrk="1" fontAlgn="base" hangingPunct="1">
+              <a:spcBef>
+                <a:spcPts val="800"/>
+              </a:spcBef>
+              <a:spcAft>
+                <a:spcPct val="0"/>
+              </a:spcAft>
+              <a:buSzPct val="90000"/>
+              <a:buFont typeface="Arial" charset="0"/>
+              <a:buNone/>
+              <a:defRPr sz="2133" b="1" kern="1200">
+                <a:solidFill>
+                  <a:srgbClr val="3E4346"/>
+                </a:solidFill>
+                <a:latin typeface="+mn-lt"/>
+                <a:ea typeface="ＭＳ Ｐゴシック" charset="0"/>
+                <a:cs typeface="+mn-cs"/>
+              </a:defRPr>
+            </a:lvl5pPr>
+            <a:lvl6pPr marL="3352582" indent="-304780" algn="l" defTabSz="1219120" rtl="0" eaLnBrk="1" latinLnBrk="0" hangingPunct="1">
+              <a:spcBef>
+                <a:spcPct val="20000"/>
+              </a:spcBef>
+              <a:buFont typeface="Arial" pitchFamily="34" charset="0"/>
+              <a:buChar char="•"/>
+              <a:defRPr sz="2667" kern="1200">
+                <a:solidFill>
+                  <a:schemeClr val="tx1"/>
+                </a:solidFill>
+                <a:latin typeface="+mn-lt"/>
+                <a:ea typeface="+mn-ea"/>
+                <a:cs typeface="+mn-cs"/>
+              </a:defRPr>
+            </a:lvl6pPr>
+            <a:lvl7pPr marL="3962142" indent="-304780" algn="l" defTabSz="1219120" rtl="0" eaLnBrk="1" latinLnBrk="0" hangingPunct="1">
+              <a:spcBef>
+                <a:spcPct val="20000"/>
+              </a:spcBef>
+              <a:buFont typeface="Arial" pitchFamily="34" charset="0"/>
+              <a:buChar char="•"/>
+              <a:defRPr sz="2667" kern="1200">
+                <a:solidFill>
+                  <a:schemeClr val="tx1"/>
+                </a:solidFill>
+                <a:latin typeface="+mn-lt"/>
+                <a:ea typeface="+mn-ea"/>
+                <a:cs typeface="+mn-cs"/>
+              </a:defRPr>
+            </a:lvl7pPr>
+            <a:lvl8pPr marL="4571703" indent="-304780" algn="l" defTabSz="1219120" rtl="0" eaLnBrk="1" latinLnBrk="0" hangingPunct="1">
+              <a:spcBef>
+                <a:spcPct val="20000"/>
+              </a:spcBef>
+              <a:buFont typeface="Arial" pitchFamily="34" charset="0"/>
+              <a:buChar char="•"/>
+              <a:defRPr sz="2667" kern="1200">
+                <a:solidFill>
+                  <a:schemeClr val="tx1"/>
+                </a:solidFill>
+                <a:latin typeface="+mn-lt"/>
+                <a:ea typeface="+mn-ea"/>
+                <a:cs typeface="+mn-cs"/>
+              </a:defRPr>
+            </a:lvl8pPr>
+            <a:lvl9pPr marL="5181264" indent="-304780" algn="l" defTabSz="1219120" rtl="0" eaLnBrk="1" latinLnBrk="0" hangingPunct="1">
+              <a:spcBef>
+                <a:spcPct val="20000"/>
+              </a:spcBef>
+              <a:buFont typeface="Arial" pitchFamily="34" charset="0"/>
+              <a:buChar char="•"/>
+              <a:defRPr sz="2667" kern="1200">
+                <a:solidFill>
+                  <a:schemeClr val="tx1"/>
+                </a:solidFill>
+                <a:latin typeface="+mn-lt"/>
+                <a:ea typeface="+mn-ea"/>
+                <a:cs typeface="+mn-cs"/>
+              </a:defRPr>
+            </a:lvl9pPr>
+          </a:lstStyle>
+          <a:p>
+            <a:pPr algn="ctr"/>
+            <a:r>
+              <a:rPr lang="en-US" sz="1800" dirty="0">
+                <a:solidFill>
+                  <a:schemeClr val="bg1"/>
+                </a:solidFill>
+              </a:rPr>
+              <a:t>Course v3.0.0</a:t>
+            </a:r>
+          </a:p>
+        </p:txBody>
+      </p:sp>
     </p:spTree>
     <p:extLst>
       <p:ext uri="{BB962C8B-B14F-4D97-AF65-F5344CB8AC3E}">
@@ -10303,13 +10272,6 @@
   <p:transition spd="med">
     <p:fade/>
   </p:transition>
-  <p:timing>
-    <p:tnLst>
-      <p:par>
-        <p:cTn id="1" dur="indefinite" restart="never" nodeType="tmRoot"/>
-      </p:par>
-    </p:tnLst>
-  </p:timing>
 </p:sld>
 </file>
 
@@ -10348,10 +10310,9 @@
           <a:lstStyle/>
           <a:p>
             <a:r>
-              <a:rPr lang="en-US" dirty="0" smtClean="0"/>
+              <a:rPr lang="en-US" dirty="0"/>
               <a:t>Discussion</a:t>
             </a:r>
-            <a:endParaRPr lang="en-US" dirty="0"/>
           </a:p>
         </p:txBody>
       </p:sp>
@@ -10371,7 +10332,7 @@
           <a:lstStyle/>
           <a:p>
             <a:r>
-              <a:rPr lang="en-US" dirty="0" smtClean="0"/>
+              <a:rPr lang="en-US" dirty="0"/>
               <a:t>What topics are you most interested in learning?</a:t>
             </a:r>
           </a:p>
@@ -10380,10 +10341,9 @@
           </a:p>
           <a:p>
             <a:r>
-              <a:rPr lang="en-US" dirty="0" smtClean="0"/>
+              <a:rPr lang="en-US" dirty="0"/>
               <a:t>What topics are missing that you want to learn about?</a:t>
             </a:r>
-            <a:endParaRPr lang="en-US" dirty="0"/>
           </a:p>
         </p:txBody>
       </p:sp>
@@ -10400,13 +10360,6 @@
   <p:transition spd="med">
     <p:fade/>
   </p:transition>
-  <p:timing>
-    <p:tnLst>
-      <p:par>
-        <p:cTn id="1" dur="indefinite" restart="never" nodeType="tmRoot"/>
-      </p:par>
-    </p:tnLst>
-  </p:timing>
 </p:sld>
 </file>
 
@@ -10445,10 +10398,9 @@
           <a:lstStyle/>
           <a:p>
             <a:r>
-              <a:rPr lang="en-US" dirty="0" smtClean="0"/>
+              <a:rPr lang="en-US" dirty="0"/>
               <a:t>Q&amp;A</a:t>
             </a:r>
-            <a:endParaRPr lang="en-US" dirty="0"/>
           </a:p>
         </p:txBody>
       </p:sp>
@@ -10468,10 +10420,9 @@
           <a:lstStyle/>
           <a:p>
             <a:r>
-              <a:rPr lang="en-US" dirty="0" smtClean="0"/>
+              <a:rPr lang="en-US" dirty="0"/>
               <a:t>What questions can we answer for you?</a:t>
             </a:r>
-            <a:endParaRPr lang="en-US" dirty="0"/>
           </a:p>
         </p:txBody>
       </p:sp>
@@ -10488,13 +10439,6 @@
   <p:transition spd="med">
     <p:fade/>
   </p:transition>
-  <p:timing>
-    <p:tnLst>
-      <p:par>
-        <p:cTn id="1" dur="indefinite" restart="never" nodeType="tmRoot"/>
-      </p:par>
-    </p:tnLst>
-  </p:timing>
 </p:sld>
 </file>
 
@@ -10528,13 +10472,6 @@
   <p:transition spd="med">
     <p:fade/>
   </p:transition>
-  <p:timing>
-    <p:tnLst>
-      <p:par>
-        <p:cTn id="1" dur="indefinite" restart="never" nodeType="tmRoot"/>
-      </p:par>
-    </p:tnLst>
-  </p:timing>
 </p:sld>
 </file>
 
@@ -10571,10 +10508,9 @@
           <a:lstStyle/>
           <a:p>
             <a:r>
-              <a:rPr lang="en-US" dirty="0" smtClean="0"/>
+              <a:rPr lang="en-US" dirty="0"/>
               <a:t>Introduce Yourselves</a:t>
             </a:r>
-            <a:endParaRPr lang="en-US" dirty="0"/>
           </a:p>
         </p:txBody>
       </p:sp>
@@ -10594,34 +10530,33 @@
           <a:lstStyle/>
           <a:p>
             <a:r>
-              <a:rPr lang="en-US" dirty="0" smtClean="0"/>
+              <a:rPr lang="en-US" dirty="0"/>
               <a:t>Name</a:t>
             </a:r>
           </a:p>
           <a:p>
             <a:r>
-              <a:rPr lang="en-US" dirty="0" smtClean="0"/>
+              <a:rPr lang="en-US" dirty="0"/>
               <a:t>Current job role</a:t>
             </a:r>
           </a:p>
           <a:p>
             <a:r>
-              <a:rPr lang="en-US" dirty="0" smtClean="0"/>
+              <a:rPr lang="en-US" dirty="0"/>
               <a:t>Previous job roles / Background</a:t>
             </a:r>
           </a:p>
           <a:p>
             <a:r>
-              <a:rPr lang="en-US" dirty="0" smtClean="0"/>
+              <a:rPr lang="en-US" dirty="0"/>
               <a:t>Experience with Chef</a:t>
             </a:r>
           </a:p>
           <a:p>
             <a:r>
-              <a:rPr lang="en-US" dirty="0" smtClean="0"/>
+              <a:rPr lang="en-US" dirty="0"/>
               <a:t>Favorite Text Editor</a:t>
             </a:r>
-            <a:endParaRPr lang="en-US" dirty="0"/>
           </a:p>
         </p:txBody>
       </p:sp>
@@ -10638,13 +10573,6 @@
   <p:transition spd="med">
     <p:fade/>
   </p:transition>
-  <p:timing>
-    <p:tnLst>
-      <p:par>
-        <p:cTn id="1" dur="indefinite" restart="never" nodeType="tmRoot"/>
-      </p:par>
-    </p:tnLst>
-  </p:timing>
 </p:sld>
 </file>
 
@@ -10681,10 +10609,9 @@
           <a:lstStyle/>
           <a:p>
             <a:r>
-              <a:rPr lang="en-US" dirty="0" smtClean="0"/>
+              <a:rPr lang="en-US" dirty="0"/>
               <a:t>Expectations</a:t>
             </a:r>
-            <a:endParaRPr lang="en-US" dirty="0"/>
           </a:p>
         </p:txBody>
       </p:sp>
@@ -10706,32 +10633,19 @@
             <a:pPr marL="0" lvl="1"/>
             <a:r>
               <a:rPr lang="en-US" sz="3600" dirty="0"/>
-              <a:t>You will leave this class </a:t>
-            </a:r>
-            <a:r>
-              <a:rPr lang="en-US" sz="3600" dirty="0" smtClean="0"/>
-              <a:t>with the ability to extend the components of Cookbooks.</a:t>
+              <a:t>You will leave this class with the ability to extend the components of Cookbooks.</a:t>
             </a:r>
           </a:p>
           <a:p>
             <a:pPr marL="0" lvl="1"/>
-            <a:endParaRPr lang="en-US" sz="3600" dirty="0" smtClean="0"/>
+            <a:endParaRPr lang="en-US" sz="3600" dirty="0"/>
           </a:p>
           <a:p>
             <a:pPr marL="0" lvl="1"/>
             <a:r>
-              <a:rPr lang="en-US" sz="3600" dirty="0" smtClean="0"/>
-              <a:t>You </a:t>
-            </a:r>
-            <a:r>
               <a:rPr lang="en-US" sz="3600" dirty="0"/>
-              <a:t>bring with you your own domain expertise and problems. Chef is a framework for solving those problems. Our job is to teach you how to express solutions to your problems with Chef</a:t>
-            </a:r>
-            <a:r>
-              <a:rPr lang="en-US" sz="3600" dirty="0" smtClean="0"/>
-              <a:t>.</a:t>
-            </a:r>
-            <a:endParaRPr lang="en-US" sz="3600" dirty="0"/>
+              <a:t>You bring with you your own domain expertise and problems. Chef is a framework for solving those problems. Our job is to teach you how to express solutions to your problems with Chef.</a:t>
+            </a:r>
           </a:p>
         </p:txBody>
       </p:sp>
@@ -10748,13 +10662,6 @@
   <p:transition spd="med">
     <p:fade/>
   </p:transition>
-  <p:timing>
-    <p:tnLst>
-      <p:par>
-        <p:cTn id="1" dur="indefinite" restart="never" nodeType="tmRoot"/>
-      </p:par>
-    </p:tnLst>
-  </p:timing>
 </p:sld>
 </file>
 
@@ -10791,10 +10698,9 @@
           <a:lstStyle/>
           <a:p>
             <a:r>
-              <a:rPr lang="en-US" dirty="0" smtClean="0"/>
+              <a:rPr lang="en-US" dirty="0"/>
               <a:t>Expectations</a:t>
             </a:r>
-            <a:endParaRPr lang="en-US" dirty="0"/>
           </a:p>
         </p:txBody>
       </p:sp>
@@ -10814,11 +10720,11 @@
           <a:lstStyle/>
           <a:p>
             <a:r>
-              <a:rPr lang="en-US" sz="3600" b="1" dirty="0" smtClean="0"/>
+              <a:rPr lang="en-US" sz="3600" b="1" dirty="0"/>
               <a:t>Ask Me Anything:</a:t>
             </a:r>
             <a:r>
-              <a:rPr lang="en-US" sz="3600" dirty="0" smtClean="0"/>
+              <a:rPr lang="en-US" sz="3600" dirty="0"/>
               <a:t> It is important that we answer your questions and set you on the path to be able to find more answers.</a:t>
             </a:r>
           </a:p>
@@ -10827,14 +10733,13 @@
           </a:p>
           <a:p>
             <a:r>
-              <a:rPr lang="en-US" sz="3600" b="1" dirty="0" smtClean="0"/>
+              <a:rPr lang="en-US" sz="3600" b="1" dirty="0"/>
               <a:t>Break It: </a:t>
             </a:r>
             <a:r>
-              <a:rPr lang="en-US" sz="3600" dirty="0" smtClean="0"/>
+              <a:rPr lang="en-US" sz="3600" dirty="0"/>
               <a:t>If everything works the first time go back and make some changes. Explore! Discovering the boundaries will help you when you continue on your journey.</a:t>
             </a:r>
-            <a:endParaRPr lang="en-US" sz="3600" dirty="0"/>
           </a:p>
         </p:txBody>
       </p:sp>
@@ -10851,13 +10756,6 @@
   <p:transition spd="med">
     <p:fade/>
   </p:transition>
-  <p:timing>
-    <p:tnLst>
-      <p:par>
-        <p:cTn id="1" dur="indefinite" restart="never" nodeType="tmRoot"/>
-      </p:par>
-    </p:tnLst>
-  </p:timing>
 </p:sld>
 </file>
 
@@ -10894,10 +10792,9 @@
           <a:lstStyle/>
           <a:p>
             <a:r>
-              <a:rPr lang="en-US" dirty="0" smtClean="0"/>
+              <a:rPr lang="en-US" dirty="0"/>
               <a:t>Group Exercises, Labs, and Discussion</a:t>
             </a:r>
-            <a:endParaRPr lang="en-US" dirty="0"/>
           </a:p>
         </p:txBody>
       </p:sp>
@@ -10922,7 +10819,7 @@
           <a:lstStyle/>
           <a:p>
             <a:r>
-              <a:rPr lang="en-US" dirty="0" smtClean="0"/>
+              <a:rPr lang="en-US" dirty="0"/>
               <a:t>This course is designed to be hands on. You will run lots of commands, write lots of code, and express your understanding.</a:t>
             </a:r>
           </a:p>
@@ -10939,14 +10836,13 @@
               <a:buChar char="•"/>
             </a:pPr>
             <a:r>
-              <a:rPr lang="en-US" b="1" dirty="0" smtClean="0"/>
+              <a:rPr lang="en-US" b="1" dirty="0"/>
               <a:t>Group Exercises: </a:t>
             </a:r>
             <a:r>
-              <a:rPr lang="en-US" dirty="0" smtClean="0"/>
+              <a:rPr lang="en-US" dirty="0"/>
               <a:t>All participants and the instructor will work through the content together. The instructor will often lead the way and explain things as we proceed.</a:t>
             </a:r>
-            <a:endParaRPr lang="en-US" dirty="0"/>
           </a:p>
           <a:p>
             <a:pPr marL="457200" indent="-457200">
@@ -10954,14 +10850,13 @@
               <a:buChar char="•"/>
             </a:pPr>
             <a:r>
-              <a:rPr lang="en-US" b="1" dirty="0" smtClean="0"/>
+              <a:rPr lang="en-US" b="1" dirty="0"/>
               <a:t>Lab:</a:t>
             </a:r>
             <a:r>
-              <a:rPr lang="en-US" dirty="0" smtClean="0"/>
+              <a:rPr lang="en-US" dirty="0"/>
               <a:t> You will be asked to perform the task on your own or in groups.</a:t>
             </a:r>
-            <a:endParaRPr lang="en-US" dirty="0"/>
           </a:p>
           <a:p>
             <a:pPr marL="457200" indent="-457200">
@@ -10969,11 +10864,11 @@
               <a:buChar char="•"/>
             </a:pPr>
             <a:r>
-              <a:rPr lang="en-US" b="1" dirty="0" smtClean="0"/>
+              <a:rPr lang="en-US" b="1" dirty="0"/>
               <a:t>Discussion:</a:t>
             </a:r>
             <a:r>
-              <a:rPr lang="en-US" dirty="0" smtClean="0"/>
+              <a:rPr lang="en-US" dirty="0"/>
               <a:t> As a group we will talk about the concepts introduced and the work that we have completed.</a:t>
             </a:r>
           </a:p>
@@ -10992,13 +10887,6 @@
   <p:transition spd="med">
     <p:fade/>
   </p:transition>
-  <p:timing>
-    <p:tnLst>
-      <p:par>
-        <p:cTn id="1" dur="indefinite" restart="never" nodeType="tmRoot"/>
-      </p:par>
-    </p:tnLst>
-  </p:timing>
 </p:sld>
 </file>
 
@@ -11035,104 +10923,51 @@
           <a:lstStyle/>
           <a:p>
             <a:r>
-              <a:rPr lang="en-US" dirty="0" smtClean="0"/>
+              <a:rPr lang="en-US" dirty="0"/>
               <a:t>Introduction</a:t>
             </a:r>
           </a:p>
           <a:p>
             <a:r>
-              <a:rPr lang="en-US" dirty="0" smtClean="0"/>
-              <a:t>Why </a:t>
-            </a:r>
-            <a:r>
               <a:rPr lang="en-US" dirty="0"/>
-              <a:t>Write Tests? Why is that </a:t>
-            </a:r>
-            <a:r>
-              <a:rPr lang="en-US" dirty="0" smtClean="0"/>
-              <a:t>Hard?</a:t>
-            </a:r>
-          </a:p>
-          <a:p>
-            <a:r>
-              <a:rPr lang="en-US" dirty="0" smtClean="0"/>
-              <a:t>Writing </a:t>
-            </a:r>
+              <a:t>Why Write Tests? Why is that Hard?</a:t>
+            </a:r>
+          </a:p>
+          <a:p>
             <a:r>
               <a:rPr lang="en-US" dirty="0"/>
-              <a:t>a Test </a:t>
-            </a:r>
-            <a:r>
-              <a:rPr lang="en-US" dirty="0" smtClean="0"/>
-              <a:t>First</a:t>
-            </a:r>
-          </a:p>
-          <a:p>
-            <a:r>
-              <a:rPr lang="en-US" dirty="0" smtClean="0"/>
-              <a:t>Refactoring </a:t>
-            </a:r>
+              <a:t>Writing a Test First</a:t>
+            </a:r>
+          </a:p>
+          <a:p>
             <a:r>
               <a:rPr lang="en-US" dirty="0"/>
-              <a:t>Cookbooks with </a:t>
-            </a:r>
-            <a:r>
-              <a:rPr lang="en-US" dirty="0" smtClean="0"/>
-              <a:t>Tests</a:t>
-            </a:r>
-          </a:p>
-          <a:p>
-            <a:r>
-              <a:rPr lang="en-US" dirty="0" smtClean="0"/>
-              <a:t>Faster </a:t>
-            </a:r>
+              <a:t>Refactoring Cookbooks with Tests</a:t>
+            </a:r>
+          </a:p>
+          <a:p>
             <a:r>
               <a:rPr lang="en-US" dirty="0"/>
-              <a:t>Feedback with Unit </a:t>
-            </a:r>
-            <a:r>
-              <a:rPr lang="en-US" dirty="0" smtClean="0"/>
-              <a:t>Testing</a:t>
-            </a:r>
-          </a:p>
-          <a:p>
-            <a:r>
-              <a:rPr lang="en-US" dirty="0" smtClean="0"/>
-              <a:t>Testing </a:t>
-            </a:r>
+              <a:t>Faster Feedback with Unit Testing</a:t>
+            </a:r>
+          </a:p>
+          <a:p>
             <a:r>
               <a:rPr lang="en-US" dirty="0"/>
-              <a:t>Resources in </a:t>
-            </a:r>
-            <a:r>
-              <a:rPr lang="en-US" dirty="0" smtClean="0"/>
-              <a:t>Recipes</a:t>
-            </a:r>
-          </a:p>
-          <a:p>
-            <a:r>
-              <a:rPr lang="en-US" dirty="0" smtClean="0"/>
-              <a:t>Refactoring </a:t>
-            </a:r>
+              <a:t>Testing Resources in Recipes</a:t>
+            </a:r>
+          </a:p>
+          <a:p>
             <a:r>
               <a:rPr lang="en-US" dirty="0"/>
-              <a:t>to </a:t>
-            </a:r>
-            <a:r>
-              <a:rPr lang="en-US" dirty="0" smtClean="0"/>
-              <a:t>Attributes</a:t>
-            </a:r>
-          </a:p>
-          <a:p>
-            <a:r>
-              <a:rPr lang="en-US" dirty="0" smtClean="0"/>
-              <a:t>Refactoring </a:t>
-            </a:r>
+              <a:t>Refactoring to Attributes</a:t>
+            </a:r>
+          </a:p>
+          <a:p>
             <a:r>
               <a:rPr lang="en-US" dirty="0"/>
-              <a:t>to Multiple Platforms</a:t>
-            </a:r>
-            <a:endParaRPr lang="en-US" dirty="0" smtClean="0"/>
+              <a:t>Refactoring to Multiple Platforms</a:t>
+            </a:r>
           </a:p>
         </p:txBody>
       </p:sp>
@@ -11152,12 +10987,8 @@
           <a:lstStyle/>
           <a:p>
             <a:r>
-              <a:rPr lang="en-US" dirty="0" smtClean="0"/>
-              <a:t>Approaches </a:t>
-            </a:r>
-            <a:r>
               <a:rPr lang="en-US" dirty="0"/>
-              <a:t>to Extending Resources</a:t>
+              <a:t>Approaches to Extending Resources</a:t>
             </a:r>
           </a:p>
           <a:p>
@@ -11175,54 +11006,50 @@
           <a:p>
             <a:r>
               <a:rPr lang="en-US" dirty="0"/>
-              <a:t>Refining a Custom </a:t>
-            </a:r>
-            <a:r>
-              <a:rPr lang="en-US" dirty="0" smtClean="0"/>
-              <a:t>Resource</a:t>
-            </a:r>
-          </a:p>
-          <a:p>
-            <a:r>
-              <a:rPr lang="en-US" dirty="0" err="1" smtClean="0"/>
+              <a:t>Refining a Custom Resource</a:t>
+            </a:r>
+          </a:p>
+          <a:p>
+            <a:r>
+              <a:rPr lang="en-US" dirty="0" err="1"/>
               <a:t>Ohai</a:t>
             </a:r>
-            <a:endParaRPr lang="en-US" dirty="0" smtClean="0"/>
-          </a:p>
-          <a:p>
-            <a:r>
-              <a:rPr lang="en-US" dirty="0" err="1" smtClean="0"/>
+            <a:endParaRPr lang="en-US" dirty="0"/>
+          </a:p>
+          <a:p>
+            <a:r>
+              <a:rPr lang="en-US" dirty="0" err="1"/>
               <a:t>Ohai</a:t>
             </a:r>
             <a:r>
-              <a:rPr lang="en-US" dirty="0" smtClean="0"/>
+              <a:rPr lang="en-US" dirty="0"/>
               <a:t> Plugins</a:t>
             </a:r>
           </a:p>
           <a:p>
             <a:r>
-              <a:rPr lang="en-US" dirty="0" smtClean="0"/>
+              <a:rPr lang="en-US" dirty="0"/>
               <a:t>Creating an </a:t>
             </a:r>
             <a:r>
-              <a:rPr lang="en-US" dirty="0" err="1" smtClean="0"/>
+              <a:rPr lang="en-US" dirty="0" err="1"/>
               <a:t>Ohai</a:t>
             </a:r>
             <a:r>
-              <a:rPr lang="en-US" dirty="0" smtClean="0"/>
+              <a:rPr lang="en-US" dirty="0"/>
               <a:t> Plugin</a:t>
             </a:r>
           </a:p>
           <a:p>
             <a:r>
-              <a:rPr lang="en-US" dirty="0" smtClean="0"/>
+              <a:rPr lang="en-US" dirty="0"/>
               <a:t>Tuning </a:t>
             </a:r>
             <a:r>
-              <a:rPr lang="en-US" dirty="0" err="1" smtClean="0"/>
+              <a:rPr lang="en-US" dirty="0" err="1"/>
               <a:t>Ohai</a:t>
             </a:r>
-            <a:endParaRPr lang="en-US" dirty="0" smtClean="0"/>
+            <a:endParaRPr lang="en-US" dirty="0"/>
           </a:p>
         </p:txBody>
       </p:sp>
@@ -11242,10 +11069,9 @@
           <a:lstStyle/>
           <a:p>
             <a:r>
-              <a:rPr lang="en-US" dirty="0" smtClean="0"/>
+              <a:rPr lang="en-US" dirty="0"/>
               <a:t>Day 1</a:t>
             </a:r>
-            <a:endParaRPr lang="en-US" dirty="0"/>
           </a:p>
         </p:txBody>
       </p:sp>
@@ -11265,7 +11091,7 @@
           <a:lstStyle/>
           <a:p>
             <a:r>
-              <a:rPr lang="en-US" smtClean="0"/>
+              <a:rPr lang="en-US"/>
               <a:t>Day 2</a:t>
             </a:r>
             <a:endParaRPr lang="en-US" dirty="0"/>
@@ -11285,13 +11111,6 @@
   <p:transition spd="med">
     <p:fade/>
   </p:transition>
-  <p:timing>
-    <p:tnLst>
-      <p:par>
-        <p:cTn id="1" dur="indefinite" restart="never" nodeType="tmRoot"/>
-      </p:par>
-    </p:tnLst>
-  </p:timing>
 </p:sld>
 </file>
 
@@ -11330,10 +11149,9 @@
           <a:lstStyle/>
           <a:p>
             <a:r>
-              <a:rPr lang="en-US" dirty="0" smtClean="0"/>
+              <a:rPr lang="en-US" dirty="0"/>
               <a:t>Pre-built Workstation</a:t>
             </a:r>
-            <a:endParaRPr lang="en-US" dirty="0"/>
           </a:p>
         </p:txBody>
       </p:sp>
@@ -11355,10 +11173,9 @@
           <a:lstStyle/>
           <a:p>
             <a:r>
-              <a:rPr lang="en-US" dirty="0" smtClean="0"/>
+              <a:rPr lang="en-US" dirty="0"/>
               <a:t>We will provide for you a workstation with all the tools installed.</a:t>
             </a:r>
-            <a:endParaRPr lang="en-US" dirty="0"/>
           </a:p>
         </p:txBody>
       </p:sp>
@@ -11382,10 +11199,9 @@
               <a:buChar char="q"/>
             </a:pPr>
             <a:r>
-              <a:rPr lang="en-US" dirty="0" smtClean="0"/>
+              <a:rPr lang="en-US" dirty="0"/>
               <a:t>Login to the Remote Workstation</a:t>
             </a:r>
-            <a:endParaRPr lang="en-US" dirty="0"/>
           </a:p>
         </p:txBody>
       </p:sp>
@@ -11402,13 +11218,6 @@
   <p:transition spd="med">
     <p:fade/>
   </p:transition>
-  <p:timing>
-    <p:tnLst>
-      <p:par>
-        <p:cTn id="1" dur="indefinite" restart="never" nodeType="tmRoot"/>
-      </p:par>
-    </p:tnLst>
-  </p:timing>
 </p:sld>
 </file>
 
@@ -11445,10 +11254,9 @@
           <a:lstStyle/>
           <a:p>
             <a:r>
-              <a:rPr lang="en-US" dirty="0" smtClean="0"/>
+              <a:rPr lang="en-US" dirty="0"/>
               <a:t>Login to the Workstation</a:t>
             </a:r>
-            <a:endParaRPr lang="en-US" dirty="0"/>
           </a:p>
         </p:txBody>
       </p:sp>
@@ -11485,39 +11293,27 @@
             </a:r>
             <a:r>
               <a:rPr lang="en-US" dirty="0"/>
-              <a:t> you sure you want to continue connecting (yes/no</a:t>
-            </a:r>
-            <a:r>
-              <a:rPr lang="en-US" dirty="0" smtClean="0"/>
-              <a:t>)? </a:t>
-            </a:r>
-            <a:r>
-              <a:rPr lang="en-US" b="1" dirty="0" smtClean="0"/>
+              <a:t> you sure you want to continue connecting (yes/no)? </a:t>
+            </a:r>
+            <a:r>
+              <a:rPr lang="en-US" b="1" dirty="0"/>
               <a:t>yes</a:t>
             </a:r>
           </a:p>
           <a:p>
             <a:r>
               <a:rPr lang="en-US" dirty="0"/>
-              <a:t>chef@54.209.164.144's password</a:t>
-            </a:r>
-            <a:r>
-              <a:rPr lang="en-US" dirty="0" smtClean="0"/>
-              <a:t>: </a:t>
-            </a:r>
-            <a:r>
-              <a:rPr lang="en-US" b="1" dirty="0" smtClean="0"/>
+              <a:t>chef@54.209.164.144's password: </a:t>
+            </a:r>
+            <a:r>
+              <a:rPr lang="en-US" b="1" dirty="0"/>
               <a:t>PASSWORD</a:t>
             </a:r>
           </a:p>
           <a:p>
             <a:r>
               <a:rPr lang="en-US" dirty="0"/>
-              <a:t>chef@ip-172-31-15-97 </a:t>
-            </a:r>
-            <a:r>
-              <a:rPr lang="en-US" dirty="0" smtClean="0"/>
-              <a:t>~]$</a:t>
+              <a:t>chef@ip-172-31-15-97 ~]$</a:t>
             </a:r>
           </a:p>
         </p:txBody>
@@ -11538,20 +11334,16 @@
           <a:lstStyle/>
           <a:p>
             <a:r>
-              <a:rPr lang="en-US" dirty="0" smtClean="0"/>
+              <a:rPr lang="en-US" dirty="0"/>
               <a:t>&gt; </a:t>
             </a:r>
             <a:r>
-              <a:rPr lang="en-US" dirty="0" err="1" smtClean="0"/>
+              <a:rPr lang="en-US" dirty="0" err="1"/>
               <a:t>ssh</a:t>
             </a:r>
             <a:r>
-              <a:rPr lang="en-US" dirty="0" smtClean="0"/>
-              <a:t> IPADDRESS -l </a:t>
-            </a:r>
-            <a:r>
               <a:rPr lang="en-US" dirty="0"/>
-              <a:t>USERNAME</a:t>
+              <a:t> IPADDRESS -l USERNAME</a:t>
             </a:r>
           </a:p>
         </p:txBody>
@@ -11569,13 +11361,6 @@
   <p:transition spd="med">
     <p:fade/>
   </p:transition>
-  <p:timing>
-    <p:tnLst>
-      <p:par>
-        <p:cTn id="1" dur="indefinite" restart="never" nodeType="tmRoot"/>
-      </p:par>
-    </p:tnLst>
-  </p:timing>
 </p:sld>
 </file>
 
@@ -11614,10 +11399,9 @@
           <a:lstStyle/>
           <a:p>
             <a:r>
-              <a:rPr lang="en-US" dirty="0" smtClean="0"/>
+              <a:rPr lang="en-US" dirty="0"/>
               <a:t>Pre-built Workstation</a:t>
             </a:r>
-            <a:endParaRPr lang="en-US" dirty="0"/>
           </a:p>
         </p:txBody>
       </p:sp>
@@ -11640,13 +11424,8 @@
           <a:p>
             <a:r>
               <a:rPr lang="en-US" dirty="0"/>
-              <a:t>We will provide for you a workstation with all the tools installed</a:t>
-            </a:r>
-            <a:r>
-              <a:rPr lang="en-US" dirty="0" smtClean="0"/>
-              <a:t>.</a:t>
-            </a:r>
-            <a:endParaRPr lang="en-US" dirty="0"/>
+              <a:t>We will provide for you a workstation with all the tools installed.</a:t>
+            </a:r>
           </a:p>
         </p:txBody>
       </p:sp>
@@ -11670,10 +11449,9 @@
               <a:buChar char="ü"/>
             </a:pPr>
             <a:r>
-              <a:rPr lang="en-US" dirty="0" smtClean="0"/>
+              <a:rPr lang="en-US" dirty="0"/>
               <a:t>Login to the Remote Workstation</a:t>
             </a:r>
-            <a:endParaRPr lang="en-US" dirty="0"/>
           </a:p>
         </p:txBody>
       </p:sp>
@@ -11690,13 +11468,6 @@
   <p:transition spd="med">
     <p:fade/>
   </p:transition>
-  <p:timing>
-    <p:tnLst>
-      <p:par>
-        <p:cTn id="1" dur="indefinite" restart="never" nodeType="tmRoot"/>
-      </p:par>
-    </p:tnLst>
-  </p:timing>
 </p:sld>
 </file>
 
@@ -13032,15 +12803,6 @@
 
 <file path=customXml/item1.xml><?xml version="1.0" encoding="utf-8"?>
 <?mso-contentType ?>
-<FormTemplates xmlns="http://schemas.microsoft.com/sharepoint/v3/contenttype/forms">
-  <Display>DocumentLibraryForm</Display>
-  <Edit>DocumentLibraryForm</Edit>
-  <New>DocumentLibraryForm</New>
-</FormTemplates>
-</file>
-
-<file path=customXml/item2.xml><?xml version="1.0" encoding="utf-8"?>
-<?mso-contentType ?>
 <spe:Receivers xmlns:spe="http://schemas.microsoft.com/sharepoint/events">
   <Receiver>
     <Name>Document ID Generator</Name>
@@ -13085,7 +12847,28 @@
 </spe:Receivers>
 </file>
 
+<file path=customXml/item2.xml><?xml version="1.0" encoding="utf-8"?>
+<?mso-contentType ?>
+<FormTemplates xmlns="http://schemas.microsoft.com/sharepoint/v3/contenttype/forms">
+  <Display>DocumentLibraryForm</Display>
+  <Edit>DocumentLibraryForm</Edit>
+  <New>DocumentLibraryForm</New>
+</FormTemplates>
+</file>
+
 <file path=customXml/item3.xml><?xml version="1.0" encoding="utf-8"?>
+<p:properties xmlns:p="http://schemas.microsoft.com/office/2006/metadata/properties" xmlns:xsi="http://www.w3.org/2001/XMLSchema-instance" xmlns:pc="http://schemas.microsoft.com/office/infopath/2007/PartnerControls">
+  <documentManagement>
+    <_dlc_DocId xmlns="7bb5d761-a2ea-4873-95f7-7a6658fb3ef0">M4CWTKMW727E-592-73</_dlc_DocId>
+    <_dlc_DocIdUrl xmlns="7bb5d761-a2ea-4873-95f7-7a6658fb3ef0">
+      <Url>https://kms.vci.local/marketing/team/_layouts/DocIdRedir.aspx?ID=M4CWTKMW727E-592-73</Url>
+      <Description>M4CWTKMW727E-592-73</Description>
+    </_dlc_DocIdUrl>
+  </documentManagement>
+</p:properties>
+</file>
+
+<file path=customXml/item4.xml><?xml version="1.0" encoding="utf-8"?>
 <ct:contentTypeSchema xmlns:ct="http://schemas.microsoft.com/office/2006/metadata/contentType" xmlns:ma="http://schemas.microsoft.com/office/2006/metadata/properties/metaAttributes" ct:_="" ma:_="" ma:contentTypeName="Document" ma:contentTypeID="0x0101000812F700BE7F874999720E88173FE491" ma:contentTypeVersion="0" ma:contentTypeDescription="Create a new document." ma:contentTypeScope="" ma:versionID="3f79f408e2ca720b7aba6e0e32464d0c">
   <xsd:schema xmlns:xsd="http://www.w3.org/2001/XMLSchema" xmlns:xs="http://www.w3.org/2001/XMLSchema" xmlns:p="http://schemas.microsoft.com/office/2006/metadata/properties" xmlns:ns2="7bb5d761-a2ea-4873-95f7-7a6658fb3ef0" targetNamespace="http://schemas.microsoft.com/office/2006/metadata/properties" ma:root="true" ma:fieldsID="1e062cd38ba31e406bfc4340fbc7f87a" ns2:_="">
     <xsd:import namespace="7bb5d761-a2ea-4873-95f7-7a6658fb3ef0"/>
@@ -13230,19 +13013,15 @@
 </ct:contentTypeSchema>
 </file>
 
-<file path=customXml/item4.xml><?xml version="1.0" encoding="utf-8"?>
-<p:properties xmlns:p="http://schemas.microsoft.com/office/2006/metadata/properties" xmlns:xsi="http://www.w3.org/2001/XMLSchema-instance" xmlns:pc="http://schemas.microsoft.com/office/infopath/2007/PartnerControls">
-  <documentManagement>
-    <_dlc_DocId xmlns="7bb5d761-a2ea-4873-95f7-7a6658fb3ef0">M4CWTKMW727E-592-73</_dlc_DocId>
-    <_dlc_DocIdUrl xmlns="7bb5d761-a2ea-4873-95f7-7a6658fb3ef0">
-      <Url>https://kms.vci.local/marketing/team/_layouts/DocIdRedir.aspx?ID=M4CWTKMW727E-592-73</Url>
-      <Description>M4CWTKMW727E-592-73</Description>
-    </_dlc_DocIdUrl>
-  </documentManagement>
-</p:properties>
+<file path=customXml/itemProps1.xml><?xml version="1.0" encoding="utf-8"?>
+<ds:datastoreItem xmlns:ds="http://schemas.openxmlformats.org/officeDocument/2006/customXml" ds:itemID="{B13EBC30-FE27-4C6A-B723-23FC2188F7DC}">
+  <ds:schemaRefs>
+    <ds:schemaRef ds:uri="http://schemas.microsoft.com/sharepoint/events"/>
+  </ds:schemaRefs>
+</ds:datastoreItem>
 </file>
 
-<file path=customXml/itemProps1.xml><?xml version="1.0" encoding="utf-8"?>
+<file path=customXml/itemProps2.xml><?xml version="1.0" encoding="utf-8"?>
 <ds:datastoreItem xmlns:ds="http://schemas.openxmlformats.org/officeDocument/2006/customXml" ds:itemID="{5CDEB364-43EC-4510-9881-539C2A3FCE9E}">
   <ds:schemaRefs>
     <ds:schemaRef ds:uri="http://schemas.microsoft.com/sharepoint/v3/contenttype/forms"/>
@@ -13250,15 +13029,23 @@
 </ds:datastoreItem>
 </file>
 
-<file path=customXml/itemProps2.xml><?xml version="1.0" encoding="utf-8"?>
-<ds:datastoreItem xmlns:ds="http://schemas.openxmlformats.org/officeDocument/2006/customXml" ds:itemID="{B13EBC30-FE27-4C6A-B723-23FC2188F7DC}">
+<file path=customXml/itemProps3.xml><?xml version="1.0" encoding="utf-8"?>
+<ds:datastoreItem xmlns:ds="http://schemas.openxmlformats.org/officeDocument/2006/customXml" ds:itemID="{6921749B-AEB7-461B-845F-603CABD25259}">
   <ds:schemaRefs>
-    <ds:schemaRef ds:uri="http://schemas.microsoft.com/sharepoint/events"/>
+    <ds:schemaRef ds:uri="7bb5d761-a2ea-4873-95f7-7a6658fb3ef0"/>
+    <ds:schemaRef ds:uri="http://purl.org/dc/terms/"/>
+    <ds:schemaRef ds:uri="http://schemas.openxmlformats.org/package/2006/metadata/core-properties"/>
+    <ds:schemaRef ds:uri="http://purl.org/dc/dcmitype/"/>
+    <ds:schemaRef ds:uri="http://schemas.microsoft.com/office/infopath/2007/PartnerControls"/>
+    <ds:schemaRef ds:uri="http://schemas.microsoft.com/office/2006/documentManagement/types"/>
+    <ds:schemaRef ds:uri="http://purl.org/dc/elements/1.1/"/>
+    <ds:schemaRef ds:uri="http://schemas.microsoft.com/office/2006/metadata/properties"/>
+    <ds:schemaRef ds:uri="http://www.w3.org/XML/1998/namespace"/>
   </ds:schemaRefs>
 </ds:datastoreItem>
 </file>
 
-<file path=customXml/itemProps3.xml><?xml version="1.0" encoding="utf-8"?>
+<file path=customXml/itemProps4.xml><?xml version="1.0" encoding="utf-8"?>
 <ds:datastoreItem xmlns:ds="http://schemas.openxmlformats.org/officeDocument/2006/customXml" ds:itemID="{164479E5-0B02-49AC-B79E-EC1D6164DDD3}">
   <ds:schemaRefs>
     <ds:schemaRef ds:uri="http://schemas.microsoft.com/office/2006/metadata/contentType"/>
@@ -13274,20 +13061,4 @@
     <ds:schemaRef ds:uri="http://schemas.microsoft.com/internal/obd"/>
   </ds:schemaRefs>
 </ds:datastoreItem>
-</file>
-
-<file path=customXml/itemProps4.xml><?xml version="1.0" encoding="utf-8"?>
-<ds:datastoreItem xmlns:ds="http://schemas.openxmlformats.org/officeDocument/2006/customXml" ds:itemID="{6921749B-AEB7-461B-845F-603CABD25259}">
-  <ds:schemaRefs>
-    <ds:schemaRef ds:uri="7bb5d761-a2ea-4873-95f7-7a6658fb3ef0"/>
-    <ds:schemaRef ds:uri="http://purl.org/dc/terms/"/>
-    <ds:schemaRef ds:uri="http://schemas.openxmlformats.org/package/2006/metadata/core-properties"/>
-    <ds:schemaRef ds:uri="http://purl.org/dc/dcmitype/"/>
-    <ds:schemaRef ds:uri="http://schemas.microsoft.com/office/infopath/2007/PartnerControls"/>
-    <ds:schemaRef ds:uri="http://schemas.microsoft.com/office/2006/documentManagement/types"/>
-    <ds:schemaRef ds:uri="http://purl.org/dc/elements/1.1/"/>
-    <ds:schemaRef ds:uri="http://schemas.microsoft.com/office/2006/metadata/properties"/>
-    <ds:schemaRef ds:uri="http://www.w3.org/XML/1998/namespace"/>
-  </ds:schemaRefs>
-</ds:datastoreItem>
 </file>
</xml_diff>

<commit_message>
Updated course version to 3.1.0
</commit_message>
<xml_diff>
--- a/01-introduction.pptx
+++ b/01-introduction.pptx
@@ -174,10 +174,6 @@
 </p:presentation>
 </file>
 
-<file path=ppt/revisionInfo.xml><?xml version="1.0" encoding="utf-8"?>
-<p1510:revInfo xmlns:a="http://schemas.openxmlformats.org/drawingml/2006/main" xmlns:r="http://schemas.openxmlformats.org/officeDocument/2006/relationships" xmlns:p1510="http://schemas.microsoft.com/office/powerpoint/2015/10/main"/>
-</file>
-
 <file path=ppt/handoutMasters/handoutMaster1.xml><?xml version="1.0" encoding="utf-8"?>
 <p:handoutMaster xmlns:a="http://schemas.openxmlformats.org/drawingml/2006/main" xmlns:r="http://schemas.openxmlformats.org/officeDocument/2006/relationships" xmlns:p="http://schemas.openxmlformats.org/presentationml/2006/main">
   <p:cSld>
@@ -2936,14 +2932,14 @@
           </a:ln>
           <a:extLst>
             <a:ext uri="{909E8E84-426E-40dd-AFC4-6F175D3DCCD1}">
-              <a14:hiddenFill xmlns="" xmlns:a14="http://schemas.microsoft.com/office/drawing/2010/main">
+              <a14:hiddenFill xmlns:a14="http://schemas.microsoft.com/office/drawing/2010/main" xmlns="">
                 <a:solidFill>
                   <a:srgbClr val="FFFFFF"/>
                 </a:solidFill>
               </a14:hiddenFill>
             </a:ext>
             <a:ext uri="{91240B29-F687-4f45-9708-019B960494DF}">
-              <a14:hiddenLine xmlns="" xmlns:a14="http://schemas.microsoft.com/office/drawing/2010/main" w="9525">
+              <a14:hiddenLine xmlns:a14="http://schemas.microsoft.com/office/drawing/2010/main" xmlns="" w="9525">
                 <a:solidFill>
                   <a:srgbClr val="000000"/>
                 </a:solidFill>
@@ -3091,14 +3087,14 @@
           </a:ln>
           <a:extLst>
             <a:ext uri="{909E8E84-426E-40dd-AFC4-6F175D3DCCD1}">
-              <a14:hiddenFill xmlns="" xmlns:a14="http://schemas.microsoft.com/office/drawing/2010/main">
+              <a14:hiddenFill xmlns:a14="http://schemas.microsoft.com/office/drawing/2010/main" xmlns="">
                 <a:solidFill>
                   <a:srgbClr val="FFFFFF"/>
                 </a:solidFill>
               </a14:hiddenFill>
             </a:ext>
             <a:ext uri="{91240B29-F687-4f45-9708-019B960494DF}">
-              <a14:hiddenLine xmlns="" xmlns:a14="http://schemas.microsoft.com/office/drawing/2010/main" w="9525">
+              <a14:hiddenLine xmlns:a14="http://schemas.microsoft.com/office/drawing/2010/main" xmlns="" w="9525">
                 <a:solidFill>
                   <a:srgbClr val="000000"/>
                 </a:solidFill>
@@ -3589,14 +3585,14 @@
           </a:ln>
           <a:extLst>
             <a:ext uri="{909E8E84-426E-40dd-AFC4-6F175D3DCCD1}">
-              <a14:hiddenFill xmlns="" xmlns:a14="http://schemas.microsoft.com/office/drawing/2010/main">
+              <a14:hiddenFill xmlns:a14="http://schemas.microsoft.com/office/drawing/2010/main" xmlns="">
                 <a:solidFill>
                   <a:srgbClr val="FFFFFF"/>
                 </a:solidFill>
               </a14:hiddenFill>
             </a:ext>
             <a:ext uri="{91240B29-F687-4f45-9708-019B960494DF}">
-              <a14:hiddenLine xmlns="" xmlns:a14="http://schemas.microsoft.com/office/drawing/2010/main" w="9525">
+              <a14:hiddenLine xmlns:a14="http://schemas.microsoft.com/office/drawing/2010/main" xmlns="" w="9525">
                 <a:solidFill>
                   <a:srgbClr val="000000"/>
                 </a:solidFill>
@@ -5023,14 +5019,14 @@
           </a:ln>
           <a:extLst>
             <a:ext uri="{909E8E84-426E-40dd-AFC4-6F175D3DCCD1}">
-              <a14:hiddenFill xmlns="" xmlns:a14="http://schemas.microsoft.com/office/drawing/2010/main">
+              <a14:hiddenFill xmlns:a14="http://schemas.microsoft.com/office/drawing/2010/main" xmlns="">
                 <a:solidFill>
                   <a:srgbClr val="FFFFFF"/>
                 </a:solidFill>
               </a14:hiddenFill>
             </a:ext>
             <a:ext uri="{91240B29-F687-4f45-9708-019B960494DF}">
-              <a14:hiddenLine xmlns="" xmlns:a14="http://schemas.microsoft.com/office/drawing/2010/main" w="9525">
+              <a14:hiddenLine xmlns:a14="http://schemas.microsoft.com/office/drawing/2010/main" xmlns="" w="9525">
                 <a:solidFill>
                   <a:srgbClr val="000000"/>
                 </a:solidFill>
@@ -6394,14 +6390,14 @@
           </a:ln>
           <a:extLst>
             <a:ext uri="{909E8E84-426E-40dd-AFC4-6F175D3DCCD1}">
-              <a14:hiddenFill xmlns="" xmlns:a14="http://schemas.microsoft.com/office/drawing/2010/main">
+              <a14:hiddenFill xmlns:a14="http://schemas.microsoft.com/office/drawing/2010/main" xmlns="">
                 <a:solidFill>
                   <a:srgbClr val="FFFFFF"/>
                 </a:solidFill>
               </a14:hiddenFill>
             </a:ext>
             <a:ext uri="{91240B29-F687-4f45-9708-019B960494DF}">
-              <a14:hiddenLine xmlns="" xmlns:a14="http://schemas.microsoft.com/office/drawing/2010/main" w="9525">
+              <a14:hiddenLine xmlns:a14="http://schemas.microsoft.com/office/drawing/2010/main" xmlns="" w="9525">
                 <a:solidFill>
                   <a:srgbClr val="000000"/>
                 </a:solidFill>
@@ -6959,14 +6955,14 @@
           </a:ln>
           <a:extLst>
             <a:ext uri="{909E8E84-426E-40dd-AFC4-6F175D3DCCD1}">
-              <a14:hiddenFill xmlns="" xmlns:a14="http://schemas.microsoft.com/office/drawing/2010/main">
+              <a14:hiddenFill xmlns:a14="http://schemas.microsoft.com/office/drawing/2010/main" xmlns="">
                 <a:solidFill>
                   <a:srgbClr val="FFFFFF"/>
                 </a:solidFill>
               </a14:hiddenFill>
             </a:ext>
             <a:ext uri="{91240B29-F687-4f45-9708-019B960494DF}">
-              <a14:hiddenLine xmlns="" xmlns:a14="http://schemas.microsoft.com/office/drawing/2010/main" w="9525">
+              <a14:hiddenLine xmlns:a14="http://schemas.microsoft.com/office/drawing/2010/main" xmlns="" w="9525">
                 <a:solidFill>
                   <a:srgbClr val="000000"/>
                 </a:solidFill>
@@ -7533,14 +7529,14 @@
           </a:ln>
           <a:extLst>
             <a:ext uri="{909E8E84-426E-40dd-AFC4-6F175D3DCCD1}">
-              <a14:hiddenFill xmlns="" xmlns:a14="http://schemas.microsoft.com/office/drawing/2010/main">
+              <a14:hiddenFill xmlns:a14="http://schemas.microsoft.com/office/drawing/2010/main" xmlns="">
                 <a:solidFill>
                   <a:srgbClr val="FFFFFF"/>
                 </a:solidFill>
               </a14:hiddenFill>
             </a:ext>
             <a:ext uri="{91240B29-F687-4f45-9708-019B960494DF}">
-              <a14:hiddenLine xmlns="" xmlns:a14="http://schemas.microsoft.com/office/drawing/2010/main" w="9525">
+              <a14:hiddenLine xmlns:a14="http://schemas.microsoft.com/office/drawing/2010/main" xmlns="" w="9525">
                 <a:solidFill>
                   <a:srgbClr val="000000"/>
                 </a:solidFill>
@@ -8480,14 +8476,14 @@
           </a:ln>
           <a:extLst>
             <a:ext uri="{909E8E84-426E-40dd-AFC4-6F175D3DCCD1}">
-              <a14:hiddenFill xmlns="" xmlns:a14="http://schemas.microsoft.com/office/drawing/2010/main">
+              <a14:hiddenFill xmlns:a14="http://schemas.microsoft.com/office/drawing/2010/main" xmlns="">
                 <a:solidFill>
                   <a:srgbClr val="FFFFFF"/>
                 </a:solidFill>
               </a14:hiddenFill>
             </a:ext>
             <a:ext uri="{91240B29-F687-4f45-9708-019B960494DF}">
-              <a14:hiddenLine xmlns="" xmlns:a14="http://schemas.microsoft.com/office/drawing/2010/main" w="9525">
+              <a14:hiddenLine xmlns:a14="http://schemas.microsoft.com/office/drawing/2010/main" xmlns="" w="9525">
                 <a:solidFill>
                   <a:srgbClr val="000000"/>
                 </a:solidFill>
@@ -9242,14 +9238,14 @@
           </a:ln>
           <a:extLst>
             <a:ext uri="{909E8E84-426E-40dd-AFC4-6F175D3DCCD1}">
-              <a14:hiddenFill xmlns="" xmlns:a14="http://schemas.microsoft.com/office/drawing/2010/main">
+              <a14:hiddenFill xmlns:a14="http://schemas.microsoft.com/office/drawing/2010/main" xmlns="">
                 <a:solidFill>
                   <a:srgbClr val="FFFFFF"/>
                 </a:solidFill>
               </a14:hiddenFill>
             </a:ext>
             <a:ext uri="{91240B29-F687-4f45-9708-019B960494DF}">
-              <a14:hiddenLine xmlns="" xmlns:a14="http://schemas.microsoft.com/office/drawing/2010/main" w="9525">
+              <a14:hiddenLine xmlns:a14="http://schemas.microsoft.com/office/drawing/2010/main" xmlns="" w="9525">
                 <a:solidFill>
                   <a:srgbClr val="000000"/>
                 </a:solidFill>
@@ -10254,7 +10250,7 @@
                   <a:schemeClr val="bg1"/>
                 </a:solidFill>
               </a:rPr>
-              <a:t>Course v3.0.0</a:t>
+              <a:t>Course v3.1.0</a:t>
             </a:r>
           </a:p>
         </p:txBody>
@@ -12803,6 +12799,15 @@
 
 <file path=customXml/item1.xml><?xml version="1.0" encoding="utf-8"?>
 <?mso-contentType ?>
+<FormTemplates xmlns="http://schemas.microsoft.com/sharepoint/v3/contenttype/forms">
+  <Display>DocumentLibraryForm</Display>
+  <Edit>DocumentLibraryForm</Edit>
+  <New>DocumentLibraryForm</New>
+</FormTemplates>
+</file>
+
+<file path=customXml/item2.xml><?xml version="1.0" encoding="utf-8"?>
+<?mso-contentType ?>
 <spe:Receivers xmlns:spe="http://schemas.microsoft.com/sharepoint/events">
   <Receiver>
     <Name>Document ID Generator</Name>
@@ -12847,28 +12852,7 @@
 </spe:Receivers>
 </file>
 
-<file path=customXml/item2.xml><?xml version="1.0" encoding="utf-8"?>
-<?mso-contentType ?>
-<FormTemplates xmlns="http://schemas.microsoft.com/sharepoint/v3/contenttype/forms">
-  <Display>DocumentLibraryForm</Display>
-  <Edit>DocumentLibraryForm</Edit>
-  <New>DocumentLibraryForm</New>
-</FormTemplates>
-</file>
-
 <file path=customXml/item3.xml><?xml version="1.0" encoding="utf-8"?>
-<p:properties xmlns:p="http://schemas.microsoft.com/office/2006/metadata/properties" xmlns:xsi="http://www.w3.org/2001/XMLSchema-instance" xmlns:pc="http://schemas.microsoft.com/office/infopath/2007/PartnerControls">
-  <documentManagement>
-    <_dlc_DocId xmlns="7bb5d761-a2ea-4873-95f7-7a6658fb3ef0">M4CWTKMW727E-592-73</_dlc_DocId>
-    <_dlc_DocIdUrl xmlns="7bb5d761-a2ea-4873-95f7-7a6658fb3ef0">
-      <Url>https://kms.vci.local/marketing/team/_layouts/DocIdRedir.aspx?ID=M4CWTKMW727E-592-73</Url>
-      <Description>M4CWTKMW727E-592-73</Description>
-    </_dlc_DocIdUrl>
-  </documentManagement>
-</p:properties>
-</file>
-
-<file path=customXml/item4.xml><?xml version="1.0" encoding="utf-8"?>
 <ct:contentTypeSchema xmlns:ct="http://schemas.microsoft.com/office/2006/metadata/contentType" xmlns:ma="http://schemas.microsoft.com/office/2006/metadata/properties/metaAttributes" ct:_="" ma:_="" ma:contentTypeName="Document" ma:contentTypeID="0x0101000812F700BE7F874999720E88173FE491" ma:contentTypeVersion="0" ma:contentTypeDescription="Create a new document." ma:contentTypeScope="" ma:versionID="3f79f408e2ca720b7aba6e0e32464d0c">
   <xsd:schema xmlns:xsd="http://www.w3.org/2001/XMLSchema" xmlns:xs="http://www.w3.org/2001/XMLSchema" xmlns:p="http://schemas.microsoft.com/office/2006/metadata/properties" xmlns:ns2="7bb5d761-a2ea-4873-95f7-7a6658fb3ef0" targetNamespace="http://schemas.microsoft.com/office/2006/metadata/properties" ma:root="true" ma:fieldsID="1e062cd38ba31e406bfc4340fbc7f87a" ns2:_="">
     <xsd:import namespace="7bb5d761-a2ea-4873-95f7-7a6658fb3ef0"/>
@@ -13013,7 +12997,27 @@
 </ct:contentTypeSchema>
 </file>
 
+<file path=customXml/item4.xml><?xml version="1.0" encoding="utf-8"?>
+<p:properties xmlns:p="http://schemas.microsoft.com/office/2006/metadata/properties" xmlns:xsi="http://www.w3.org/2001/XMLSchema-instance" xmlns:pc="http://schemas.microsoft.com/office/infopath/2007/PartnerControls">
+  <documentManagement>
+    <_dlc_DocId xmlns="7bb5d761-a2ea-4873-95f7-7a6658fb3ef0">M4CWTKMW727E-592-73</_dlc_DocId>
+    <_dlc_DocIdUrl xmlns="7bb5d761-a2ea-4873-95f7-7a6658fb3ef0">
+      <Url>https://kms.vci.local/marketing/team/_layouts/DocIdRedir.aspx?ID=M4CWTKMW727E-592-73</Url>
+      <Description>M4CWTKMW727E-592-73</Description>
+    </_dlc_DocIdUrl>
+  </documentManagement>
+</p:properties>
+</file>
+
 <file path=customXml/itemProps1.xml><?xml version="1.0" encoding="utf-8"?>
+<ds:datastoreItem xmlns:ds="http://schemas.openxmlformats.org/officeDocument/2006/customXml" ds:itemID="{5CDEB364-43EC-4510-9881-539C2A3FCE9E}">
+  <ds:schemaRefs>
+    <ds:schemaRef ds:uri="http://schemas.microsoft.com/sharepoint/v3/contenttype/forms"/>
+  </ds:schemaRefs>
+</ds:datastoreItem>
+</file>
+
+<file path=customXml/itemProps2.xml><?xml version="1.0" encoding="utf-8"?>
 <ds:datastoreItem xmlns:ds="http://schemas.openxmlformats.org/officeDocument/2006/customXml" ds:itemID="{B13EBC30-FE27-4C6A-B723-23FC2188F7DC}">
   <ds:schemaRefs>
     <ds:schemaRef ds:uri="http://schemas.microsoft.com/sharepoint/events"/>
@@ -13021,31 +13025,7 @@
 </ds:datastoreItem>
 </file>
 
-<file path=customXml/itemProps2.xml><?xml version="1.0" encoding="utf-8"?>
-<ds:datastoreItem xmlns:ds="http://schemas.openxmlformats.org/officeDocument/2006/customXml" ds:itemID="{5CDEB364-43EC-4510-9881-539C2A3FCE9E}">
-  <ds:schemaRefs>
-    <ds:schemaRef ds:uri="http://schemas.microsoft.com/sharepoint/v3/contenttype/forms"/>
-  </ds:schemaRefs>
-</ds:datastoreItem>
-</file>
-
 <file path=customXml/itemProps3.xml><?xml version="1.0" encoding="utf-8"?>
-<ds:datastoreItem xmlns:ds="http://schemas.openxmlformats.org/officeDocument/2006/customXml" ds:itemID="{6921749B-AEB7-461B-845F-603CABD25259}">
-  <ds:schemaRefs>
-    <ds:schemaRef ds:uri="7bb5d761-a2ea-4873-95f7-7a6658fb3ef0"/>
-    <ds:schemaRef ds:uri="http://purl.org/dc/terms/"/>
-    <ds:schemaRef ds:uri="http://schemas.openxmlformats.org/package/2006/metadata/core-properties"/>
-    <ds:schemaRef ds:uri="http://purl.org/dc/dcmitype/"/>
-    <ds:schemaRef ds:uri="http://schemas.microsoft.com/office/infopath/2007/PartnerControls"/>
-    <ds:schemaRef ds:uri="http://schemas.microsoft.com/office/2006/documentManagement/types"/>
-    <ds:schemaRef ds:uri="http://purl.org/dc/elements/1.1/"/>
-    <ds:schemaRef ds:uri="http://schemas.microsoft.com/office/2006/metadata/properties"/>
-    <ds:schemaRef ds:uri="http://www.w3.org/XML/1998/namespace"/>
-  </ds:schemaRefs>
-</ds:datastoreItem>
-</file>
-
-<file path=customXml/itemProps4.xml><?xml version="1.0" encoding="utf-8"?>
 <ds:datastoreItem xmlns:ds="http://schemas.openxmlformats.org/officeDocument/2006/customXml" ds:itemID="{164479E5-0B02-49AC-B79E-EC1D6164DDD3}">
   <ds:schemaRefs>
     <ds:schemaRef ds:uri="http://schemas.microsoft.com/office/2006/metadata/contentType"/>
@@ -13061,4 +13041,20 @@
     <ds:schemaRef ds:uri="http://schemas.microsoft.com/internal/obd"/>
   </ds:schemaRefs>
 </ds:datastoreItem>
+</file>
+
+<file path=customXml/itemProps4.xml><?xml version="1.0" encoding="utf-8"?>
+<ds:datastoreItem xmlns:ds="http://schemas.openxmlformats.org/officeDocument/2006/customXml" ds:itemID="{6921749B-AEB7-461B-845F-603CABD25259}">
+  <ds:schemaRefs>
+    <ds:schemaRef ds:uri="7bb5d761-a2ea-4873-95f7-7a6658fb3ef0"/>
+    <ds:schemaRef ds:uri="http://purl.org/dc/terms/"/>
+    <ds:schemaRef ds:uri="http://schemas.openxmlformats.org/package/2006/metadata/core-properties"/>
+    <ds:schemaRef ds:uri="http://purl.org/dc/dcmitype/"/>
+    <ds:schemaRef ds:uri="http://schemas.microsoft.com/office/infopath/2007/PartnerControls"/>
+    <ds:schemaRef ds:uri="http://schemas.microsoft.com/office/2006/documentManagement/types"/>
+    <ds:schemaRef ds:uri="http://purl.org/dc/elements/1.1/"/>
+    <ds:schemaRef ds:uri="http://schemas.microsoft.com/office/2006/metadata/properties"/>
+    <ds:schemaRef ds:uri="http://www.w3.org/XML/1998/namespace"/>
+  </ds:schemaRefs>
+</ds:datastoreItem>
 </file>
</xml_diff>